<commit_message>
updated the colors of the graphs in step 3 of the presentation
</commit_message>
<xml_diff>
--- a/presentation/20180713 Gruppe 5 - final.pptx
+++ b/presentation/20180713 Gruppe 5 - final.pptx
@@ -176,7 +176,7 @@
   </p:defaultTextStyle>
   <p:extLst>
     <p:ext uri="{EFAFB233-063F-42B5-8137-9DF3F51BA10A}">
-      <p15:sldGuideLst xmlns:p15="http://schemas.microsoft.com/office/powerpoint/2012/main">
+      <p15:sldGuideLst xmlns:p15="http://schemas.microsoft.com/office/powerpoint/2012/main" xmlns="">
         <p15:guide id="1" orient="horz" pos="2160">
           <p15:clr>
             <a:srgbClr val="A4A3A4"/>
@@ -190,7 +190,7 @@
       </p15:sldGuideLst>
     </p:ext>
     <p:ext uri="{2D200454-40CA-4A62-9FC3-DE9A4176ACB9}">
-      <p15:notesGuideLst xmlns:p15="http://schemas.microsoft.com/office/powerpoint/2012/main"/>
+      <p15:notesGuideLst xmlns:p15="http://schemas.microsoft.com/office/powerpoint/2012/main" xmlns=""/>
     </p:ext>
   </p:extLst>
 </p:presentation>
@@ -204,7 +204,7 @@
   <p:cmAuthor id="2" name="Markus Hoehn" initials="MH" lastIdx="3" clrIdx="1">
     <p:extLst>
       <p:ext uri="{19B8F6BF-5375-455C-9EA6-DF929625EA0E}">
-        <p15:presenceInfo xmlns:p15="http://schemas.microsoft.com/office/powerpoint/2012/main" userId="S-1-5-21-74256929-2686928077-3698218826-1125" providerId="AD"/>
+        <p15:presenceInfo xmlns:p15="http://schemas.microsoft.com/office/powerpoint/2012/main" xmlns="" userId="S-1-5-21-74256929-2686928077-3698218826-1125" providerId="AD"/>
       </p:ext>
     </p:extLst>
   </p:cmAuthor>
@@ -218,7 +218,7 @@
     <p:text>early stopping to prevent overfitting, but also for efficiency</p:text>
     <p:extLst>
       <p:ext uri="{C676402C-5697-4E1C-873F-D02D1690AC5C}">
-        <p15:threadingInfo xmlns:p15="http://schemas.microsoft.com/office/powerpoint/2012/main" timeZoneBias="-120"/>
+        <p15:threadingInfo xmlns:p15="http://schemas.microsoft.com/office/powerpoint/2012/main" xmlns="" timeZoneBias="-120"/>
       </p:ext>
     </p:extLst>
   </p:cm>
@@ -228,7 +228,7 @@
 Antiproportional, Precision ist uns wichtiger als Recall (weil SUmmary am ENde gut sein muss), aber recall muss mindestwert haben</p:text>
     <p:extLst>
       <p:ext uri="{C676402C-5697-4E1C-873F-D02D1690AC5C}">
-        <p15:threadingInfo xmlns:p15="http://schemas.microsoft.com/office/powerpoint/2012/main" timeZoneBias="-120"/>
+        <p15:threadingInfo xmlns:p15="http://schemas.microsoft.com/office/powerpoint/2012/main" xmlns="" timeZoneBias="-120"/>
       </p:ext>
     </p:extLst>
   </p:cm>
@@ -246,7 +246,7 @@
 Wir entschieden uns, dass 30 Nuggets ein guter Wert ist</p:text>
     <p:extLst>
       <p:ext uri="{C676402C-5697-4E1C-873F-D02D1690AC5C}">
-        <p15:threadingInfo xmlns:p15="http://schemas.microsoft.com/office/powerpoint/2012/main" timeZoneBias="-120"/>
+        <p15:threadingInfo xmlns:p15="http://schemas.microsoft.com/office/powerpoint/2012/main" xmlns="" timeZoneBias="-120"/>
       </p:ext>
     </p:extLst>
   </p:cm>
@@ -2027,6 +2027,13 @@
         </dgm:presLayoutVars>
       </dgm:prSet>
       <dgm:spPr/>
+      <dgm:t>
+        <a:bodyPr/>
+        <a:lstStyle/>
+        <a:p>
+          <a:endParaRPr lang="de-DE"/>
+        </a:p>
+      </dgm:t>
     </dgm:pt>
     <dgm:pt modelId="{9C1D2CB9-94B3-4BB4-AD6E-339F612D3E51}" type="pres">
       <dgm:prSet presAssocID="{C0E8203B-5169-4CD6-9702-53FE3A38D4B7}" presName="thickLine" presStyleLbl="alignNode1" presStyleIdx="0" presStyleCnt="1"/>
@@ -2039,6 +2046,13 @@
     <dgm:pt modelId="{55250350-E17F-4CB6-83BA-1D4FE4D0BB7B}" type="pres">
       <dgm:prSet presAssocID="{C0E8203B-5169-4CD6-9702-53FE3A38D4B7}" presName="tx1" presStyleLbl="revTx" presStyleIdx="0" presStyleCnt="7"/>
       <dgm:spPr/>
+      <dgm:t>
+        <a:bodyPr/>
+        <a:lstStyle/>
+        <a:p>
+          <a:endParaRPr lang="de-DE"/>
+        </a:p>
+      </dgm:t>
     </dgm:pt>
     <dgm:pt modelId="{C27E513B-71E3-44CB-AFAD-0B7D8730111E}" type="pres">
       <dgm:prSet presAssocID="{C0E8203B-5169-4CD6-9702-53FE3A38D4B7}" presName="vert1" presStyleCnt="0"/>
@@ -2059,6 +2073,13 @@
     <dgm:pt modelId="{A4F65490-42AA-4A0A-9E92-496007A45D48}" type="pres">
       <dgm:prSet presAssocID="{EBAC00E8-AD22-49D1-A406-8557910A263D}" presName="tx2" presStyleLbl="revTx" presStyleIdx="1" presStyleCnt="7"/>
       <dgm:spPr/>
+      <dgm:t>
+        <a:bodyPr/>
+        <a:lstStyle/>
+        <a:p>
+          <a:endParaRPr lang="de-DE"/>
+        </a:p>
+      </dgm:t>
     </dgm:pt>
     <dgm:pt modelId="{D1887BCF-44C5-4017-A6FA-378115C89950}" type="pres">
       <dgm:prSet presAssocID="{EBAC00E8-AD22-49D1-A406-8557910A263D}" presName="vert2" presStyleCnt="0"/>
@@ -2083,6 +2104,13 @@
     <dgm:pt modelId="{B59BED8F-2E92-459B-946F-F8F67E0A26E2}" type="pres">
       <dgm:prSet presAssocID="{FE210EA8-9E36-4661-A004-AD95A93117EF}" presName="tx2" presStyleLbl="revTx" presStyleIdx="2" presStyleCnt="7"/>
       <dgm:spPr/>
+      <dgm:t>
+        <a:bodyPr/>
+        <a:lstStyle/>
+        <a:p>
+          <a:endParaRPr lang="de-DE"/>
+        </a:p>
+      </dgm:t>
     </dgm:pt>
     <dgm:pt modelId="{B057961F-C453-4359-94A1-23AED4D65FA3}" type="pres">
       <dgm:prSet presAssocID="{FE210EA8-9E36-4661-A004-AD95A93117EF}" presName="vert2" presStyleCnt="0"/>
@@ -2107,6 +2135,13 @@
     <dgm:pt modelId="{BFE0CF65-F27D-47F8-9D70-A9026C57CB17}" type="pres">
       <dgm:prSet presAssocID="{D19C3654-EC85-4D17-8A65-476C8BCED155}" presName="tx2" presStyleLbl="revTx" presStyleIdx="3" presStyleCnt="7"/>
       <dgm:spPr/>
+      <dgm:t>
+        <a:bodyPr/>
+        <a:lstStyle/>
+        <a:p>
+          <a:endParaRPr lang="de-DE"/>
+        </a:p>
+      </dgm:t>
     </dgm:pt>
     <dgm:pt modelId="{E88A3061-B083-4367-934A-2905725E1822}" type="pres">
       <dgm:prSet presAssocID="{D19C3654-EC85-4D17-8A65-476C8BCED155}" presName="vert2" presStyleCnt="0"/>
@@ -2131,6 +2166,13 @@
     <dgm:pt modelId="{99DFEC6A-F643-4B07-8618-867DBF955F82}" type="pres">
       <dgm:prSet presAssocID="{2133CF33-4E5C-4D91-A00C-CCB6369CC28D}" presName="tx2" presStyleLbl="revTx" presStyleIdx="4" presStyleCnt="7"/>
       <dgm:spPr/>
+      <dgm:t>
+        <a:bodyPr/>
+        <a:lstStyle/>
+        <a:p>
+          <a:endParaRPr lang="de-DE"/>
+        </a:p>
+      </dgm:t>
     </dgm:pt>
     <dgm:pt modelId="{4600DCBA-8F73-44F7-8F8A-2F71ED11F418}" type="pres">
       <dgm:prSet presAssocID="{2133CF33-4E5C-4D91-A00C-CCB6369CC28D}" presName="vert2" presStyleCnt="0"/>
@@ -2155,6 +2197,13 @@
     <dgm:pt modelId="{1F40FA49-3CA3-4E6F-8033-33616EC3A9A1}" type="pres">
       <dgm:prSet presAssocID="{72E01D4A-CC17-466A-AD45-D5D735EB8271}" presName="tx2" presStyleLbl="revTx" presStyleIdx="5" presStyleCnt="7"/>
       <dgm:spPr/>
+      <dgm:t>
+        <a:bodyPr/>
+        <a:lstStyle/>
+        <a:p>
+          <a:endParaRPr lang="de-DE"/>
+        </a:p>
+      </dgm:t>
     </dgm:pt>
     <dgm:pt modelId="{C32D0722-6556-4E98-93DF-831A82A45078}" type="pres">
       <dgm:prSet presAssocID="{72E01D4A-CC17-466A-AD45-D5D735EB8271}" presName="vert2" presStyleCnt="0"/>
@@ -2179,6 +2228,13 @@
     <dgm:pt modelId="{59E07A22-84B7-47CE-803B-AD1E4127ABD0}" type="pres">
       <dgm:prSet presAssocID="{D04B8673-CF3C-4249-8FC0-37430591706B}" presName="tx2" presStyleLbl="revTx" presStyleIdx="6" presStyleCnt="7"/>
       <dgm:spPr/>
+      <dgm:t>
+        <a:bodyPr/>
+        <a:lstStyle/>
+        <a:p>
+          <a:endParaRPr lang="de-DE"/>
+        </a:p>
+      </dgm:t>
     </dgm:pt>
     <dgm:pt modelId="{2133767D-27FC-4287-AC84-7C6EA5286D3E}" type="pres">
       <dgm:prSet presAssocID="{D04B8673-CF3C-4249-8FC0-37430591706B}" presName="vert2" presStyleCnt="0"/>
@@ -2194,21 +2250,21 @@
     </dgm:pt>
   </dgm:ptLst>
   <dgm:cxnLst>
+    <dgm:cxn modelId="{9CBCB46E-ED88-4C20-852C-D8FDF6CAB28E}" srcId="{C0E8203B-5169-4CD6-9702-53FE3A38D4B7}" destId="{D04B8673-CF3C-4249-8FC0-37430591706B}" srcOrd="5" destOrd="0" parTransId="{AD28C86C-54AE-47C8-A0F9-5BCFA576A240}" sibTransId="{8038754E-B726-4859-9C89-A6BEC7CE1930}"/>
+    <dgm:cxn modelId="{7B3DC829-8965-4F76-AECF-2D49CE626B61}" srcId="{C0E8203B-5169-4CD6-9702-53FE3A38D4B7}" destId="{EBAC00E8-AD22-49D1-A406-8557910A263D}" srcOrd="0" destOrd="0" parTransId="{C995157E-B4AB-4871-B74C-615D6B76C504}" sibTransId="{BE83C256-8C93-401C-901D-4ADDB015BA2A}"/>
+    <dgm:cxn modelId="{5E364358-14E0-4092-8929-4F3402F69850}" type="presOf" srcId="{72E01D4A-CC17-466A-AD45-D5D735EB8271}" destId="{1F40FA49-3CA3-4E6F-8033-33616EC3A9A1}" srcOrd="0" destOrd="0" presId="urn:microsoft.com/office/officeart/2008/layout/LinedList"/>
+    <dgm:cxn modelId="{59CC2AF2-9600-4719-9E87-65990007BF3B}" srcId="{04A85023-219B-4479-836B-DCFBBAF58EB0}" destId="{C0E8203B-5169-4CD6-9702-53FE3A38D4B7}" srcOrd="0" destOrd="0" parTransId="{8770659B-25EF-42F8-BE17-875FAC9CE592}" sibTransId="{CDBEC1E2-C9D1-414C-B88A-41059C37FCC9}"/>
+    <dgm:cxn modelId="{E8BB7D19-2D6A-40DA-84F8-B5D6D86E4356}" srcId="{C0E8203B-5169-4CD6-9702-53FE3A38D4B7}" destId="{D19C3654-EC85-4D17-8A65-476C8BCED155}" srcOrd="2" destOrd="0" parTransId="{8E751289-9790-49EB-8039-CA4E92FB1665}" sibTransId="{67D87B0F-7D65-41BE-9F23-1E80F104C8AA}"/>
+    <dgm:cxn modelId="{EB9CC432-DA39-4291-AB50-78FBF72479CA}" type="presOf" srcId="{FE210EA8-9E36-4661-A004-AD95A93117EF}" destId="{B59BED8F-2E92-459B-946F-F8F67E0A26E2}" srcOrd="0" destOrd="0" presId="urn:microsoft.com/office/officeart/2008/layout/LinedList"/>
+    <dgm:cxn modelId="{275AB8D9-6619-4ED2-90D6-FCBDF3928AF1}" type="presOf" srcId="{04A85023-219B-4479-836B-DCFBBAF58EB0}" destId="{B744569E-E8A0-4E64-B94C-6B504028F814}" srcOrd="0" destOrd="0" presId="urn:microsoft.com/office/officeart/2008/layout/LinedList"/>
+    <dgm:cxn modelId="{4704D666-A624-430D-89C9-99FA2F41F4CC}" srcId="{C0E8203B-5169-4CD6-9702-53FE3A38D4B7}" destId="{2133CF33-4E5C-4D91-A00C-CCB6369CC28D}" srcOrd="3" destOrd="0" parTransId="{7EBDF186-8A9C-47EC-B82A-4AB55E36C37B}" sibTransId="{638DB0BF-FEBB-4515-97C0-0154376529D8}"/>
+    <dgm:cxn modelId="{1401745F-0965-48CD-85E8-3D578D914F4B}" type="presOf" srcId="{2133CF33-4E5C-4D91-A00C-CCB6369CC28D}" destId="{99DFEC6A-F643-4B07-8618-867DBF955F82}" srcOrd="0" destOrd="0" presId="urn:microsoft.com/office/officeart/2008/layout/LinedList"/>
+    <dgm:cxn modelId="{EA48023D-6DF6-4BFE-A9E1-89EE821FE651}" srcId="{C0E8203B-5169-4CD6-9702-53FE3A38D4B7}" destId="{72E01D4A-CC17-466A-AD45-D5D735EB8271}" srcOrd="4" destOrd="0" parTransId="{781495FD-B9D5-4FB9-B8EB-140BA60FE3A7}" sibTransId="{E63E57BD-5A7C-4D12-8A39-98F806CDABCA}"/>
+    <dgm:cxn modelId="{B107EB98-0D15-4C3E-BCD9-74B999BB9B5B}" type="presOf" srcId="{D04B8673-CF3C-4249-8FC0-37430591706B}" destId="{59E07A22-84B7-47CE-803B-AD1E4127ABD0}" srcOrd="0" destOrd="0" presId="urn:microsoft.com/office/officeart/2008/layout/LinedList"/>
+    <dgm:cxn modelId="{2732C65E-EBE0-429A-B44E-32A3D0242CB8}" srcId="{C0E8203B-5169-4CD6-9702-53FE3A38D4B7}" destId="{FE210EA8-9E36-4661-A004-AD95A93117EF}" srcOrd="1" destOrd="0" parTransId="{0F3A3B59-86B4-454E-A1AA-459B903C5A6E}" sibTransId="{CCD9615C-3035-460A-A4F3-54D8AA770FA2}"/>
     <dgm:cxn modelId="{4D15FD03-2980-4536-85E0-A4B5F951E9D3}" type="presOf" srcId="{D19C3654-EC85-4D17-8A65-476C8BCED155}" destId="{BFE0CF65-F27D-47F8-9D70-A9026C57CB17}" srcOrd="0" destOrd="0" presId="urn:microsoft.com/office/officeart/2008/layout/LinedList"/>
-    <dgm:cxn modelId="{E8BB7D19-2D6A-40DA-84F8-B5D6D86E4356}" srcId="{C0E8203B-5169-4CD6-9702-53FE3A38D4B7}" destId="{D19C3654-EC85-4D17-8A65-476C8BCED155}" srcOrd="2" destOrd="0" parTransId="{8E751289-9790-49EB-8039-CA4E92FB1665}" sibTransId="{67D87B0F-7D65-41BE-9F23-1E80F104C8AA}"/>
+    <dgm:cxn modelId="{E148CD2D-7C89-45E8-9322-F62594E1D71A}" type="presOf" srcId="{C0E8203B-5169-4CD6-9702-53FE3A38D4B7}" destId="{55250350-E17F-4CB6-83BA-1D4FE4D0BB7B}" srcOrd="0" destOrd="0" presId="urn:microsoft.com/office/officeart/2008/layout/LinedList"/>
     <dgm:cxn modelId="{FE9C151E-542E-4BAC-8771-AE334A43F846}" type="presOf" srcId="{EBAC00E8-AD22-49D1-A406-8557910A263D}" destId="{A4F65490-42AA-4A0A-9E92-496007A45D48}" srcOrd="0" destOrd="0" presId="urn:microsoft.com/office/officeart/2008/layout/LinedList"/>
-    <dgm:cxn modelId="{7B3DC829-8965-4F76-AECF-2D49CE626B61}" srcId="{C0E8203B-5169-4CD6-9702-53FE3A38D4B7}" destId="{EBAC00E8-AD22-49D1-A406-8557910A263D}" srcOrd="0" destOrd="0" parTransId="{C995157E-B4AB-4871-B74C-615D6B76C504}" sibTransId="{BE83C256-8C93-401C-901D-4ADDB015BA2A}"/>
-    <dgm:cxn modelId="{E148CD2D-7C89-45E8-9322-F62594E1D71A}" type="presOf" srcId="{C0E8203B-5169-4CD6-9702-53FE3A38D4B7}" destId="{55250350-E17F-4CB6-83BA-1D4FE4D0BB7B}" srcOrd="0" destOrd="0" presId="urn:microsoft.com/office/officeart/2008/layout/LinedList"/>
-    <dgm:cxn modelId="{EB9CC432-DA39-4291-AB50-78FBF72479CA}" type="presOf" srcId="{FE210EA8-9E36-4661-A004-AD95A93117EF}" destId="{B59BED8F-2E92-459B-946F-F8F67E0A26E2}" srcOrd="0" destOrd="0" presId="urn:microsoft.com/office/officeart/2008/layout/LinedList"/>
-    <dgm:cxn modelId="{EA48023D-6DF6-4BFE-A9E1-89EE821FE651}" srcId="{C0E8203B-5169-4CD6-9702-53FE3A38D4B7}" destId="{72E01D4A-CC17-466A-AD45-D5D735EB8271}" srcOrd="4" destOrd="0" parTransId="{781495FD-B9D5-4FB9-B8EB-140BA60FE3A7}" sibTransId="{E63E57BD-5A7C-4D12-8A39-98F806CDABCA}"/>
-    <dgm:cxn modelId="{2732C65E-EBE0-429A-B44E-32A3D0242CB8}" srcId="{C0E8203B-5169-4CD6-9702-53FE3A38D4B7}" destId="{FE210EA8-9E36-4661-A004-AD95A93117EF}" srcOrd="1" destOrd="0" parTransId="{0F3A3B59-86B4-454E-A1AA-459B903C5A6E}" sibTransId="{CCD9615C-3035-460A-A4F3-54D8AA770FA2}"/>
-    <dgm:cxn modelId="{1401745F-0965-48CD-85E8-3D578D914F4B}" type="presOf" srcId="{2133CF33-4E5C-4D91-A00C-CCB6369CC28D}" destId="{99DFEC6A-F643-4B07-8618-867DBF955F82}" srcOrd="0" destOrd="0" presId="urn:microsoft.com/office/officeart/2008/layout/LinedList"/>
-    <dgm:cxn modelId="{4704D666-A624-430D-89C9-99FA2F41F4CC}" srcId="{C0E8203B-5169-4CD6-9702-53FE3A38D4B7}" destId="{2133CF33-4E5C-4D91-A00C-CCB6369CC28D}" srcOrd="3" destOrd="0" parTransId="{7EBDF186-8A9C-47EC-B82A-4AB55E36C37B}" sibTransId="{638DB0BF-FEBB-4515-97C0-0154376529D8}"/>
-    <dgm:cxn modelId="{9CBCB46E-ED88-4C20-852C-D8FDF6CAB28E}" srcId="{C0E8203B-5169-4CD6-9702-53FE3A38D4B7}" destId="{D04B8673-CF3C-4249-8FC0-37430591706B}" srcOrd="5" destOrd="0" parTransId="{AD28C86C-54AE-47C8-A0F9-5BCFA576A240}" sibTransId="{8038754E-B726-4859-9C89-A6BEC7CE1930}"/>
-    <dgm:cxn modelId="{5E364358-14E0-4092-8929-4F3402F69850}" type="presOf" srcId="{72E01D4A-CC17-466A-AD45-D5D735EB8271}" destId="{1F40FA49-3CA3-4E6F-8033-33616EC3A9A1}" srcOrd="0" destOrd="0" presId="urn:microsoft.com/office/officeart/2008/layout/LinedList"/>
-    <dgm:cxn modelId="{B107EB98-0D15-4C3E-BCD9-74B999BB9B5B}" type="presOf" srcId="{D04B8673-CF3C-4249-8FC0-37430591706B}" destId="{59E07A22-84B7-47CE-803B-AD1E4127ABD0}" srcOrd="0" destOrd="0" presId="urn:microsoft.com/office/officeart/2008/layout/LinedList"/>
-    <dgm:cxn modelId="{275AB8D9-6619-4ED2-90D6-FCBDF3928AF1}" type="presOf" srcId="{04A85023-219B-4479-836B-DCFBBAF58EB0}" destId="{B744569E-E8A0-4E64-B94C-6B504028F814}" srcOrd="0" destOrd="0" presId="urn:microsoft.com/office/officeart/2008/layout/LinedList"/>
-    <dgm:cxn modelId="{59CC2AF2-9600-4719-9E87-65990007BF3B}" srcId="{04A85023-219B-4479-836B-DCFBBAF58EB0}" destId="{C0E8203B-5169-4CD6-9702-53FE3A38D4B7}" srcOrd="0" destOrd="0" parTransId="{8770659B-25EF-42F8-BE17-875FAC9CE592}" sibTransId="{CDBEC1E2-C9D1-414C-B88A-41059C37FCC9}"/>
     <dgm:cxn modelId="{DD60E0E0-85F3-47CC-96CB-12BDD19A49A9}" type="presParOf" srcId="{B744569E-E8A0-4E64-B94C-6B504028F814}" destId="{9C1D2CB9-94B3-4BB4-AD6E-339F612D3E51}" srcOrd="0" destOrd="0" presId="urn:microsoft.com/office/officeart/2008/layout/LinedList"/>
     <dgm:cxn modelId="{6DE242E6-B0A4-4FF3-82A3-9156D4B0F723}" type="presParOf" srcId="{B744569E-E8A0-4E64-B94C-6B504028F814}" destId="{2B4DD2A1-FF06-4C7F-A2B7-CD5206942EC1}" srcOrd="1" destOrd="0" presId="urn:microsoft.com/office/officeart/2008/layout/LinedList"/>
     <dgm:cxn modelId="{CFDCCB83-288B-4E3B-9B1C-A9BE9888EBE2}" type="presParOf" srcId="{2B4DD2A1-FF06-4C7F-A2B7-CD5206942EC1}" destId="{55250350-E17F-4CB6-83BA-1D4FE4D0BB7B}" srcOrd="0" destOrd="0" presId="urn:microsoft.com/office/officeart/2008/layout/LinedList"/>
@@ -2255,7 +2311,7 @@
   <dgm:whole/>
   <dgm:extLst>
     <a:ext uri="http://schemas.microsoft.com/office/drawing/2008/diagram">
-      <dsp:dataModelExt xmlns:dsp="http://schemas.microsoft.com/office/drawing/2008/diagram" relId="rId6" minVer="http://schemas.openxmlformats.org/drawingml/2006/diagram"/>
+      <dsp:dataModelExt xmlns:dsp="http://schemas.microsoft.com/office/drawing/2008/diagram" xmlns="" relId="rId6" minVer="http://schemas.openxmlformats.org/drawingml/2006/diagram"/>
     </a:ext>
   </dgm:extLst>
 </dgm:dataModel>
@@ -2477,6 +2533,13 @@
         </dgm:presLayoutVars>
       </dgm:prSet>
       <dgm:spPr/>
+      <dgm:t>
+        <a:bodyPr/>
+        <a:lstStyle/>
+        <a:p>
+          <a:endParaRPr lang="de-DE"/>
+        </a:p>
+      </dgm:t>
     </dgm:pt>
     <dgm:pt modelId="{87B7C387-3A56-4349-9EE0-D15265E7957D}" type="pres">
       <dgm:prSet presAssocID="{CC21F494-BAA2-47FE-B6A1-19AB0C0C95ED}" presName="thickLine" presStyleLbl="alignNode1" presStyleIdx="0" presStyleCnt="1"/>
@@ -2489,6 +2552,13 @@
     <dgm:pt modelId="{0FD6BB48-29D0-498E-BAB0-9759B4FDBA26}" type="pres">
       <dgm:prSet presAssocID="{CC21F494-BAA2-47FE-B6A1-19AB0C0C95ED}" presName="tx1" presStyleLbl="revTx" presStyleIdx="0" presStyleCnt="5"/>
       <dgm:spPr/>
+      <dgm:t>
+        <a:bodyPr/>
+        <a:lstStyle/>
+        <a:p>
+          <a:endParaRPr lang="de-DE"/>
+        </a:p>
+      </dgm:t>
     </dgm:pt>
     <dgm:pt modelId="{07E10C9D-1B5C-45BC-9F8F-081DF2E7CA90}" type="pres">
       <dgm:prSet presAssocID="{CC21F494-BAA2-47FE-B6A1-19AB0C0C95ED}" presName="vert1" presStyleCnt="0"/>
@@ -2509,6 +2579,13 @@
     <dgm:pt modelId="{2748B678-8B77-4486-9221-D7AD8CD82137}" type="pres">
       <dgm:prSet presAssocID="{9695DA26-C5CE-4563-AA4D-1933F040E226}" presName="tx2" presStyleLbl="revTx" presStyleIdx="1" presStyleCnt="5"/>
       <dgm:spPr/>
+      <dgm:t>
+        <a:bodyPr/>
+        <a:lstStyle/>
+        <a:p>
+          <a:endParaRPr lang="de-DE"/>
+        </a:p>
+      </dgm:t>
     </dgm:pt>
     <dgm:pt modelId="{DF02CF00-2657-4208-B8EB-9989F59FDCAC}" type="pres">
       <dgm:prSet presAssocID="{9695DA26-C5CE-4563-AA4D-1933F040E226}" presName="vert2" presStyleCnt="0"/>
@@ -2533,6 +2610,13 @@
     <dgm:pt modelId="{9E044F2B-C117-4322-B20F-1D7277F2451D}" type="pres">
       <dgm:prSet presAssocID="{BC354689-7573-41A5-99A7-FB220FD47960}" presName="tx2" presStyleLbl="revTx" presStyleIdx="2" presStyleCnt="5"/>
       <dgm:spPr/>
+      <dgm:t>
+        <a:bodyPr/>
+        <a:lstStyle/>
+        <a:p>
+          <a:endParaRPr lang="de-DE"/>
+        </a:p>
+      </dgm:t>
     </dgm:pt>
     <dgm:pt modelId="{BCAAC597-CED9-46FD-AC59-C25586E29413}" type="pres">
       <dgm:prSet presAssocID="{BC354689-7573-41A5-99A7-FB220FD47960}" presName="vert2" presStyleCnt="0"/>
@@ -2557,6 +2641,13 @@
     <dgm:pt modelId="{2135EF6E-EFA6-41B5-979F-9A2D3CB1FD26}" type="pres">
       <dgm:prSet presAssocID="{12966170-2A97-4B94-A4A8-4FBFC521FF80}" presName="tx2" presStyleLbl="revTx" presStyleIdx="3" presStyleCnt="5"/>
       <dgm:spPr/>
+      <dgm:t>
+        <a:bodyPr/>
+        <a:lstStyle/>
+        <a:p>
+          <a:endParaRPr lang="de-DE"/>
+        </a:p>
+      </dgm:t>
     </dgm:pt>
     <dgm:pt modelId="{9B83E98C-DAFF-4783-B1D1-126D1FCE5AE0}" type="pres">
       <dgm:prSet presAssocID="{12966170-2A97-4B94-A4A8-4FBFC521FF80}" presName="vert2" presStyleCnt="0"/>
@@ -2581,6 +2672,13 @@
     <dgm:pt modelId="{99B4E6DD-6B66-4412-89C6-9350E2D1D32C}" type="pres">
       <dgm:prSet presAssocID="{C6E2C73E-E40C-447D-8663-EAB5B9C40124}" presName="tx2" presStyleLbl="revTx" presStyleIdx="4" presStyleCnt="5"/>
       <dgm:spPr/>
+      <dgm:t>
+        <a:bodyPr/>
+        <a:lstStyle/>
+        <a:p>
+          <a:endParaRPr lang="de-DE"/>
+        </a:p>
+      </dgm:t>
     </dgm:pt>
     <dgm:pt modelId="{8D0BDB98-1B5C-4A58-8B76-A4D5D5818353}" type="pres">
       <dgm:prSet presAssocID="{C6E2C73E-E40C-447D-8663-EAB5B9C40124}" presName="vert2" presStyleCnt="0"/>
@@ -2596,17 +2694,17 @@
     </dgm:pt>
   </dgm:ptLst>
   <dgm:cxnLst>
-    <dgm:cxn modelId="{9A6F8306-535B-48F8-B6DE-774CE0A263BC}" type="presOf" srcId="{12966170-2A97-4B94-A4A8-4FBFC521FF80}" destId="{2135EF6E-EFA6-41B5-979F-9A2D3CB1FD26}" srcOrd="0" destOrd="0" presId="urn:microsoft.com/office/officeart/2008/layout/LinedList"/>
+    <dgm:cxn modelId="{694C24C9-293F-44AC-8D46-C0C63198B23F}" type="presOf" srcId="{CF9D0527-0BA1-4294-9D0E-5E87E70E9558}" destId="{4021A4CB-A016-4309-8003-441B4765E50D}" srcOrd="0" destOrd="0" presId="urn:microsoft.com/office/officeart/2008/layout/LinedList"/>
+    <dgm:cxn modelId="{7C802E8D-933B-41A8-BCE0-61BE606423AD}" srcId="{CC21F494-BAA2-47FE-B6A1-19AB0C0C95ED}" destId="{C6E2C73E-E40C-447D-8663-EAB5B9C40124}" srcOrd="3" destOrd="0" parTransId="{EDC914D5-FC8E-4C9F-B6F4-B88EDF977117}" sibTransId="{BFFC85B7-D0EA-4AB1-9549-23491F0E1572}"/>
+    <dgm:cxn modelId="{5465E1B3-ADD6-43DD-A61B-79058F09657E}" type="presOf" srcId="{C6E2C73E-E40C-447D-8663-EAB5B9C40124}" destId="{99B4E6DD-6B66-4412-89C6-9350E2D1D32C}" srcOrd="0" destOrd="0" presId="urn:microsoft.com/office/officeart/2008/layout/LinedList"/>
+    <dgm:cxn modelId="{6BF77972-60CB-4A1A-A027-B30AB9D5C9BD}" srcId="{CC21F494-BAA2-47FE-B6A1-19AB0C0C95ED}" destId="{12966170-2A97-4B94-A4A8-4FBFC521FF80}" srcOrd="2" destOrd="0" parTransId="{C7A5748F-D124-47B1-91B4-510BC09651AE}" sibTransId="{296ED114-D69C-48FA-A452-A8BFB2FCDEC2}"/>
+    <dgm:cxn modelId="{8B63603B-F12D-4664-8E61-20141215B6FF}" type="presOf" srcId="{CC21F494-BAA2-47FE-B6A1-19AB0C0C95ED}" destId="{0FD6BB48-29D0-498E-BAB0-9759B4FDBA26}" srcOrd="0" destOrd="0" presId="urn:microsoft.com/office/officeart/2008/layout/LinedList"/>
+    <dgm:cxn modelId="{8E431D6E-A647-4F19-BEC2-FCED9BA8D043}" type="presOf" srcId="{BC354689-7573-41A5-99A7-FB220FD47960}" destId="{9E044F2B-C117-4322-B20F-1D7277F2451D}" srcOrd="0" destOrd="0" presId="urn:microsoft.com/office/officeart/2008/layout/LinedList"/>
     <dgm:cxn modelId="{B9A0A92A-6332-41A1-958E-AF86BA2A641C}" srcId="{CF9D0527-0BA1-4294-9D0E-5E87E70E9558}" destId="{CC21F494-BAA2-47FE-B6A1-19AB0C0C95ED}" srcOrd="0" destOrd="0" parTransId="{C0166FF6-D35A-4AD5-935A-F5E6D4E80BEF}" sibTransId="{28D9E21F-8714-45DE-B8A4-DF9BAA0CE5F6}"/>
     <dgm:cxn modelId="{9A1F7A3A-4E51-437F-BF7F-179C7C940B99}" srcId="{CC21F494-BAA2-47FE-B6A1-19AB0C0C95ED}" destId="{9695DA26-C5CE-4563-AA4D-1933F040E226}" srcOrd="0" destOrd="0" parTransId="{FABE37EB-A981-4F3D-98EF-DBF3933E5E49}" sibTransId="{5B3DBAC2-87C4-4A2F-8841-E177241B909E}"/>
-    <dgm:cxn modelId="{8B63603B-F12D-4664-8E61-20141215B6FF}" type="presOf" srcId="{CC21F494-BAA2-47FE-B6A1-19AB0C0C95ED}" destId="{0FD6BB48-29D0-498E-BAB0-9759B4FDBA26}" srcOrd="0" destOrd="0" presId="urn:microsoft.com/office/officeart/2008/layout/LinedList"/>
+    <dgm:cxn modelId="{61F6D0B1-DF69-4F7D-8767-7539A800AAA1}" srcId="{CC21F494-BAA2-47FE-B6A1-19AB0C0C95ED}" destId="{BC354689-7573-41A5-99A7-FB220FD47960}" srcOrd="1" destOrd="0" parTransId="{DC74516C-AF05-49B6-ACB8-D5EBB2DA2FC3}" sibTransId="{A31DBC45-B7DF-4375-A782-EE39AB23EC79}"/>
+    <dgm:cxn modelId="{9A6F8306-535B-48F8-B6DE-774CE0A263BC}" type="presOf" srcId="{12966170-2A97-4B94-A4A8-4FBFC521FF80}" destId="{2135EF6E-EFA6-41B5-979F-9A2D3CB1FD26}" srcOrd="0" destOrd="0" presId="urn:microsoft.com/office/officeart/2008/layout/LinedList"/>
     <dgm:cxn modelId="{D55D0F61-7E12-4645-8DF1-9B29A1EAA879}" type="presOf" srcId="{9695DA26-C5CE-4563-AA4D-1933F040E226}" destId="{2748B678-8B77-4486-9221-D7AD8CD82137}" srcOrd="0" destOrd="0" presId="urn:microsoft.com/office/officeart/2008/layout/LinedList"/>
-    <dgm:cxn modelId="{8E431D6E-A647-4F19-BEC2-FCED9BA8D043}" type="presOf" srcId="{BC354689-7573-41A5-99A7-FB220FD47960}" destId="{9E044F2B-C117-4322-B20F-1D7277F2451D}" srcOrd="0" destOrd="0" presId="urn:microsoft.com/office/officeart/2008/layout/LinedList"/>
-    <dgm:cxn modelId="{6BF77972-60CB-4A1A-A027-B30AB9D5C9BD}" srcId="{CC21F494-BAA2-47FE-B6A1-19AB0C0C95ED}" destId="{12966170-2A97-4B94-A4A8-4FBFC521FF80}" srcOrd="2" destOrd="0" parTransId="{C7A5748F-D124-47B1-91B4-510BC09651AE}" sibTransId="{296ED114-D69C-48FA-A452-A8BFB2FCDEC2}"/>
-    <dgm:cxn modelId="{7C802E8D-933B-41A8-BCE0-61BE606423AD}" srcId="{CC21F494-BAA2-47FE-B6A1-19AB0C0C95ED}" destId="{C6E2C73E-E40C-447D-8663-EAB5B9C40124}" srcOrd="3" destOrd="0" parTransId="{EDC914D5-FC8E-4C9F-B6F4-B88EDF977117}" sibTransId="{BFFC85B7-D0EA-4AB1-9549-23491F0E1572}"/>
-    <dgm:cxn modelId="{61F6D0B1-DF69-4F7D-8767-7539A800AAA1}" srcId="{CC21F494-BAA2-47FE-B6A1-19AB0C0C95ED}" destId="{BC354689-7573-41A5-99A7-FB220FD47960}" srcOrd="1" destOrd="0" parTransId="{DC74516C-AF05-49B6-ACB8-D5EBB2DA2FC3}" sibTransId="{A31DBC45-B7DF-4375-A782-EE39AB23EC79}"/>
-    <dgm:cxn modelId="{5465E1B3-ADD6-43DD-A61B-79058F09657E}" type="presOf" srcId="{C6E2C73E-E40C-447D-8663-EAB5B9C40124}" destId="{99B4E6DD-6B66-4412-89C6-9350E2D1D32C}" srcOrd="0" destOrd="0" presId="urn:microsoft.com/office/officeart/2008/layout/LinedList"/>
-    <dgm:cxn modelId="{694C24C9-293F-44AC-8D46-C0C63198B23F}" type="presOf" srcId="{CF9D0527-0BA1-4294-9D0E-5E87E70E9558}" destId="{4021A4CB-A016-4309-8003-441B4765E50D}" srcOrd="0" destOrd="0" presId="urn:microsoft.com/office/officeart/2008/layout/LinedList"/>
     <dgm:cxn modelId="{6E554199-CF4F-4A56-AA4E-BD37105C5ECF}" type="presParOf" srcId="{4021A4CB-A016-4309-8003-441B4765E50D}" destId="{87B7C387-3A56-4349-9EE0-D15265E7957D}" srcOrd="0" destOrd="0" presId="urn:microsoft.com/office/officeart/2008/layout/LinedList"/>
     <dgm:cxn modelId="{A73F0C02-1F3C-4AB3-913F-91C809EF5D5A}" type="presParOf" srcId="{4021A4CB-A016-4309-8003-441B4765E50D}" destId="{99634468-7D2F-4032-97A6-1EC37ECEEF49}" srcOrd="1" destOrd="0" presId="urn:microsoft.com/office/officeart/2008/layout/LinedList"/>
     <dgm:cxn modelId="{5F416445-C114-474B-A6F3-6C42262474EA}" type="presParOf" srcId="{99634468-7D2F-4032-97A6-1EC37ECEEF49}" destId="{0FD6BB48-29D0-498E-BAB0-9759B4FDBA26}" srcOrd="0" destOrd="0" presId="urn:microsoft.com/office/officeart/2008/layout/LinedList"/>
@@ -2641,14 +2739,14 @@
   <dgm:whole/>
   <dgm:extLst>
     <a:ext uri="http://schemas.microsoft.com/office/drawing/2008/diagram">
-      <dsp:dataModelExt xmlns:dsp="http://schemas.microsoft.com/office/drawing/2008/diagram" relId="rId6" minVer="http://schemas.openxmlformats.org/drawingml/2006/diagram"/>
+      <dsp:dataModelExt xmlns:dsp="http://schemas.microsoft.com/office/drawing/2008/diagram" xmlns="" relId="rId6" minVer="http://schemas.openxmlformats.org/drawingml/2006/diagram"/>
     </a:ext>
   </dgm:extLst>
 </dgm:dataModel>
 </file>
 
 <file path=ppt/diagrams/drawing1.xml><?xml version="1.0" encoding="utf-8"?>
-<dsp:drawing xmlns:dgm="http://schemas.openxmlformats.org/drawingml/2006/diagram" xmlns:dsp="http://schemas.microsoft.com/office/drawing/2008/diagram" xmlns:a="http://schemas.openxmlformats.org/drawingml/2006/main">
+<dsp:drawing xmlns:dgm="http://schemas.openxmlformats.org/drawingml/2006/diagram" xmlns:a="http://schemas.openxmlformats.org/drawingml/2006/main" xmlns:dsp="http://schemas.microsoft.com/office/drawing/2008/diagram">
   <dsp:spTree>
     <dsp:nvGrpSpPr>
       <dsp:cNvPr id="0" name=""/>
@@ -2741,7 +2839,7 @@
         </a:bodyPr>
         <a:lstStyle/>
         <a:p>
-          <a:pPr marL="0" lvl="0" indent="0" algn="l" defTabSz="1422400">
+          <a:pPr lvl="0" algn="l" defTabSz="1422400">
             <a:lnSpc>
               <a:spcPct val="90000"/>
             </a:lnSpc>
@@ -2751,7 +2849,6 @@
             <a:spcAft>
               <a:spcPct val="35000"/>
             </a:spcAft>
-            <a:buNone/>
           </a:pPr>
           <a:r>
             <a:rPr lang="de-DE" sz="3200" kern="1200" dirty="0" err="1"/>
@@ -2806,7 +2903,7 @@
         </a:bodyPr>
         <a:lstStyle/>
         <a:p>
-          <a:pPr marL="0" lvl="0" indent="0" algn="l" defTabSz="889000">
+          <a:pPr lvl="0" algn="l" defTabSz="889000">
             <a:lnSpc>
               <a:spcPct val="90000"/>
             </a:lnSpc>
@@ -2816,7 +2913,6 @@
             <a:spcAft>
               <a:spcPct val="35000"/>
             </a:spcAft>
-            <a:buNone/>
           </a:pPr>
           <a:r>
             <a:rPr lang="en-US" sz="2000" kern="1200" dirty="0"/>
@@ -2914,7 +3010,7 @@
         </a:bodyPr>
         <a:lstStyle/>
         <a:p>
-          <a:pPr marL="0" lvl="0" indent="0" algn="l" defTabSz="889000">
+          <a:pPr lvl="0" algn="l" defTabSz="889000">
             <a:lnSpc>
               <a:spcPct val="90000"/>
             </a:lnSpc>
@@ -2924,7 +3020,6 @@
             <a:spcAft>
               <a:spcPct val="35000"/>
             </a:spcAft>
-            <a:buNone/>
           </a:pPr>
           <a:r>
             <a:rPr lang="en-US" sz="2000" kern="1200" dirty="0"/>
@@ -3022,7 +3117,7 @@
         </a:bodyPr>
         <a:lstStyle/>
         <a:p>
-          <a:pPr marL="0" lvl="0" indent="0" algn="l" defTabSz="889000">
+          <a:pPr lvl="0" algn="l" defTabSz="889000">
             <a:lnSpc>
               <a:spcPct val="90000"/>
             </a:lnSpc>
@@ -3032,7 +3127,6 @@
             <a:spcAft>
               <a:spcPct val="35000"/>
             </a:spcAft>
-            <a:buNone/>
           </a:pPr>
           <a:r>
             <a:rPr lang="en-US" sz="2000" kern="1200" dirty="0"/>
@@ -3130,7 +3224,7 @@
         </a:bodyPr>
         <a:lstStyle/>
         <a:p>
-          <a:pPr marL="0" lvl="0" indent="0" algn="l" defTabSz="889000">
+          <a:pPr lvl="0" algn="l" defTabSz="889000">
             <a:lnSpc>
               <a:spcPct val="90000"/>
             </a:lnSpc>
@@ -3140,7 +3234,6 @@
             <a:spcAft>
               <a:spcPct val="35000"/>
             </a:spcAft>
-            <a:buNone/>
           </a:pPr>
           <a:r>
             <a:rPr lang="en-US" sz="2000" kern="1200" dirty="0"/>
@@ -3238,7 +3331,7 @@
         </a:bodyPr>
         <a:lstStyle/>
         <a:p>
-          <a:pPr marL="0" lvl="0" indent="0" algn="l" defTabSz="889000">
+          <a:pPr lvl="0" algn="l" defTabSz="889000">
             <a:lnSpc>
               <a:spcPct val="90000"/>
             </a:lnSpc>
@@ -3248,7 +3341,6 @@
             <a:spcAft>
               <a:spcPct val="35000"/>
             </a:spcAft>
-            <a:buNone/>
           </a:pPr>
           <a:r>
             <a:rPr lang="en-US" sz="2000" kern="1200" dirty="0"/>
@@ -3346,7 +3438,7 @@
         </a:bodyPr>
         <a:lstStyle/>
         <a:p>
-          <a:pPr marL="0" lvl="0" indent="0" algn="l" defTabSz="889000">
+          <a:pPr lvl="0" algn="l" defTabSz="889000">
             <a:lnSpc>
               <a:spcPct val="90000"/>
             </a:lnSpc>
@@ -3356,7 +3448,6 @@
             <a:spcAft>
               <a:spcPct val="35000"/>
             </a:spcAft>
-            <a:buNone/>
           </a:pPr>
           <a:r>
             <a:rPr lang="en-US" sz="2000" kern="1200" dirty="0"/>
@@ -3422,7 +3513,7 @@
 </file>
 
 <file path=ppt/diagrams/drawing2.xml><?xml version="1.0" encoding="utf-8"?>
-<dsp:drawing xmlns:dgm="http://schemas.openxmlformats.org/drawingml/2006/diagram" xmlns:dsp="http://schemas.microsoft.com/office/drawing/2008/diagram" xmlns:a="http://schemas.openxmlformats.org/drawingml/2006/main">
+<dsp:drawing xmlns:dgm="http://schemas.openxmlformats.org/drawingml/2006/diagram" xmlns:a="http://schemas.openxmlformats.org/drawingml/2006/main" xmlns:dsp="http://schemas.microsoft.com/office/drawing/2008/diagram">
   <dsp:spTree>
     <dsp:nvGrpSpPr>
       <dsp:cNvPr id="0" name=""/>
@@ -3515,7 +3606,7 @@
         </a:bodyPr>
         <a:lstStyle/>
         <a:p>
-          <a:pPr marL="0" lvl="0" indent="0" algn="l" defTabSz="1289050">
+          <a:pPr lvl="0" algn="l" defTabSz="1289050">
             <a:lnSpc>
               <a:spcPct val="90000"/>
             </a:lnSpc>
@@ -3525,7 +3616,6 @@
             <a:spcAft>
               <a:spcPct val="35000"/>
             </a:spcAft>
-            <a:buNone/>
           </a:pPr>
           <a:r>
             <a:rPr lang="de-DE" sz="2900" kern="1200" dirty="0"/>
@@ -3580,7 +3670,7 @@
         </a:bodyPr>
         <a:lstStyle/>
         <a:p>
-          <a:pPr marL="0" lvl="0" indent="0" algn="l" defTabSz="977900">
+          <a:pPr lvl="0" algn="l" defTabSz="977900">
             <a:lnSpc>
               <a:spcPct val="90000"/>
             </a:lnSpc>
@@ -3590,7 +3680,6 @@
             <a:spcAft>
               <a:spcPct val="35000"/>
             </a:spcAft>
-            <a:buNone/>
           </a:pPr>
           <a:r>
             <a:rPr lang="en-US" sz="2200" kern="1200" dirty="0"/>
@@ -3688,7 +3777,7 @@
         </a:bodyPr>
         <a:lstStyle/>
         <a:p>
-          <a:pPr marL="0" lvl="0" indent="0" algn="l" defTabSz="977900">
+          <a:pPr lvl="0" algn="l" defTabSz="977900">
             <a:lnSpc>
               <a:spcPct val="90000"/>
             </a:lnSpc>
@@ -3698,7 +3787,6 @@
             <a:spcAft>
               <a:spcPct val="35000"/>
             </a:spcAft>
-            <a:buNone/>
           </a:pPr>
           <a:r>
             <a:rPr lang="en-US" sz="2200" kern="1200" dirty="0"/>
@@ -3796,7 +3884,7 @@
         </a:bodyPr>
         <a:lstStyle/>
         <a:p>
-          <a:pPr marL="0" lvl="0" indent="0" algn="l" defTabSz="977900">
+          <a:pPr lvl="0" algn="l" defTabSz="977900">
             <a:lnSpc>
               <a:spcPct val="90000"/>
             </a:lnSpc>
@@ -3806,7 +3894,6 @@
             <a:spcAft>
               <a:spcPct val="35000"/>
             </a:spcAft>
-            <a:buNone/>
           </a:pPr>
           <a:r>
             <a:rPr lang="en-US" sz="2200" kern="1200" dirty="0"/>
@@ -3912,7 +3999,7 @@
         </a:bodyPr>
         <a:lstStyle/>
         <a:p>
-          <a:pPr marL="0" lvl="0" indent="0" algn="l" defTabSz="977900">
+          <a:pPr lvl="0" algn="l" defTabSz="977900">
             <a:lnSpc>
               <a:spcPct val="90000"/>
             </a:lnSpc>
@@ -3922,7 +4009,6 @@
             <a:spcAft>
               <a:spcPct val="35000"/>
             </a:spcAft>
-            <a:buNone/>
           </a:pPr>
           <a:r>
             <a:rPr lang="en-US" sz="2200" kern="1200" dirty="0"/>
@@ -7381,7 +7467,7 @@
     </p:spTree>
     <p:extLst>
       <p:ext uri="{BB962C8B-B14F-4D97-AF65-F5344CB8AC3E}">
-        <p14:creationId xmlns:p14="http://schemas.microsoft.com/office/powerpoint/2010/main" val="3345007041"/>
+        <p14:creationId xmlns:p14="http://schemas.microsoft.com/office/powerpoint/2010/main" xmlns="" val="3345007041"/>
       </p:ext>
     </p:extLst>
   </p:cSld>
@@ -7920,7 +8006,7 @@
     </p:spTree>
     <p:extLst>
       <p:ext uri="{BB962C8B-B14F-4D97-AF65-F5344CB8AC3E}">
-        <p14:creationId xmlns:p14="http://schemas.microsoft.com/office/powerpoint/2010/main" val="516787406"/>
+        <p14:creationId xmlns:p14="http://schemas.microsoft.com/office/powerpoint/2010/main" xmlns="" val="516787406"/>
       </p:ext>
     </p:extLst>
   </p:cSld>
@@ -8318,7 +8404,7 @@
     </p:spTree>
     <p:extLst>
       <p:ext uri="{BB962C8B-B14F-4D97-AF65-F5344CB8AC3E}">
-        <p14:creationId xmlns:p14="http://schemas.microsoft.com/office/powerpoint/2010/main" val="711907682"/>
+        <p14:creationId xmlns:p14="http://schemas.microsoft.com/office/powerpoint/2010/main" xmlns="" val="711907682"/>
       </p:ext>
     </p:extLst>
   </p:cSld>
@@ -8458,7 +8544,7 @@
     </p:spTree>
     <p:extLst>
       <p:ext uri="{BB962C8B-B14F-4D97-AF65-F5344CB8AC3E}">
-        <p14:creationId xmlns:p14="http://schemas.microsoft.com/office/powerpoint/2010/main" val="2160760500"/>
+        <p14:creationId xmlns:p14="http://schemas.microsoft.com/office/powerpoint/2010/main" xmlns="" val="2160760500"/>
       </p:ext>
     </p:extLst>
   </p:cSld>
@@ -8630,7 +8716,7 @@
     </p:spTree>
     <p:extLst>
       <p:ext uri="{BB962C8B-B14F-4D97-AF65-F5344CB8AC3E}">
-        <p14:creationId xmlns:p14="http://schemas.microsoft.com/office/powerpoint/2010/main" val="2200117069"/>
+        <p14:creationId xmlns:p14="http://schemas.microsoft.com/office/powerpoint/2010/main" xmlns="" val="2200117069"/>
       </p:ext>
     </p:extLst>
   </p:cSld>
@@ -8937,7 +9023,7 @@
     </p:spTree>
     <p:extLst>
       <p:ext uri="{BB962C8B-B14F-4D97-AF65-F5344CB8AC3E}">
-        <p14:creationId xmlns:p14="http://schemas.microsoft.com/office/powerpoint/2010/main" val="2200117069"/>
+        <p14:creationId xmlns:p14="http://schemas.microsoft.com/office/powerpoint/2010/main" xmlns="" val="2200117069"/>
       </p:ext>
     </p:extLst>
   </p:cSld>
@@ -9077,7 +9163,7 @@
     </p:spTree>
     <p:extLst>
       <p:ext uri="{BB962C8B-B14F-4D97-AF65-F5344CB8AC3E}">
-        <p14:creationId xmlns:p14="http://schemas.microsoft.com/office/powerpoint/2010/main" val="2200117069"/>
+        <p14:creationId xmlns:p14="http://schemas.microsoft.com/office/powerpoint/2010/main" xmlns="" val="2200117069"/>
       </p:ext>
     </p:extLst>
   </p:cSld>
@@ -9397,7 +9483,7 @@
     </p:spTree>
     <p:extLst>
       <p:ext uri="{BB962C8B-B14F-4D97-AF65-F5344CB8AC3E}">
-        <p14:creationId xmlns:p14="http://schemas.microsoft.com/office/powerpoint/2010/main" val="2200117069"/>
+        <p14:creationId xmlns:p14="http://schemas.microsoft.com/office/powerpoint/2010/main" xmlns="" val="2200117069"/>
       </p:ext>
     </p:extLst>
   </p:cSld>
@@ -9537,7 +9623,7 @@
     </p:spTree>
     <p:extLst>
       <p:ext uri="{BB962C8B-B14F-4D97-AF65-F5344CB8AC3E}">
-        <p14:creationId xmlns:p14="http://schemas.microsoft.com/office/powerpoint/2010/main" val="2200117069"/>
+        <p14:creationId xmlns:p14="http://schemas.microsoft.com/office/powerpoint/2010/main" xmlns="" val="2200117069"/>
       </p:ext>
     </p:extLst>
   </p:cSld>
@@ -9677,7 +9763,7 @@
     </p:spTree>
     <p:extLst>
       <p:ext uri="{BB962C8B-B14F-4D97-AF65-F5344CB8AC3E}">
-        <p14:creationId xmlns:p14="http://schemas.microsoft.com/office/powerpoint/2010/main" val="2120057942"/>
+        <p14:creationId xmlns:p14="http://schemas.microsoft.com/office/powerpoint/2010/main" xmlns="" val="2120057942"/>
       </p:ext>
     </p:extLst>
   </p:cSld>
@@ -9817,7 +9903,7 @@
     </p:spTree>
     <p:extLst>
       <p:ext uri="{BB962C8B-B14F-4D97-AF65-F5344CB8AC3E}">
-        <p14:creationId xmlns:p14="http://schemas.microsoft.com/office/powerpoint/2010/main" val="3697177154"/>
+        <p14:creationId xmlns:p14="http://schemas.microsoft.com/office/powerpoint/2010/main" xmlns="" val="3697177154"/>
       </p:ext>
     </p:extLst>
   </p:cSld>
@@ -10298,7 +10384,7 @@
           <p:cNvPr id="13" name="Picture 2" descr="small ke-icon">
             <a:extLst>
               <a:ext uri="{FF2B5EF4-FFF2-40B4-BE49-F238E27FC236}">
-                <a16:creationId xmlns:a16="http://schemas.microsoft.com/office/drawing/2014/main" id="{83854E58-1482-478C-955E-C8509C8684B6}"/>
+                <a16:creationId xmlns:a16="http://schemas.microsoft.com/office/drawing/2014/main" xmlns="" id="{83854E58-1482-478C-955E-C8509C8684B6}"/>
               </a:ext>
             </a:extLst>
           </p:cNvPr>
@@ -10311,7 +10397,7 @@
           <a:blip r:embed="rId3" cstate="print">
             <a:extLst>
               <a:ext uri="{28A0092B-C50C-407E-A947-70E740481C1C}">
-                <a14:useLocalDpi xmlns:a14="http://schemas.microsoft.com/office/drawing/2010/main" val="0"/>
+                <a14:useLocalDpi xmlns:a14="http://schemas.microsoft.com/office/drawing/2010/main" xmlns="" val="0"/>
               </a:ext>
             </a:extLst>
           </a:blip>
@@ -10331,7 +10417,7 @@
           <a:noFill/>
           <a:extLst>
             <a:ext uri="{909E8E84-426E-40DD-AFC4-6F175D3DCCD1}">
-              <a14:hiddenFill xmlns:a14="http://schemas.microsoft.com/office/drawing/2010/main">
+              <a14:hiddenFill xmlns:a14="http://schemas.microsoft.com/office/drawing/2010/main" xmlns="">
                 <a:solidFill>
                   <a:srgbClr val="FFFFFF"/>
                 </a:solidFill>
@@ -11812,7 +11898,7 @@
           <p:cNvPr id="2" name="Picture 2" descr="small ke-icon">
             <a:extLst>
               <a:ext uri="{FF2B5EF4-FFF2-40B4-BE49-F238E27FC236}">
-                <a16:creationId xmlns:a16="http://schemas.microsoft.com/office/drawing/2014/main" id="{2CEB455C-E142-47B5-A2EA-F103D223A10D}"/>
+                <a16:creationId xmlns:a16="http://schemas.microsoft.com/office/drawing/2014/main" xmlns="" id="{2CEB455C-E142-47B5-A2EA-F103D223A10D}"/>
               </a:ext>
             </a:extLst>
           </p:cNvPr>
@@ -11825,7 +11911,7 @@
           <a:blip r:embed="rId11" cstate="print">
             <a:extLst>
               <a:ext uri="{28A0092B-C50C-407E-A947-70E740481C1C}">
-                <a14:useLocalDpi xmlns:a14="http://schemas.microsoft.com/office/drawing/2010/main" val="0"/>
+                <a14:useLocalDpi xmlns:a14="http://schemas.microsoft.com/office/drawing/2010/main" xmlns="" val="0"/>
               </a:ext>
             </a:extLst>
           </a:blip>
@@ -11845,7 +11931,7 @@
           <a:noFill/>
           <a:extLst>
             <a:ext uri="{909E8E84-426E-40DD-AFC4-6F175D3DCCD1}">
-              <a14:hiddenFill xmlns:a14="http://schemas.microsoft.com/office/drawing/2010/main">
+              <a14:hiddenFill xmlns:a14="http://schemas.microsoft.com/office/drawing/2010/main" xmlns="">
                 <a:solidFill>
                   <a:srgbClr val="FFFFFF"/>
                 </a:solidFill>
@@ -12347,7 +12433,7 @@
           <p:cNvPr id="2052" name="Picture 4" descr="http://www.ke.tu-darmstadt.de/ke_site_header.jpg">
             <a:extLst>
               <a:ext uri="{FF2B5EF4-FFF2-40B4-BE49-F238E27FC236}">
-                <a16:creationId xmlns:a16="http://schemas.microsoft.com/office/drawing/2014/main" id="{A4296F2A-DF52-4654-B393-FD38D561FC7C}"/>
+                <a16:creationId xmlns:a16="http://schemas.microsoft.com/office/drawing/2014/main" xmlns="" id="{A4296F2A-DF52-4654-B393-FD38D561FC7C}"/>
               </a:ext>
             </a:extLst>
           </p:cNvPr>
@@ -12360,7 +12446,7 @@
           <a:blip r:embed="rId3" cstate="print">
             <a:extLst>
               <a:ext uri="{28A0092B-C50C-407E-A947-70E740481C1C}">
-                <a14:useLocalDpi xmlns:a14="http://schemas.microsoft.com/office/drawing/2010/main" val="0"/>
+                <a14:useLocalDpi xmlns:a14="http://schemas.microsoft.com/office/drawing/2010/main" xmlns="" val="0"/>
               </a:ext>
             </a:extLst>
           </a:blip>
@@ -12380,7 +12466,7 @@
           <a:noFill/>
           <a:extLst>
             <a:ext uri="{909E8E84-426E-40DD-AFC4-6F175D3DCCD1}">
-              <a14:hiddenFill xmlns:a14="http://schemas.microsoft.com/office/drawing/2010/main">
+              <a14:hiddenFill xmlns:a14="http://schemas.microsoft.com/office/drawing/2010/main" xmlns="">
                 <a:solidFill>
                   <a:srgbClr val="FFFFFF"/>
                 </a:solidFill>
@@ -12419,7 +12505,7 @@
           <p:cNvPr id="2" name="Titel 1">
             <a:extLst>
               <a:ext uri="{FF2B5EF4-FFF2-40B4-BE49-F238E27FC236}">
-                <a16:creationId xmlns:a16="http://schemas.microsoft.com/office/drawing/2014/main" id="{594F37A0-8FD9-42A4-A80F-4C479182787E}"/>
+                <a16:creationId xmlns:a16="http://schemas.microsoft.com/office/drawing/2014/main" xmlns="" id="{594F37A0-8FD9-42A4-A80F-4C479182787E}"/>
               </a:ext>
             </a:extLst>
           </p:cNvPr>
@@ -12447,6 +12533,10 @@
               <a:rPr lang="de-DE" dirty="0" err="1"/>
               <a:t>Selection</a:t>
             </a:r>
+            <a:r>
+              <a:rPr lang="de-DE" dirty="0"/>
+              <a:t/>
+            </a:r>
             <a:br>
               <a:rPr lang="de-DE" dirty="0"/>
             </a:br>
@@ -12479,7 +12569,7 @@
             <p:ph idx="1"/>
             <p:extLst>
               <p:ext uri="{D42A27DB-BD31-4B8C-83A1-F6EECF244321}">
-                <p14:modId xmlns:p14="http://schemas.microsoft.com/office/powerpoint/2010/main" val="381636655"/>
+                <p14:modId xmlns:p14="http://schemas.microsoft.com/office/powerpoint/2010/main" xmlns="" val="381636655"/>
               </p:ext>
             </p:extLst>
           </p:nvPr>
@@ -12498,21 +12588,21 @@
                 <a:gridCol w="3600400">
                   <a:extLst>
                     <a:ext uri="{9D8B030D-6E8A-4147-A177-3AD203B41FA5}">
-                      <a16:colId xmlns:a16="http://schemas.microsoft.com/office/drawing/2014/main" val="20000"/>
+                      <a16:colId xmlns:a16="http://schemas.microsoft.com/office/drawing/2014/main" xmlns="" val="20000"/>
                     </a:ext>
                   </a:extLst>
                 </a:gridCol>
                 <a:gridCol w="2520280">
                   <a:extLst>
                     <a:ext uri="{9D8B030D-6E8A-4147-A177-3AD203B41FA5}">
-                      <a16:colId xmlns:a16="http://schemas.microsoft.com/office/drawing/2014/main" val="20001"/>
+                      <a16:colId xmlns:a16="http://schemas.microsoft.com/office/drawing/2014/main" xmlns="" val="20001"/>
                     </a:ext>
                   </a:extLst>
                 </a:gridCol>
                 <a:gridCol w="2520280">
                   <a:extLst>
                     <a:ext uri="{9D8B030D-6E8A-4147-A177-3AD203B41FA5}">
-                      <a16:colId xmlns:a16="http://schemas.microsoft.com/office/drawing/2014/main" val="20002"/>
+                      <a16:colId xmlns:a16="http://schemas.microsoft.com/office/drawing/2014/main" xmlns="" val="20002"/>
                     </a:ext>
                   </a:extLst>
                 </a:gridCol>
@@ -12614,7 +12704,7 @@
                 </a:tc>
                 <a:extLst>
                   <a:ext uri="{0D108BD9-81ED-4DB2-BD59-A6C34878D82A}">
-                    <a16:rowId xmlns:a16="http://schemas.microsoft.com/office/drawing/2014/main" val="10000"/>
+                    <a16:rowId xmlns:a16="http://schemas.microsoft.com/office/drawing/2014/main" xmlns="" val="10000"/>
                   </a:ext>
                 </a:extLst>
               </a:tr>
@@ -12683,7 +12773,7 @@
                 </a:tc>
                 <a:extLst>
                   <a:ext uri="{0D108BD9-81ED-4DB2-BD59-A6C34878D82A}">
-                    <a16:rowId xmlns:a16="http://schemas.microsoft.com/office/drawing/2014/main" val="10001"/>
+                    <a16:rowId xmlns:a16="http://schemas.microsoft.com/office/drawing/2014/main" xmlns="" val="10001"/>
                   </a:ext>
                 </a:extLst>
               </a:tr>
@@ -12768,7 +12858,7 @@
                 </a:tc>
                 <a:extLst>
                   <a:ext uri="{0D108BD9-81ED-4DB2-BD59-A6C34878D82A}">
-                    <a16:rowId xmlns:a16="http://schemas.microsoft.com/office/drawing/2014/main" val="10002"/>
+                    <a16:rowId xmlns:a16="http://schemas.microsoft.com/office/drawing/2014/main" xmlns="" val="10002"/>
                   </a:ext>
                 </a:extLst>
               </a:tr>
@@ -12848,7 +12938,7 @@
                 </a:tc>
                 <a:extLst>
                   <a:ext uri="{0D108BD9-81ED-4DB2-BD59-A6C34878D82A}">
-                    <a16:rowId xmlns:a16="http://schemas.microsoft.com/office/drawing/2014/main" val="10003"/>
+                    <a16:rowId xmlns:a16="http://schemas.microsoft.com/office/drawing/2014/main" xmlns="" val="10003"/>
                   </a:ext>
                 </a:extLst>
               </a:tr>
@@ -12933,7 +13023,7 @@
                 </a:tc>
                 <a:extLst>
                   <a:ext uri="{0D108BD9-81ED-4DB2-BD59-A6C34878D82A}">
-                    <a16:rowId xmlns:a16="http://schemas.microsoft.com/office/drawing/2014/main" val="10004"/>
+                    <a16:rowId xmlns:a16="http://schemas.microsoft.com/office/drawing/2014/main" xmlns="" val="10004"/>
                   </a:ext>
                 </a:extLst>
               </a:tr>
@@ -13035,7 +13125,7 @@
                 </a:tc>
                 <a:extLst>
                   <a:ext uri="{0D108BD9-81ED-4DB2-BD59-A6C34878D82A}">
-                    <a16:rowId xmlns:a16="http://schemas.microsoft.com/office/drawing/2014/main" val="10005"/>
+                    <a16:rowId xmlns:a16="http://schemas.microsoft.com/office/drawing/2014/main" xmlns="" val="10005"/>
                   </a:ext>
                 </a:extLst>
               </a:tr>
@@ -13048,7 +13138,7 @@
           <p:cNvPr id="9" name="Pfeil: Chevron 8">
             <a:extLst>
               <a:ext uri="{FF2B5EF4-FFF2-40B4-BE49-F238E27FC236}">
-                <a16:creationId xmlns:a16="http://schemas.microsoft.com/office/drawing/2014/main" id="{1F34EC54-7B5B-4BE9-B492-B676E949A695}"/>
+                <a16:creationId xmlns:a16="http://schemas.microsoft.com/office/drawing/2014/main" xmlns="" id="{1F34EC54-7B5B-4BE9-B492-B676E949A695}"/>
               </a:ext>
             </a:extLst>
           </p:cNvPr>
@@ -13113,7 +13203,7 @@
           <p:cNvPr id="10" name="Pfeil: Chevron 9">
             <a:extLst>
               <a:ext uri="{FF2B5EF4-FFF2-40B4-BE49-F238E27FC236}">
-                <a16:creationId xmlns:a16="http://schemas.microsoft.com/office/drawing/2014/main" id="{CB93A66C-A5C0-4395-9555-0A53E45B8808}"/>
+                <a16:creationId xmlns:a16="http://schemas.microsoft.com/office/drawing/2014/main" xmlns="" id="{CB93A66C-A5C0-4395-9555-0A53E45B8808}"/>
               </a:ext>
             </a:extLst>
           </p:cNvPr>
@@ -13181,7 +13271,7 @@
           <p:cNvPr id="11" name="Pfeil: Chevron 10">
             <a:extLst>
               <a:ext uri="{FF2B5EF4-FFF2-40B4-BE49-F238E27FC236}">
-                <a16:creationId xmlns:a16="http://schemas.microsoft.com/office/drawing/2014/main" id="{17A8ED5A-44E0-4890-95E7-0E008C51BD58}"/>
+                <a16:creationId xmlns:a16="http://schemas.microsoft.com/office/drawing/2014/main" xmlns="" id="{17A8ED5A-44E0-4890-95E7-0E008C51BD58}"/>
               </a:ext>
             </a:extLst>
           </p:cNvPr>
@@ -13249,7 +13339,7 @@
     </p:spTree>
     <p:extLst>
       <p:ext uri="{BB962C8B-B14F-4D97-AF65-F5344CB8AC3E}">
-        <p14:creationId xmlns:p14="http://schemas.microsoft.com/office/powerpoint/2010/main" val="1053902206"/>
+        <p14:creationId xmlns:p14="http://schemas.microsoft.com/office/powerpoint/2010/main" xmlns="" val="1053902206"/>
       </p:ext>
     </p:extLst>
   </p:cSld>
@@ -13281,7 +13371,7 @@
           <p:cNvPr id="2" name="Titel 1">
             <a:extLst>
               <a:ext uri="{FF2B5EF4-FFF2-40B4-BE49-F238E27FC236}">
-                <a16:creationId xmlns:a16="http://schemas.microsoft.com/office/drawing/2014/main" id="{594F37A0-8FD9-42A4-A80F-4C479182787E}"/>
+                <a16:creationId xmlns:a16="http://schemas.microsoft.com/office/drawing/2014/main" xmlns="" id="{594F37A0-8FD9-42A4-A80F-4C479182787E}"/>
               </a:ext>
             </a:extLst>
           </p:cNvPr>
@@ -13308,6 +13398,10 @@
             <a:r>
               <a:rPr lang="de-DE" dirty="0" err="1"/>
               <a:t>Selection</a:t>
+            </a:r>
+            <a:r>
+              <a:rPr lang="de-DE" dirty="0"/>
+              <a:t/>
             </a:r>
             <a:br>
               <a:rPr lang="de-DE" dirty="0"/>
@@ -13531,7 +13625,7 @@
           <p:cNvPr id="9" name="Pfeil: Chevron 8">
             <a:extLst>
               <a:ext uri="{FF2B5EF4-FFF2-40B4-BE49-F238E27FC236}">
-                <a16:creationId xmlns:a16="http://schemas.microsoft.com/office/drawing/2014/main" id="{8CA7196F-D05C-427F-80BF-E5AC89A9A93D}"/>
+                <a16:creationId xmlns:a16="http://schemas.microsoft.com/office/drawing/2014/main" xmlns="" id="{8CA7196F-D05C-427F-80BF-E5AC89A9A93D}"/>
               </a:ext>
             </a:extLst>
           </p:cNvPr>
@@ -13596,7 +13690,7 @@
           <p:cNvPr id="10" name="Pfeil: Chevron 9">
             <a:extLst>
               <a:ext uri="{FF2B5EF4-FFF2-40B4-BE49-F238E27FC236}">
-                <a16:creationId xmlns:a16="http://schemas.microsoft.com/office/drawing/2014/main" id="{30DB099B-CB77-4A8C-9D9C-8FE75EB377B3}"/>
+                <a16:creationId xmlns:a16="http://schemas.microsoft.com/office/drawing/2014/main" xmlns="" id="{30DB099B-CB77-4A8C-9D9C-8FE75EB377B3}"/>
               </a:ext>
             </a:extLst>
           </p:cNvPr>
@@ -13664,7 +13758,7 @@
           <p:cNvPr id="11" name="Pfeil: Chevron 10">
             <a:extLst>
               <a:ext uri="{FF2B5EF4-FFF2-40B4-BE49-F238E27FC236}">
-                <a16:creationId xmlns:a16="http://schemas.microsoft.com/office/drawing/2014/main" id="{104B3773-1C5D-44AF-A938-319AB53CFD8F}"/>
+                <a16:creationId xmlns:a16="http://schemas.microsoft.com/office/drawing/2014/main" xmlns="" id="{104B3773-1C5D-44AF-A938-319AB53CFD8F}"/>
               </a:ext>
             </a:extLst>
           </p:cNvPr>
@@ -13732,7 +13826,7 @@
     </p:spTree>
     <p:extLst>
       <p:ext uri="{BB962C8B-B14F-4D97-AF65-F5344CB8AC3E}">
-        <p14:creationId xmlns:p14="http://schemas.microsoft.com/office/powerpoint/2010/main" val="2830653720"/>
+        <p14:creationId xmlns:p14="http://schemas.microsoft.com/office/powerpoint/2010/main" xmlns="" val="2830653720"/>
       </p:ext>
     </p:extLst>
   </p:cSld>
@@ -13764,7 +13858,7 @@
           <p:cNvPr id="2" name="Titel 1">
             <a:extLst>
               <a:ext uri="{FF2B5EF4-FFF2-40B4-BE49-F238E27FC236}">
-                <a16:creationId xmlns:a16="http://schemas.microsoft.com/office/drawing/2014/main" id="{594F37A0-8FD9-42A4-A80F-4C479182787E}"/>
+                <a16:creationId xmlns:a16="http://schemas.microsoft.com/office/drawing/2014/main" xmlns="" id="{594F37A0-8FD9-42A4-A80F-4C479182787E}"/>
               </a:ext>
             </a:extLst>
           </p:cNvPr>
@@ -13800,6 +13894,10 @@
               <a:rPr lang="de-DE" dirty="0" err="1"/>
               <a:t>Hierachies</a:t>
             </a:r>
+            <a:r>
+              <a:rPr lang="de-DE" dirty="0"/>
+              <a:t/>
+            </a:r>
             <a:br>
               <a:rPr lang="de-DE" dirty="0"/>
             </a:br>
@@ -13832,7 +13930,7 @@
           <p:cNvPr id="3" name="Inhaltsplatzhalter 2">
             <a:extLst>
               <a:ext uri="{FF2B5EF4-FFF2-40B4-BE49-F238E27FC236}">
-                <a16:creationId xmlns:a16="http://schemas.microsoft.com/office/drawing/2014/main" id="{B201CE33-F1D7-423B-B373-1D449812B3D5}"/>
+                <a16:creationId xmlns:a16="http://schemas.microsoft.com/office/drawing/2014/main" xmlns="" id="{B201CE33-F1D7-423B-B373-1D449812B3D5}"/>
               </a:ext>
             </a:extLst>
           </p:cNvPr>
@@ -14163,7 +14261,7 @@
           <p:cNvPr id="9" name="Pfeil: Chevron 8">
             <a:extLst>
               <a:ext uri="{FF2B5EF4-FFF2-40B4-BE49-F238E27FC236}">
-                <a16:creationId xmlns:a16="http://schemas.microsoft.com/office/drawing/2014/main" id="{11B2ABC0-FB87-4519-910C-E5539A398028}"/>
+                <a16:creationId xmlns:a16="http://schemas.microsoft.com/office/drawing/2014/main" xmlns="" id="{11B2ABC0-FB87-4519-910C-E5539A398028}"/>
               </a:ext>
             </a:extLst>
           </p:cNvPr>
@@ -14228,7 +14326,7 @@
           <p:cNvPr id="10" name="Pfeil: Chevron 9">
             <a:extLst>
               <a:ext uri="{FF2B5EF4-FFF2-40B4-BE49-F238E27FC236}">
-                <a16:creationId xmlns:a16="http://schemas.microsoft.com/office/drawing/2014/main" id="{DB674540-AF0C-4577-BB78-061280DAF6DB}"/>
+                <a16:creationId xmlns:a16="http://schemas.microsoft.com/office/drawing/2014/main" xmlns="" id="{DB674540-AF0C-4577-BB78-061280DAF6DB}"/>
               </a:ext>
             </a:extLst>
           </p:cNvPr>
@@ -14296,7 +14394,7 @@
           <p:cNvPr id="11" name="Pfeil: Chevron 10">
             <a:extLst>
               <a:ext uri="{FF2B5EF4-FFF2-40B4-BE49-F238E27FC236}">
-                <a16:creationId xmlns:a16="http://schemas.microsoft.com/office/drawing/2014/main" id="{CBD60D42-3029-43D8-B7BA-13F7A6844023}"/>
+                <a16:creationId xmlns:a16="http://schemas.microsoft.com/office/drawing/2014/main" xmlns="" id="{CBD60D42-3029-43D8-B7BA-13F7A6844023}"/>
               </a:ext>
             </a:extLst>
           </p:cNvPr>
@@ -14364,7 +14462,7 @@
     </p:spTree>
     <p:extLst>
       <p:ext uri="{BB962C8B-B14F-4D97-AF65-F5344CB8AC3E}">
-        <p14:creationId xmlns:p14="http://schemas.microsoft.com/office/powerpoint/2010/main" val="2315418219"/>
+        <p14:creationId xmlns:p14="http://schemas.microsoft.com/office/powerpoint/2010/main" xmlns="" val="2315418219"/>
       </p:ext>
     </p:extLst>
   </p:cSld>
@@ -14396,7 +14494,7 @@
           <p:cNvPr id="2" name="Titel 1">
             <a:extLst>
               <a:ext uri="{FF2B5EF4-FFF2-40B4-BE49-F238E27FC236}">
-                <a16:creationId xmlns:a16="http://schemas.microsoft.com/office/drawing/2014/main" id="{594F37A0-8FD9-42A4-A80F-4C479182787E}"/>
+                <a16:creationId xmlns:a16="http://schemas.microsoft.com/office/drawing/2014/main" xmlns="" id="{594F37A0-8FD9-42A4-A80F-4C479182787E}"/>
               </a:ext>
             </a:extLst>
           </p:cNvPr>
@@ -14432,6 +14530,10 @@
               <a:rPr lang="de-DE" dirty="0" err="1"/>
               <a:t>Hierachies</a:t>
             </a:r>
+            <a:r>
+              <a:rPr lang="de-DE" dirty="0"/>
+              <a:t/>
+            </a:r>
             <a:br>
               <a:rPr lang="de-DE" dirty="0"/>
             </a:br>
@@ -14462,7 +14564,7 @@
           <p:cNvPr id="15" name="Rechteck 14">
             <a:extLst>
               <a:ext uri="{FF2B5EF4-FFF2-40B4-BE49-F238E27FC236}">
-                <a16:creationId xmlns:a16="http://schemas.microsoft.com/office/drawing/2014/main" id="{12090F8B-0EE1-49C0-8557-731AE5DB00E1}"/>
+                <a16:creationId xmlns:a16="http://schemas.microsoft.com/office/drawing/2014/main" xmlns="" id="{12090F8B-0EE1-49C0-8557-731AE5DB00E1}"/>
               </a:ext>
             </a:extLst>
           </p:cNvPr>
@@ -14519,7 +14621,7 @@
           <p:cNvPr id="114" name="Gruppieren 113">
             <a:extLst>
               <a:ext uri="{FF2B5EF4-FFF2-40B4-BE49-F238E27FC236}">
-                <a16:creationId xmlns:a16="http://schemas.microsoft.com/office/drawing/2014/main" id="{E6ABE55B-B737-45A5-9001-1C156E9900C9}"/>
+                <a16:creationId xmlns:a16="http://schemas.microsoft.com/office/drawing/2014/main" xmlns="" id="{E6ABE55B-B737-45A5-9001-1C156E9900C9}"/>
               </a:ext>
             </a:extLst>
           </p:cNvPr>
@@ -14539,7 +14641,7 @@
             <p:cNvPr id="4" name="Ellipse 3">
               <a:extLst>
                 <a:ext uri="{FF2B5EF4-FFF2-40B4-BE49-F238E27FC236}">
-                  <a16:creationId xmlns:a16="http://schemas.microsoft.com/office/drawing/2014/main" id="{F0E964B3-6D49-469E-9C44-5D8C1D2F9E5C}"/>
+                  <a16:creationId xmlns:a16="http://schemas.microsoft.com/office/drawing/2014/main" xmlns="" id="{F0E964B3-6D49-469E-9C44-5D8C1D2F9E5C}"/>
                 </a:ext>
               </a:extLst>
             </p:cNvPr>
@@ -14593,7 +14695,7 @@
             <p:cNvPr id="9" name="Ellipse 8">
               <a:extLst>
                 <a:ext uri="{FF2B5EF4-FFF2-40B4-BE49-F238E27FC236}">
-                  <a16:creationId xmlns:a16="http://schemas.microsoft.com/office/drawing/2014/main" id="{ADFDBF9F-C58C-4E59-8263-6B2AFBB59D68}"/>
+                  <a16:creationId xmlns:a16="http://schemas.microsoft.com/office/drawing/2014/main" xmlns="" id="{ADFDBF9F-C58C-4E59-8263-6B2AFBB59D68}"/>
                 </a:ext>
               </a:extLst>
             </p:cNvPr>
@@ -14652,7 +14754,7 @@
             <p:cNvPr id="10" name="Ellipse 9">
               <a:extLst>
                 <a:ext uri="{FF2B5EF4-FFF2-40B4-BE49-F238E27FC236}">
-                  <a16:creationId xmlns:a16="http://schemas.microsoft.com/office/drawing/2014/main" id="{6E82B9C2-2F86-4A8F-9ABA-1526C833BC56}"/>
+                  <a16:creationId xmlns:a16="http://schemas.microsoft.com/office/drawing/2014/main" xmlns="" id="{6E82B9C2-2F86-4A8F-9ABA-1526C833BC56}"/>
                 </a:ext>
               </a:extLst>
             </p:cNvPr>
@@ -14711,7 +14813,7 @@
             <p:cNvPr id="11" name="Rechteck 10">
               <a:extLst>
                 <a:ext uri="{FF2B5EF4-FFF2-40B4-BE49-F238E27FC236}">
-                  <a16:creationId xmlns:a16="http://schemas.microsoft.com/office/drawing/2014/main" id="{39F4554A-C759-4B45-BA17-E3D0CC30F7A4}"/>
+                  <a16:creationId xmlns:a16="http://schemas.microsoft.com/office/drawing/2014/main" xmlns="" id="{39F4554A-C759-4B45-BA17-E3D0CC30F7A4}"/>
                 </a:ext>
               </a:extLst>
             </p:cNvPr>
@@ -14765,7 +14867,7 @@
             <p:cNvPr id="12" name="Rechteck 11">
               <a:extLst>
                 <a:ext uri="{FF2B5EF4-FFF2-40B4-BE49-F238E27FC236}">
-                  <a16:creationId xmlns:a16="http://schemas.microsoft.com/office/drawing/2014/main" id="{83682C4F-3C3C-4F89-8DD4-F0F006A9E86B}"/>
+                  <a16:creationId xmlns:a16="http://schemas.microsoft.com/office/drawing/2014/main" xmlns="" id="{83682C4F-3C3C-4F89-8DD4-F0F006A9E86B}"/>
                 </a:ext>
               </a:extLst>
             </p:cNvPr>
@@ -14819,7 +14921,7 @@
             <p:cNvPr id="13" name="Rechteck 12">
               <a:extLst>
                 <a:ext uri="{FF2B5EF4-FFF2-40B4-BE49-F238E27FC236}">
-                  <a16:creationId xmlns:a16="http://schemas.microsoft.com/office/drawing/2014/main" id="{4991D9FD-ADB5-463B-857D-54D2BE5F4444}"/>
+                  <a16:creationId xmlns:a16="http://schemas.microsoft.com/office/drawing/2014/main" xmlns="" id="{4991D9FD-ADB5-463B-857D-54D2BE5F4444}"/>
                 </a:ext>
               </a:extLst>
             </p:cNvPr>
@@ -14873,7 +14975,7 @@
             <p:cNvPr id="22" name="Gerader Verbinder 21">
               <a:extLst>
                 <a:ext uri="{FF2B5EF4-FFF2-40B4-BE49-F238E27FC236}">
-                  <a16:creationId xmlns:a16="http://schemas.microsoft.com/office/drawing/2014/main" id="{89C5445D-AE0B-4065-B5C2-C4BA4D894B33}"/>
+                  <a16:creationId xmlns:a16="http://schemas.microsoft.com/office/drawing/2014/main" xmlns="" id="{89C5445D-AE0B-4065-B5C2-C4BA4D894B33}"/>
                 </a:ext>
               </a:extLst>
             </p:cNvPr>
@@ -14918,7 +15020,7 @@
             <p:cNvPr id="25" name="Gerader Verbinder 24">
               <a:extLst>
                 <a:ext uri="{FF2B5EF4-FFF2-40B4-BE49-F238E27FC236}">
-                  <a16:creationId xmlns:a16="http://schemas.microsoft.com/office/drawing/2014/main" id="{0AC5CD99-8C18-4714-86BA-1DABD14BEEB1}"/>
+                  <a16:creationId xmlns:a16="http://schemas.microsoft.com/office/drawing/2014/main" xmlns="" id="{0AC5CD99-8C18-4714-86BA-1DABD14BEEB1}"/>
                 </a:ext>
               </a:extLst>
             </p:cNvPr>
@@ -14963,7 +15065,7 @@
             <p:cNvPr id="27" name="Gerader Verbinder 26">
               <a:extLst>
                 <a:ext uri="{FF2B5EF4-FFF2-40B4-BE49-F238E27FC236}">
-                  <a16:creationId xmlns:a16="http://schemas.microsoft.com/office/drawing/2014/main" id="{372D202C-DBE8-4CD3-B126-8EC7F0EED127}"/>
+                  <a16:creationId xmlns:a16="http://schemas.microsoft.com/office/drawing/2014/main" xmlns="" id="{372D202C-DBE8-4CD3-B126-8EC7F0EED127}"/>
                 </a:ext>
               </a:extLst>
             </p:cNvPr>
@@ -15007,7 +15109,7 @@
             <p:cNvPr id="44" name="Rechteck 43">
               <a:extLst>
                 <a:ext uri="{FF2B5EF4-FFF2-40B4-BE49-F238E27FC236}">
-                  <a16:creationId xmlns:a16="http://schemas.microsoft.com/office/drawing/2014/main" id="{E9A62879-336C-4C6A-8645-8EA91AEDC01B}"/>
+                  <a16:creationId xmlns:a16="http://schemas.microsoft.com/office/drawing/2014/main" xmlns="" id="{E9A62879-336C-4C6A-8645-8EA91AEDC01B}"/>
                 </a:ext>
               </a:extLst>
             </p:cNvPr>
@@ -15061,7 +15163,7 @@
             <p:cNvPr id="47" name="Gerader Verbinder 46">
               <a:extLst>
                 <a:ext uri="{FF2B5EF4-FFF2-40B4-BE49-F238E27FC236}">
-                  <a16:creationId xmlns:a16="http://schemas.microsoft.com/office/drawing/2014/main" id="{38733F2E-2EFE-4A11-9767-E5DFD6723791}"/>
+                  <a16:creationId xmlns:a16="http://schemas.microsoft.com/office/drawing/2014/main" xmlns="" id="{38733F2E-2EFE-4A11-9767-E5DFD6723791}"/>
                 </a:ext>
               </a:extLst>
             </p:cNvPr>
@@ -15105,7 +15207,7 @@
             <p:cNvPr id="48" name="Rechteck 47">
               <a:extLst>
                 <a:ext uri="{FF2B5EF4-FFF2-40B4-BE49-F238E27FC236}">
-                  <a16:creationId xmlns:a16="http://schemas.microsoft.com/office/drawing/2014/main" id="{F9091B22-61DA-4C09-A0B8-1DF18DB2F2FC}"/>
+                  <a16:creationId xmlns:a16="http://schemas.microsoft.com/office/drawing/2014/main" xmlns="" id="{F9091B22-61DA-4C09-A0B8-1DF18DB2F2FC}"/>
                 </a:ext>
               </a:extLst>
             </p:cNvPr>
@@ -15159,7 +15261,7 @@
             <p:cNvPr id="49" name="Gerader Verbinder 48">
               <a:extLst>
                 <a:ext uri="{FF2B5EF4-FFF2-40B4-BE49-F238E27FC236}">
-                  <a16:creationId xmlns:a16="http://schemas.microsoft.com/office/drawing/2014/main" id="{682E47F6-D19D-46F3-91A1-0B8575F8DFCC}"/>
+                  <a16:creationId xmlns:a16="http://schemas.microsoft.com/office/drawing/2014/main" xmlns="" id="{682E47F6-D19D-46F3-91A1-0B8575F8DFCC}"/>
                 </a:ext>
               </a:extLst>
             </p:cNvPr>
@@ -15205,7 +15307,7 @@
           <p:cNvPr id="43" name="Rechteck 42">
             <a:extLst>
               <a:ext uri="{FF2B5EF4-FFF2-40B4-BE49-F238E27FC236}">
-                <a16:creationId xmlns:a16="http://schemas.microsoft.com/office/drawing/2014/main" id="{833A77D8-B216-4736-917E-D828CF33C81B}"/>
+                <a16:creationId xmlns:a16="http://schemas.microsoft.com/office/drawing/2014/main" xmlns="" id="{833A77D8-B216-4736-917E-D828CF33C81B}"/>
               </a:ext>
             </a:extLst>
           </p:cNvPr>
@@ -15262,7 +15364,7 @@
           <p:cNvPr id="54" name="Ellipse 53">
             <a:extLst>
               <a:ext uri="{FF2B5EF4-FFF2-40B4-BE49-F238E27FC236}">
-                <a16:creationId xmlns:a16="http://schemas.microsoft.com/office/drawing/2014/main" id="{0724EC24-76F0-415C-8D88-713BB341AC8D}"/>
+                <a16:creationId xmlns:a16="http://schemas.microsoft.com/office/drawing/2014/main" xmlns="" id="{0724EC24-76F0-415C-8D88-713BB341AC8D}"/>
               </a:ext>
             </a:extLst>
           </p:cNvPr>
@@ -15316,7 +15418,7 @@
           <p:cNvPr id="55" name="Ellipse 54">
             <a:extLst>
               <a:ext uri="{FF2B5EF4-FFF2-40B4-BE49-F238E27FC236}">
-                <a16:creationId xmlns:a16="http://schemas.microsoft.com/office/drawing/2014/main" id="{39199409-4122-40F0-A3D6-D4A3D696E9EA}"/>
+                <a16:creationId xmlns:a16="http://schemas.microsoft.com/office/drawing/2014/main" xmlns="" id="{39199409-4122-40F0-A3D6-D4A3D696E9EA}"/>
               </a:ext>
             </a:extLst>
           </p:cNvPr>
@@ -15375,7 +15477,7 @@
           <p:cNvPr id="56" name="Ellipse 55">
             <a:extLst>
               <a:ext uri="{FF2B5EF4-FFF2-40B4-BE49-F238E27FC236}">
-                <a16:creationId xmlns:a16="http://schemas.microsoft.com/office/drawing/2014/main" id="{6D93231C-9D23-479A-9BEA-0BBE1012E65C}"/>
+                <a16:creationId xmlns:a16="http://schemas.microsoft.com/office/drawing/2014/main" xmlns="" id="{6D93231C-9D23-479A-9BEA-0BBE1012E65C}"/>
               </a:ext>
             </a:extLst>
           </p:cNvPr>
@@ -15434,7 +15536,7 @@
           <p:cNvPr id="57" name="Rechteck 56">
             <a:extLst>
               <a:ext uri="{FF2B5EF4-FFF2-40B4-BE49-F238E27FC236}">
-                <a16:creationId xmlns:a16="http://schemas.microsoft.com/office/drawing/2014/main" id="{8F74F4B6-8262-4239-BE3B-938FB62046E6}"/>
+                <a16:creationId xmlns:a16="http://schemas.microsoft.com/office/drawing/2014/main" xmlns="" id="{8F74F4B6-8262-4239-BE3B-938FB62046E6}"/>
               </a:ext>
             </a:extLst>
           </p:cNvPr>
@@ -15488,7 +15590,7 @@
           <p:cNvPr id="58" name="Rechteck 57">
             <a:extLst>
               <a:ext uri="{FF2B5EF4-FFF2-40B4-BE49-F238E27FC236}">
-                <a16:creationId xmlns:a16="http://schemas.microsoft.com/office/drawing/2014/main" id="{799332C2-2C18-4638-9DE9-D0A34DBA71B5}"/>
+                <a16:creationId xmlns:a16="http://schemas.microsoft.com/office/drawing/2014/main" xmlns="" id="{799332C2-2C18-4638-9DE9-D0A34DBA71B5}"/>
               </a:ext>
             </a:extLst>
           </p:cNvPr>
@@ -15542,7 +15644,7 @@
           <p:cNvPr id="59" name="Rechteck 58">
             <a:extLst>
               <a:ext uri="{FF2B5EF4-FFF2-40B4-BE49-F238E27FC236}">
-                <a16:creationId xmlns:a16="http://schemas.microsoft.com/office/drawing/2014/main" id="{5D41B586-D3AE-4077-8CB3-BEECBB837D3F}"/>
+                <a16:creationId xmlns:a16="http://schemas.microsoft.com/office/drawing/2014/main" xmlns="" id="{5D41B586-D3AE-4077-8CB3-BEECBB837D3F}"/>
               </a:ext>
             </a:extLst>
           </p:cNvPr>
@@ -15596,7 +15698,7 @@
           <p:cNvPr id="60" name="Gerader Verbinder 59">
             <a:extLst>
               <a:ext uri="{FF2B5EF4-FFF2-40B4-BE49-F238E27FC236}">
-                <a16:creationId xmlns:a16="http://schemas.microsoft.com/office/drawing/2014/main" id="{D5015C48-E06F-4A8A-A0C8-4E0716AA2807}"/>
+                <a16:creationId xmlns:a16="http://schemas.microsoft.com/office/drawing/2014/main" xmlns="" id="{D5015C48-E06F-4A8A-A0C8-4E0716AA2807}"/>
               </a:ext>
             </a:extLst>
           </p:cNvPr>
@@ -15641,7 +15743,7 @@
           <p:cNvPr id="61" name="Gerader Verbinder 60">
             <a:extLst>
               <a:ext uri="{FF2B5EF4-FFF2-40B4-BE49-F238E27FC236}">
-                <a16:creationId xmlns:a16="http://schemas.microsoft.com/office/drawing/2014/main" id="{85D53691-3F55-48F0-90C5-B5D3DB4A5664}"/>
+                <a16:creationId xmlns:a16="http://schemas.microsoft.com/office/drawing/2014/main" xmlns="" id="{85D53691-3F55-48F0-90C5-B5D3DB4A5664}"/>
               </a:ext>
             </a:extLst>
           </p:cNvPr>
@@ -15686,7 +15788,7 @@
           <p:cNvPr id="62" name="Gerader Verbinder 61">
             <a:extLst>
               <a:ext uri="{FF2B5EF4-FFF2-40B4-BE49-F238E27FC236}">
-                <a16:creationId xmlns:a16="http://schemas.microsoft.com/office/drawing/2014/main" id="{BE80E97D-A8EF-4F78-A86E-E4EA61C7D153}"/>
+                <a16:creationId xmlns:a16="http://schemas.microsoft.com/office/drawing/2014/main" xmlns="" id="{BE80E97D-A8EF-4F78-A86E-E4EA61C7D153}"/>
               </a:ext>
             </a:extLst>
           </p:cNvPr>
@@ -15730,7 +15832,7 @@
           <p:cNvPr id="63" name="Rechteck 62">
             <a:extLst>
               <a:ext uri="{FF2B5EF4-FFF2-40B4-BE49-F238E27FC236}">
-                <a16:creationId xmlns:a16="http://schemas.microsoft.com/office/drawing/2014/main" id="{8F11F71D-CAF2-4CCF-B270-36BE066CDF14}"/>
+                <a16:creationId xmlns:a16="http://schemas.microsoft.com/office/drawing/2014/main" xmlns="" id="{8F11F71D-CAF2-4CCF-B270-36BE066CDF14}"/>
               </a:ext>
             </a:extLst>
           </p:cNvPr>
@@ -15784,7 +15886,7 @@
           <p:cNvPr id="64" name="Gerader Verbinder 63">
             <a:extLst>
               <a:ext uri="{FF2B5EF4-FFF2-40B4-BE49-F238E27FC236}">
-                <a16:creationId xmlns:a16="http://schemas.microsoft.com/office/drawing/2014/main" id="{CA102292-B757-4C9D-985D-5BD63D82B0D6}"/>
+                <a16:creationId xmlns:a16="http://schemas.microsoft.com/office/drawing/2014/main" xmlns="" id="{CA102292-B757-4C9D-985D-5BD63D82B0D6}"/>
               </a:ext>
             </a:extLst>
           </p:cNvPr>
@@ -15828,7 +15930,7 @@
           <p:cNvPr id="65" name="Rechteck 64">
             <a:extLst>
               <a:ext uri="{FF2B5EF4-FFF2-40B4-BE49-F238E27FC236}">
-                <a16:creationId xmlns:a16="http://schemas.microsoft.com/office/drawing/2014/main" id="{41489995-E092-4825-91F0-5DC202A1C2BB}"/>
+                <a16:creationId xmlns:a16="http://schemas.microsoft.com/office/drawing/2014/main" xmlns="" id="{41489995-E092-4825-91F0-5DC202A1C2BB}"/>
               </a:ext>
             </a:extLst>
           </p:cNvPr>
@@ -15882,7 +15984,7 @@
           <p:cNvPr id="66" name="Gerader Verbinder 65">
             <a:extLst>
               <a:ext uri="{FF2B5EF4-FFF2-40B4-BE49-F238E27FC236}">
-                <a16:creationId xmlns:a16="http://schemas.microsoft.com/office/drawing/2014/main" id="{DDFE0BAE-6703-4B9C-89B0-47C6B7620641}"/>
+                <a16:creationId xmlns:a16="http://schemas.microsoft.com/office/drawing/2014/main" xmlns="" id="{DDFE0BAE-6703-4B9C-89B0-47C6B7620641}"/>
               </a:ext>
             </a:extLst>
           </p:cNvPr>
@@ -15927,7 +16029,7 @@
           <p:cNvPr id="121" name="Gruppieren 120">
             <a:extLst>
               <a:ext uri="{FF2B5EF4-FFF2-40B4-BE49-F238E27FC236}">
-                <a16:creationId xmlns:a16="http://schemas.microsoft.com/office/drawing/2014/main" id="{D1E3AF41-3409-43D2-9206-1FCB776CEE95}"/>
+                <a16:creationId xmlns:a16="http://schemas.microsoft.com/office/drawing/2014/main" xmlns="" id="{D1E3AF41-3409-43D2-9206-1FCB776CEE95}"/>
               </a:ext>
             </a:extLst>
           </p:cNvPr>
@@ -15947,7 +16049,7 @@
             <p:cNvPr id="68" name="Ellipse 67">
               <a:extLst>
                 <a:ext uri="{FF2B5EF4-FFF2-40B4-BE49-F238E27FC236}">
-                  <a16:creationId xmlns:a16="http://schemas.microsoft.com/office/drawing/2014/main" id="{8E556749-E290-4134-95FE-85D40A4DDBF7}"/>
+                  <a16:creationId xmlns:a16="http://schemas.microsoft.com/office/drawing/2014/main" xmlns="" id="{8E556749-E290-4134-95FE-85D40A4DDBF7}"/>
                 </a:ext>
               </a:extLst>
             </p:cNvPr>
@@ -16001,7 +16103,7 @@
             <p:cNvPr id="69" name="Ellipse 68">
               <a:extLst>
                 <a:ext uri="{FF2B5EF4-FFF2-40B4-BE49-F238E27FC236}">
-                  <a16:creationId xmlns:a16="http://schemas.microsoft.com/office/drawing/2014/main" id="{38BA4B0C-3294-41AD-AEA8-6BC3CE539077}"/>
+                  <a16:creationId xmlns:a16="http://schemas.microsoft.com/office/drawing/2014/main" xmlns="" id="{38BA4B0C-3294-41AD-AEA8-6BC3CE539077}"/>
                 </a:ext>
               </a:extLst>
             </p:cNvPr>
@@ -16060,7 +16162,7 @@
             <p:cNvPr id="70" name="Ellipse 69">
               <a:extLst>
                 <a:ext uri="{FF2B5EF4-FFF2-40B4-BE49-F238E27FC236}">
-                  <a16:creationId xmlns:a16="http://schemas.microsoft.com/office/drawing/2014/main" id="{16A02058-7492-445E-ABAC-60D8F2E41062}"/>
+                  <a16:creationId xmlns:a16="http://schemas.microsoft.com/office/drawing/2014/main" xmlns="" id="{16A02058-7492-445E-ABAC-60D8F2E41062}"/>
                 </a:ext>
               </a:extLst>
             </p:cNvPr>
@@ -16119,7 +16221,7 @@
             <p:cNvPr id="71" name="Rechteck 70">
               <a:extLst>
                 <a:ext uri="{FF2B5EF4-FFF2-40B4-BE49-F238E27FC236}">
-                  <a16:creationId xmlns:a16="http://schemas.microsoft.com/office/drawing/2014/main" id="{CD16C262-21E4-4CB9-BFBE-5C0592D2DACE}"/>
+                  <a16:creationId xmlns:a16="http://schemas.microsoft.com/office/drawing/2014/main" xmlns="" id="{CD16C262-21E4-4CB9-BFBE-5C0592D2DACE}"/>
                 </a:ext>
               </a:extLst>
             </p:cNvPr>
@@ -16173,7 +16275,7 @@
             <p:cNvPr id="72" name="Rechteck 71">
               <a:extLst>
                 <a:ext uri="{FF2B5EF4-FFF2-40B4-BE49-F238E27FC236}">
-                  <a16:creationId xmlns:a16="http://schemas.microsoft.com/office/drawing/2014/main" id="{2A0F9BBC-DFF7-4A6A-BF32-F2DF85FB7F13}"/>
+                  <a16:creationId xmlns:a16="http://schemas.microsoft.com/office/drawing/2014/main" xmlns="" id="{2A0F9BBC-DFF7-4A6A-BF32-F2DF85FB7F13}"/>
                 </a:ext>
               </a:extLst>
             </p:cNvPr>
@@ -16227,7 +16329,7 @@
             <p:cNvPr id="73" name="Rechteck 72">
               <a:extLst>
                 <a:ext uri="{FF2B5EF4-FFF2-40B4-BE49-F238E27FC236}">
-                  <a16:creationId xmlns:a16="http://schemas.microsoft.com/office/drawing/2014/main" id="{D42920A0-37DC-47AC-9FF4-2297613C6050}"/>
+                  <a16:creationId xmlns:a16="http://schemas.microsoft.com/office/drawing/2014/main" xmlns="" id="{D42920A0-37DC-47AC-9FF4-2297613C6050}"/>
                 </a:ext>
               </a:extLst>
             </p:cNvPr>
@@ -16281,7 +16383,7 @@
             <p:cNvPr id="74" name="Gerader Verbinder 73">
               <a:extLst>
                 <a:ext uri="{FF2B5EF4-FFF2-40B4-BE49-F238E27FC236}">
-                  <a16:creationId xmlns:a16="http://schemas.microsoft.com/office/drawing/2014/main" id="{A0695C55-E5B1-4170-8152-15DB9219FD2B}"/>
+                  <a16:creationId xmlns:a16="http://schemas.microsoft.com/office/drawing/2014/main" xmlns="" id="{A0695C55-E5B1-4170-8152-15DB9219FD2B}"/>
                 </a:ext>
               </a:extLst>
             </p:cNvPr>
@@ -16326,7 +16428,7 @@
             <p:cNvPr id="75" name="Gerader Verbinder 74">
               <a:extLst>
                 <a:ext uri="{FF2B5EF4-FFF2-40B4-BE49-F238E27FC236}">
-                  <a16:creationId xmlns:a16="http://schemas.microsoft.com/office/drawing/2014/main" id="{137D69E5-1ED1-4F79-BF36-7964626560E2}"/>
+                  <a16:creationId xmlns:a16="http://schemas.microsoft.com/office/drawing/2014/main" xmlns="" id="{137D69E5-1ED1-4F79-BF36-7964626560E2}"/>
                 </a:ext>
               </a:extLst>
             </p:cNvPr>
@@ -16371,7 +16473,7 @@
             <p:cNvPr id="76" name="Gerader Verbinder 75">
               <a:extLst>
                 <a:ext uri="{FF2B5EF4-FFF2-40B4-BE49-F238E27FC236}">
-                  <a16:creationId xmlns:a16="http://schemas.microsoft.com/office/drawing/2014/main" id="{D8D87741-3DDC-4615-A2D4-B8D7A5CD0856}"/>
+                  <a16:creationId xmlns:a16="http://schemas.microsoft.com/office/drawing/2014/main" xmlns="" id="{D8D87741-3DDC-4615-A2D4-B8D7A5CD0856}"/>
                 </a:ext>
               </a:extLst>
             </p:cNvPr>
@@ -16415,7 +16517,7 @@
             <p:cNvPr id="81" name="Rechteck 80">
               <a:extLst>
                 <a:ext uri="{FF2B5EF4-FFF2-40B4-BE49-F238E27FC236}">
-                  <a16:creationId xmlns:a16="http://schemas.microsoft.com/office/drawing/2014/main" id="{0F0150EA-BC0A-4394-BB8F-97650B478257}"/>
+                  <a16:creationId xmlns:a16="http://schemas.microsoft.com/office/drawing/2014/main" xmlns="" id="{0F0150EA-BC0A-4394-BB8F-97650B478257}"/>
                 </a:ext>
               </a:extLst>
             </p:cNvPr>
@@ -16472,7 +16574,7 @@
             <p:cNvPr id="77" name="Rechteck 76">
               <a:extLst>
                 <a:ext uri="{FF2B5EF4-FFF2-40B4-BE49-F238E27FC236}">
-                  <a16:creationId xmlns:a16="http://schemas.microsoft.com/office/drawing/2014/main" id="{429023F3-62B4-4365-8029-F8617E4A1BC7}"/>
+                  <a16:creationId xmlns:a16="http://schemas.microsoft.com/office/drawing/2014/main" xmlns="" id="{429023F3-62B4-4365-8029-F8617E4A1BC7}"/>
                 </a:ext>
               </a:extLst>
             </p:cNvPr>
@@ -16526,7 +16628,7 @@
             <p:cNvPr id="78" name="Gerader Verbinder 77">
               <a:extLst>
                 <a:ext uri="{FF2B5EF4-FFF2-40B4-BE49-F238E27FC236}">
-                  <a16:creationId xmlns:a16="http://schemas.microsoft.com/office/drawing/2014/main" id="{C9767AF8-2522-4386-919F-3A722F8FB63A}"/>
+                  <a16:creationId xmlns:a16="http://schemas.microsoft.com/office/drawing/2014/main" xmlns="" id="{C9767AF8-2522-4386-919F-3A722F8FB63A}"/>
                 </a:ext>
               </a:extLst>
             </p:cNvPr>
@@ -16570,7 +16672,7 @@
             <p:cNvPr id="79" name="Rechteck 78">
               <a:extLst>
                 <a:ext uri="{FF2B5EF4-FFF2-40B4-BE49-F238E27FC236}">
-                  <a16:creationId xmlns:a16="http://schemas.microsoft.com/office/drawing/2014/main" id="{673B13A4-866F-41DA-9CF4-25ACF678B97C}"/>
+                  <a16:creationId xmlns:a16="http://schemas.microsoft.com/office/drawing/2014/main" xmlns="" id="{673B13A4-866F-41DA-9CF4-25ACF678B97C}"/>
                 </a:ext>
               </a:extLst>
             </p:cNvPr>
@@ -16624,7 +16726,7 @@
             <p:cNvPr id="80" name="Gerader Verbinder 79">
               <a:extLst>
                 <a:ext uri="{FF2B5EF4-FFF2-40B4-BE49-F238E27FC236}">
-                  <a16:creationId xmlns:a16="http://schemas.microsoft.com/office/drawing/2014/main" id="{E3C16484-8F30-46B2-8B68-D4924B60590F}"/>
+                  <a16:creationId xmlns:a16="http://schemas.microsoft.com/office/drawing/2014/main" xmlns="" id="{E3C16484-8F30-46B2-8B68-D4924B60590F}"/>
                 </a:ext>
               </a:extLst>
             </p:cNvPr>
@@ -16670,7 +16772,7 @@
           <p:cNvPr id="113" name="Gruppieren 112">
             <a:extLst>
               <a:ext uri="{FF2B5EF4-FFF2-40B4-BE49-F238E27FC236}">
-                <a16:creationId xmlns:a16="http://schemas.microsoft.com/office/drawing/2014/main" id="{6BF72EE9-47F4-4C0C-B6AF-E2992CBD81A7}"/>
+                <a16:creationId xmlns:a16="http://schemas.microsoft.com/office/drawing/2014/main" xmlns="" id="{6BF72EE9-47F4-4C0C-B6AF-E2992CBD81A7}"/>
               </a:ext>
             </a:extLst>
           </p:cNvPr>
@@ -16690,7 +16792,7 @@
             <p:cNvPr id="83" name="Ellipse 82">
               <a:extLst>
                 <a:ext uri="{FF2B5EF4-FFF2-40B4-BE49-F238E27FC236}">
-                  <a16:creationId xmlns:a16="http://schemas.microsoft.com/office/drawing/2014/main" id="{E490BE8A-69D5-497D-A5DF-487F4F84130C}"/>
+                  <a16:creationId xmlns:a16="http://schemas.microsoft.com/office/drawing/2014/main" xmlns="" id="{E490BE8A-69D5-497D-A5DF-487F4F84130C}"/>
                 </a:ext>
               </a:extLst>
             </p:cNvPr>
@@ -16744,7 +16846,7 @@
             <p:cNvPr id="84" name="Ellipse 83">
               <a:extLst>
                 <a:ext uri="{FF2B5EF4-FFF2-40B4-BE49-F238E27FC236}">
-                  <a16:creationId xmlns:a16="http://schemas.microsoft.com/office/drawing/2014/main" id="{7C326BEB-7481-4B7B-B0BC-D86FFD3A540E}"/>
+                  <a16:creationId xmlns:a16="http://schemas.microsoft.com/office/drawing/2014/main" xmlns="" id="{7C326BEB-7481-4B7B-B0BC-D86FFD3A540E}"/>
                 </a:ext>
               </a:extLst>
             </p:cNvPr>
@@ -16803,7 +16905,7 @@
             <p:cNvPr id="85" name="Ellipse 84">
               <a:extLst>
                 <a:ext uri="{FF2B5EF4-FFF2-40B4-BE49-F238E27FC236}">
-                  <a16:creationId xmlns:a16="http://schemas.microsoft.com/office/drawing/2014/main" id="{93B1FE86-B851-43BA-A680-4E4CB09C4C86}"/>
+                  <a16:creationId xmlns:a16="http://schemas.microsoft.com/office/drawing/2014/main" xmlns="" id="{93B1FE86-B851-43BA-A680-4E4CB09C4C86}"/>
                 </a:ext>
               </a:extLst>
             </p:cNvPr>
@@ -16862,7 +16964,7 @@
             <p:cNvPr id="86" name="Rechteck 85">
               <a:extLst>
                 <a:ext uri="{FF2B5EF4-FFF2-40B4-BE49-F238E27FC236}">
-                  <a16:creationId xmlns:a16="http://schemas.microsoft.com/office/drawing/2014/main" id="{2C8E3D7D-CEE5-4007-869C-676C81233E5E}"/>
+                  <a16:creationId xmlns:a16="http://schemas.microsoft.com/office/drawing/2014/main" xmlns="" id="{2C8E3D7D-CEE5-4007-869C-676C81233E5E}"/>
                 </a:ext>
               </a:extLst>
             </p:cNvPr>
@@ -16916,7 +17018,7 @@
             <p:cNvPr id="87" name="Rechteck 86">
               <a:extLst>
                 <a:ext uri="{FF2B5EF4-FFF2-40B4-BE49-F238E27FC236}">
-                  <a16:creationId xmlns:a16="http://schemas.microsoft.com/office/drawing/2014/main" id="{EB212149-F543-4948-9361-585648BD669A}"/>
+                  <a16:creationId xmlns:a16="http://schemas.microsoft.com/office/drawing/2014/main" xmlns="" id="{EB212149-F543-4948-9361-585648BD669A}"/>
                 </a:ext>
               </a:extLst>
             </p:cNvPr>
@@ -16970,7 +17072,7 @@
             <p:cNvPr id="88" name="Rechteck 87">
               <a:extLst>
                 <a:ext uri="{FF2B5EF4-FFF2-40B4-BE49-F238E27FC236}">
-                  <a16:creationId xmlns:a16="http://schemas.microsoft.com/office/drawing/2014/main" id="{A59C3B6D-9C7D-4516-B45C-BD1FD874DF7C}"/>
+                  <a16:creationId xmlns:a16="http://schemas.microsoft.com/office/drawing/2014/main" xmlns="" id="{A59C3B6D-9C7D-4516-B45C-BD1FD874DF7C}"/>
                 </a:ext>
               </a:extLst>
             </p:cNvPr>
@@ -17024,7 +17126,7 @@
             <p:cNvPr id="89" name="Gerader Verbinder 88">
               <a:extLst>
                 <a:ext uri="{FF2B5EF4-FFF2-40B4-BE49-F238E27FC236}">
-                  <a16:creationId xmlns:a16="http://schemas.microsoft.com/office/drawing/2014/main" id="{38450F44-668E-486E-BFDA-C3BCD66FD987}"/>
+                  <a16:creationId xmlns:a16="http://schemas.microsoft.com/office/drawing/2014/main" xmlns="" id="{38450F44-668E-486E-BFDA-C3BCD66FD987}"/>
                 </a:ext>
               </a:extLst>
             </p:cNvPr>
@@ -17069,7 +17171,7 @@
             <p:cNvPr id="90" name="Gerader Verbinder 89">
               <a:extLst>
                 <a:ext uri="{FF2B5EF4-FFF2-40B4-BE49-F238E27FC236}">
-                  <a16:creationId xmlns:a16="http://schemas.microsoft.com/office/drawing/2014/main" id="{D31CD334-E31B-41CD-B01E-9C5C1F90A49C}"/>
+                  <a16:creationId xmlns:a16="http://schemas.microsoft.com/office/drawing/2014/main" xmlns="" id="{D31CD334-E31B-41CD-B01E-9C5C1F90A49C}"/>
                 </a:ext>
               </a:extLst>
             </p:cNvPr>
@@ -17114,7 +17216,7 @@
             <p:cNvPr id="91" name="Gerader Verbinder 90">
               <a:extLst>
                 <a:ext uri="{FF2B5EF4-FFF2-40B4-BE49-F238E27FC236}">
-                  <a16:creationId xmlns:a16="http://schemas.microsoft.com/office/drawing/2014/main" id="{624223A2-1AA0-4DA9-9193-08CB1849889B}"/>
+                  <a16:creationId xmlns:a16="http://schemas.microsoft.com/office/drawing/2014/main" xmlns="" id="{624223A2-1AA0-4DA9-9193-08CB1849889B}"/>
                 </a:ext>
               </a:extLst>
             </p:cNvPr>
@@ -17158,7 +17260,7 @@
             <p:cNvPr id="92" name="Rechteck 91">
               <a:extLst>
                 <a:ext uri="{FF2B5EF4-FFF2-40B4-BE49-F238E27FC236}">
-                  <a16:creationId xmlns:a16="http://schemas.microsoft.com/office/drawing/2014/main" id="{5A87DF5C-C715-45DB-85EA-1EC6F7D38F75}"/>
+                  <a16:creationId xmlns:a16="http://schemas.microsoft.com/office/drawing/2014/main" xmlns="" id="{5A87DF5C-C715-45DB-85EA-1EC6F7D38F75}"/>
                 </a:ext>
               </a:extLst>
             </p:cNvPr>
@@ -17212,7 +17314,7 @@
             <p:cNvPr id="93" name="Gerader Verbinder 92">
               <a:extLst>
                 <a:ext uri="{FF2B5EF4-FFF2-40B4-BE49-F238E27FC236}">
-                  <a16:creationId xmlns:a16="http://schemas.microsoft.com/office/drawing/2014/main" id="{9851543A-DF17-4EF2-85F6-6AE99E8ADC4D}"/>
+                  <a16:creationId xmlns:a16="http://schemas.microsoft.com/office/drawing/2014/main" xmlns="" id="{9851543A-DF17-4EF2-85F6-6AE99E8ADC4D}"/>
                 </a:ext>
               </a:extLst>
             </p:cNvPr>
@@ -17256,7 +17358,7 @@
             <p:cNvPr id="94" name="Rechteck 93">
               <a:extLst>
                 <a:ext uri="{FF2B5EF4-FFF2-40B4-BE49-F238E27FC236}">
-                  <a16:creationId xmlns:a16="http://schemas.microsoft.com/office/drawing/2014/main" id="{5FD5A714-4DCE-44E7-87B2-ED00A8E8DB1C}"/>
+                  <a16:creationId xmlns:a16="http://schemas.microsoft.com/office/drawing/2014/main" xmlns="" id="{5FD5A714-4DCE-44E7-87B2-ED00A8E8DB1C}"/>
                 </a:ext>
               </a:extLst>
             </p:cNvPr>
@@ -17310,7 +17412,7 @@
             <p:cNvPr id="95" name="Gerader Verbinder 94">
               <a:extLst>
                 <a:ext uri="{FF2B5EF4-FFF2-40B4-BE49-F238E27FC236}">
-                  <a16:creationId xmlns:a16="http://schemas.microsoft.com/office/drawing/2014/main" id="{F1603356-25C5-44D2-9F9E-47BDB905CE68}"/>
+                  <a16:creationId xmlns:a16="http://schemas.microsoft.com/office/drawing/2014/main" xmlns="" id="{F1603356-25C5-44D2-9F9E-47BDB905CE68}"/>
                 </a:ext>
               </a:extLst>
             </p:cNvPr>
@@ -17355,7 +17457,7 @@
             <p:cNvPr id="96" name="Ellipse 95">
               <a:extLst>
                 <a:ext uri="{FF2B5EF4-FFF2-40B4-BE49-F238E27FC236}">
-                  <a16:creationId xmlns:a16="http://schemas.microsoft.com/office/drawing/2014/main" id="{D3FABA3F-C1F3-4425-8DE5-FB0446FE5A45}"/>
+                  <a16:creationId xmlns:a16="http://schemas.microsoft.com/office/drawing/2014/main" xmlns="" id="{D3FABA3F-C1F3-4425-8DE5-FB0446FE5A45}"/>
                 </a:ext>
               </a:extLst>
             </p:cNvPr>
@@ -17414,7 +17516,7 @@
             <p:cNvPr id="98" name="Gerader Verbinder 97">
               <a:extLst>
                 <a:ext uri="{FF2B5EF4-FFF2-40B4-BE49-F238E27FC236}">
-                  <a16:creationId xmlns:a16="http://schemas.microsoft.com/office/drawing/2014/main" id="{525A01C8-A59C-4BEE-84C5-5EC5FC7324A9}"/>
+                  <a16:creationId xmlns:a16="http://schemas.microsoft.com/office/drawing/2014/main" xmlns="" id="{525A01C8-A59C-4BEE-84C5-5EC5FC7324A9}"/>
                 </a:ext>
               </a:extLst>
             </p:cNvPr>
@@ -17458,7 +17560,7 @@
             <p:cNvPr id="104" name="Gerader Verbinder 103">
               <a:extLst>
                 <a:ext uri="{FF2B5EF4-FFF2-40B4-BE49-F238E27FC236}">
-                  <a16:creationId xmlns:a16="http://schemas.microsoft.com/office/drawing/2014/main" id="{77C0FC18-545D-47D3-8F24-232D8AB50661}"/>
+                  <a16:creationId xmlns:a16="http://schemas.microsoft.com/office/drawing/2014/main" xmlns="" id="{77C0FC18-545D-47D3-8F24-232D8AB50661}"/>
                 </a:ext>
               </a:extLst>
             </p:cNvPr>
@@ -17503,7 +17605,7 @@
             <p:cNvPr id="109" name="Rechteck 108">
               <a:extLst>
                 <a:ext uri="{FF2B5EF4-FFF2-40B4-BE49-F238E27FC236}">
-                  <a16:creationId xmlns:a16="http://schemas.microsoft.com/office/drawing/2014/main" id="{C0A4FBCE-F635-4F41-AFC6-C2D27F90C845}"/>
+                  <a16:creationId xmlns:a16="http://schemas.microsoft.com/office/drawing/2014/main" xmlns="" id="{C0A4FBCE-F635-4F41-AFC6-C2D27F90C845}"/>
                 </a:ext>
               </a:extLst>
             </p:cNvPr>
@@ -17561,7 +17663,7 @@
           <p:cNvPr id="116" name="Textfeld 115">
             <a:extLst>
               <a:ext uri="{FF2B5EF4-FFF2-40B4-BE49-F238E27FC236}">
-                <a16:creationId xmlns:a16="http://schemas.microsoft.com/office/drawing/2014/main" id="{27207203-E1CF-4410-8384-200882C6BF69}"/>
+                <a16:creationId xmlns:a16="http://schemas.microsoft.com/office/drawing/2014/main" xmlns="" id="{27207203-E1CF-4410-8384-200882C6BF69}"/>
               </a:ext>
             </a:extLst>
           </p:cNvPr>
@@ -17602,7 +17704,7 @@
           <p:cNvPr id="117" name="Textfeld 116">
             <a:extLst>
               <a:ext uri="{FF2B5EF4-FFF2-40B4-BE49-F238E27FC236}">
-                <a16:creationId xmlns:a16="http://schemas.microsoft.com/office/drawing/2014/main" id="{766E97B1-4368-4508-806B-A1E81034EF71}"/>
+                <a16:creationId xmlns:a16="http://schemas.microsoft.com/office/drawing/2014/main" xmlns="" id="{766E97B1-4368-4508-806B-A1E81034EF71}"/>
               </a:ext>
             </a:extLst>
           </p:cNvPr>
@@ -17638,7 +17740,7 @@
           <p:cNvPr id="118" name="Textfeld 117">
             <a:extLst>
               <a:ext uri="{FF2B5EF4-FFF2-40B4-BE49-F238E27FC236}">
-                <a16:creationId xmlns:a16="http://schemas.microsoft.com/office/drawing/2014/main" id="{A3AFE58C-95AA-4B0D-81ED-2932A98ED891}"/>
+                <a16:creationId xmlns:a16="http://schemas.microsoft.com/office/drawing/2014/main" xmlns="" id="{A3AFE58C-95AA-4B0D-81ED-2932A98ED891}"/>
               </a:ext>
             </a:extLst>
           </p:cNvPr>
@@ -17674,7 +17776,7 @@
           <p:cNvPr id="119" name="Textfeld 118">
             <a:extLst>
               <a:ext uri="{FF2B5EF4-FFF2-40B4-BE49-F238E27FC236}">
-                <a16:creationId xmlns:a16="http://schemas.microsoft.com/office/drawing/2014/main" id="{DCF89224-C8EB-4485-9F93-89F512BA5EC1}"/>
+                <a16:creationId xmlns:a16="http://schemas.microsoft.com/office/drawing/2014/main" xmlns="" id="{DCF89224-C8EB-4485-9F93-89F512BA5EC1}"/>
               </a:ext>
             </a:extLst>
           </p:cNvPr>
@@ -17710,7 +17812,7 @@
           <p:cNvPr id="120" name="Textfeld 119">
             <a:extLst>
               <a:ext uri="{FF2B5EF4-FFF2-40B4-BE49-F238E27FC236}">
-                <a16:creationId xmlns:a16="http://schemas.microsoft.com/office/drawing/2014/main" id="{4EE65BD6-28CA-40FE-9DE3-925C4D879436}"/>
+                <a16:creationId xmlns:a16="http://schemas.microsoft.com/office/drawing/2014/main" xmlns="" id="{4EE65BD6-28CA-40FE-9DE3-925C4D879436}"/>
               </a:ext>
             </a:extLst>
           </p:cNvPr>
@@ -17755,7 +17857,7 @@
           <p:cNvPr id="82" name="Pfeil: Chevron 81">
             <a:extLst>
               <a:ext uri="{FF2B5EF4-FFF2-40B4-BE49-F238E27FC236}">
-                <a16:creationId xmlns:a16="http://schemas.microsoft.com/office/drawing/2014/main" id="{FE595B69-73C8-47F0-A36C-1A60BFFD90BA}"/>
+                <a16:creationId xmlns:a16="http://schemas.microsoft.com/office/drawing/2014/main" xmlns="" id="{FE595B69-73C8-47F0-A36C-1A60BFFD90BA}"/>
               </a:ext>
             </a:extLst>
           </p:cNvPr>
@@ -17820,7 +17922,7 @@
           <p:cNvPr id="97" name="Pfeil: Chevron 96">
             <a:extLst>
               <a:ext uri="{FF2B5EF4-FFF2-40B4-BE49-F238E27FC236}">
-                <a16:creationId xmlns:a16="http://schemas.microsoft.com/office/drawing/2014/main" id="{F9CC931A-063A-4AC2-A8CF-C497C78E5B29}"/>
+                <a16:creationId xmlns:a16="http://schemas.microsoft.com/office/drawing/2014/main" xmlns="" id="{F9CC931A-063A-4AC2-A8CF-C497C78E5B29}"/>
               </a:ext>
             </a:extLst>
           </p:cNvPr>
@@ -17888,7 +17990,7 @@
           <p:cNvPr id="99" name="Pfeil: Chevron 98">
             <a:extLst>
               <a:ext uri="{FF2B5EF4-FFF2-40B4-BE49-F238E27FC236}">
-                <a16:creationId xmlns:a16="http://schemas.microsoft.com/office/drawing/2014/main" id="{2050D505-3E6E-4FDD-8731-605F3876F1B7}"/>
+                <a16:creationId xmlns:a16="http://schemas.microsoft.com/office/drawing/2014/main" xmlns="" id="{2050D505-3E6E-4FDD-8731-605F3876F1B7}"/>
               </a:ext>
             </a:extLst>
           </p:cNvPr>
@@ -17956,7 +18058,7 @@
     </p:spTree>
     <p:extLst>
       <p:ext uri="{BB962C8B-B14F-4D97-AF65-F5344CB8AC3E}">
-        <p14:creationId xmlns:p14="http://schemas.microsoft.com/office/powerpoint/2010/main" val="3592389130"/>
+        <p14:creationId xmlns:p14="http://schemas.microsoft.com/office/powerpoint/2010/main" xmlns="" val="3592389130"/>
       </p:ext>
     </p:extLst>
   </p:cSld>
@@ -17988,7 +18090,7 @@
           <p:cNvPr id="143" name="Gerader Verbinder 142">
             <a:extLst>
               <a:ext uri="{FF2B5EF4-FFF2-40B4-BE49-F238E27FC236}">
-                <a16:creationId xmlns:a16="http://schemas.microsoft.com/office/drawing/2014/main" id="{4C3C2E83-3E17-48F9-843C-20D0AE7CC0EA}"/>
+                <a16:creationId xmlns:a16="http://schemas.microsoft.com/office/drawing/2014/main" xmlns="" id="{4C3C2E83-3E17-48F9-843C-20D0AE7CC0EA}"/>
               </a:ext>
             </a:extLst>
           </p:cNvPr>
@@ -18039,7 +18141,7 @@
           <p:cNvPr id="144" name="Gerader Verbinder 143">
             <a:extLst>
               <a:ext uri="{FF2B5EF4-FFF2-40B4-BE49-F238E27FC236}">
-                <a16:creationId xmlns:a16="http://schemas.microsoft.com/office/drawing/2014/main" id="{1808E2F0-4001-441C-A042-B8CF15382928}"/>
+                <a16:creationId xmlns:a16="http://schemas.microsoft.com/office/drawing/2014/main" xmlns="" id="{1808E2F0-4001-441C-A042-B8CF15382928}"/>
               </a:ext>
             </a:extLst>
           </p:cNvPr>
@@ -18090,7 +18192,7 @@
           <p:cNvPr id="146" name="Gerader Verbinder 145">
             <a:extLst>
               <a:ext uri="{FF2B5EF4-FFF2-40B4-BE49-F238E27FC236}">
-                <a16:creationId xmlns:a16="http://schemas.microsoft.com/office/drawing/2014/main" id="{A916DEA5-C4AA-4B3E-A759-AE6B9472D5DB}"/>
+                <a16:creationId xmlns:a16="http://schemas.microsoft.com/office/drawing/2014/main" xmlns="" id="{A916DEA5-C4AA-4B3E-A759-AE6B9472D5DB}"/>
               </a:ext>
             </a:extLst>
           </p:cNvPr>
@@ -18141,7 +18243,7 @@
           <p:cNvPr id="2" name="Titel 1">
             <a:extLst>
               <a:ext uri="{FF2B5EF4-FFF2-40B4-BE49-F238E27FC236}">
-                <a16:creationId xmlns:a16="http://schemas.microsoft.com/office/drawing/2014/main" id="{594F37A0-8FD9-42A4-A80F-4C479182787E}"/>
+                <a16:creationId xmlns:a16="http://schemas.microsoft.com/office/drawing/2014/main" xmlns="" id="{594F37A0-8FD9-42A4-A80F-4C479182787E}"/>
               </a:ext>
             </a:extLst>
           </p:cNvPr>
@@ -18177,6 +18279,10 @@
               <a:rPr lang="de-DE" dirty="0" err="1"/>
               <a:t>Hierachies</a:t>
             </a:r>
+            <a:r>
+              <a:rPr lang="de-DE" dirty="0"/>
+              <a:t/>
+            </a:r>
             <a:br>
               <a:rPr lang="de-DE" dirty="0"/>
             </a:br>
@@ -18215,7 +18321,7 @@
           <p:cNvPr id="82" name="Inhaltsplatzhalter 2">
             <a:extLst>
               <a:ext uri="{FF2B5EF4-FFF2-40B4-BE49-F238E27FC236}">
-                <a16:creationId xmlns:a16="http://schemas.microsoft.com/office/drawing/2014/main" id="{3DE5479E-FEDB-4349-9D8E-5CEAD5C97758}"/>
+                <a16:creationId xmlns:a16="http://schemas.microsoft.com/office/drawing/2014/main" xmlns="" id="{3DE5479E-FEDB-4349-9D8E-5CEAD5C97758}"/>
               </a:ext>
             </a:extLst>
           </p:cNvPr>
@@ -18409,7 +18515,7 @@
           <p:cNvPr id="41" name="Gruppieren 40">
             <a:extLst>
               <a:ext uri="{FF2B5EF4-FFF2-40B4-BE49-F238E27FC236}">
-                <a16:creationId xmlns:a16="http://schemas.microsoft.com/office/drawing/2014/main" id="{E398B641-73C2-4907-ADF6-00A4F44C9BE4}"/>
+                <a16:creationId xmlns:a16="http://schemas.microsoft.com/office/drawing/2014/main" xmlns="" id="{E398B641-73C2-4907-ADF6-00A4F44C9BE4}"/>
               </a:ext>
             </a:extLst>
           </p:cNvPr>
@@ -18429,7 +18535,7 @@
             <p:cNvPr id="97" name="Rechteck 96">
               <a:extLst>
                 <a:ext uri="{FF2B5EF4-FFF2-40B4-BE49-F238E27FC236}">
-                  <a16:creationId xmlns:a16="http://schemas.microsoft.com/office/drawing/2014/main" id="{44B73694-E3DC-4152-926D-66C1BBA0B99E}"/>
+                  <a16:creationId xmlns:a16="http://schemas.microsoft.com/office/drawing/2014/main" xmlns="" id="{44B73694-E3DC-4152-926D-66C1BBA0B99E}"/>
                 </a:ext>
               </a:extLst>
             </p:cNvPr>
@@ -18486,7 +18592,7 @@
             <p:cNvPr id="17" name="Gerader Verbinder 16">
               <a:extLst>
                 <a:ext uri="{FF2B5EF4-FFF2-40B4-BE49-F238E27FC236}">
-                  <a16:creationId xmlns:a16="http://schemas.microsoft.com/office/drawing/2014/main" id="{BEC9F659-EE99-49CC-83C3-4ADA1285F39A}"/>
+                  <a16:creationId xmlns:a16="http://schemas.microsoft.com/office/drawing/2014/main" xmlns="" id="{BEC9F659-EE99-49CC-83C3-4ADA1285F39A}"/>
                 </a:ext>
               </a:extLst>
             </p:cNvPr>
@@ -18531,7 +18637,7 @@
             <p:cNvPr id="132" name="Gruppieren 131">
               <a:extLst>
                 <a:ext uri="{FF2B5EF4-FFF2-40B4-BE49-F238E27FC236}">
-                  <a16:creationId xmlns:a16="http://schemas.microsoft.com/office/drawing/2014/main" id="{9EDA5772-3C01-4CE8-8FBD-BB5AB2ADE169}"/>
+                  <a16:creationId xmlns:a16="http://schemas.microsoft.com/office/drawing/2014/main" xmlns="" id="{9EDA5772-3C01-4CE8-8FBD-BB5AB2ADE169}"/>
                 </a:ext>
               </a:extLst>
             </p:cNvPr>
@@ -18551,7 +18657,7 @@
               <p:cNvPr id="133" name="Ellipse 132">
                 <a:extLst>
                   <a:ext uri="{FF2B5EF4-FFF2-40B4-BE49-F238E27FC236}">
-                    <a16:creationId xmlns:a16="http://schemas.microsoft.com/office/drawing/2014/main" id="{2CDB4568-4B80-44D3-B8D1-4FD3C04B1E3B}"/>
+                    <a16:creationId xmlns:a16="http://schemas.microsoft.com/office/drawing/2014/main" xmlns="" id="{2CDB4568-4B80-44D3-B8D1-4FD3C04B1E3B}"/>
                   </a:ext>
                 </a:extLst>
               </p:cNvPr>
@@ -18605,7 +18711,7 @@
               <p:cNvPr id="134" name="Rechteck 133">
                 <a:extLst>
                   <a:ext uri="{FF2B5EF4-FFF2-40B4-BE49-F238E27FC236}">
-                    <a16:creationId xmlns:a16="http://schemas.microsoft.com/office/drawing/2014/main" id="{96D466F6-ED40-45E5-84C3-D51F31EEB296}"/>
+                    <a16:creationId xmlns:a16="http://schemas.microsoft.com/office/drawing/2014/main" xmlns="" id="{96D466F6-ED40-45E5-84C3-D51F31EEB296}"/>
                   </a:ext>
                 </a:extLst>
               </p:cNvPr>
@@ -18659,7 +18765,7 @@
               <p:cNvPr id="135" name="Rechteck 134">
                 <a:extLst>
                   <a:ext uri="{FF2B5EF4-FFF2-40B4-BE49-F238E27FC236}">
-                    <a16:creationId xmlns:a16="http://schemas.microsoft.com/office/drawing/2014/main" id="{D240755B-CC06-4E82-A8DF-8225AC60E936}"/>
+                    <a16:creationId xmlns:a16="http://schemas.microsoft.com/office/drawing/2014/main" xmlns="" id="{D240755B-CC06-4E82-A8DF-8225AC60E936}"/>
                   </a:ext>
                 </a:extLst>
               </p:cNvPr>
@@ -18713,7 +18819,7 @@
               <p:cNvPr id="136" name="Gerader Verbinder 135">
                 <a:extLst>
                   <a:ext uri="{FF2B5EF4-FFF2-40B4-BE49-F238E27FC236}">
-                    <a16:creationId xmlns:a16="http://schemas.microsoft.com/office/drawing/2014/main" id="{3E98498B-042C-4FDD-A8A6-39D8156EF045}"/>
+                    <a16:creationId xmlns:a16="http://schemas.microsoft.com/office/drawing/2014/main" xmlns="" id="{3E98498B-042C-4FDD-A8A6-39D8156EF045}"/>
                   </a:ext>
                 </a:extLst>
               </p:cNvPr>
@@ -18761,7 +18867,7 @@
               <p:cNvPr id="137" name="Gerader Verbinder 136">
                 <a:extLst>
                   <a:ext uri="{FF2B5EF4-FFF2-40B4-BE49-F238E27FC236}">
-                    <a16:creationId xmlns:a16="http://schemas.microsoft.com/office/drawing/2014/main" id="{7A7C0BE9-0F54-45AD-BABF-EB7B76EEB44D}"/>
+                    <a16:creationId xmlns:a16="http://schemas.microsoft.com/office/drawing/2014/main" xmlns="" id="{7A7C0BE9-0F54-45AD-BABF-EB7B76EEB44D}"/>
                   </a:ext>
                 </a:extLst>
               </p:cNvPr>
@@ -18809,7 +18915,7 @@
               <p:cNvPr id="138" name="Gerader Verbinder 137">
                 <a:extLst>
                   <a:ext uri="{FF2B5EF4-FFF2-40B4-BE49-F238E27FC236}">
-                    <a16:creationId xmlns:a16="http://schemas.microsoft.com/office/drawing/2014/main" id="{C05022BD-3D3D-42A0-A133-5A0341D32A9C}"/>
+                    <a16:creationId xmlns:a16="http://schemas.microsoft.com/office/drawing/2014/main" xmlns="" id="{C05022BD-3D3D-42A0-A133-5A0341D32A9C}"/>
                   </a:ext>
                 </a:extLst>
               </p:cNvPr>
@@ -18855,7 +18961,7 @@
           <p:cNvPr id="24" name="Gruppieren 23">
             <a:extLst>
               <a:ext uri="{FF2B5EF4-FFF2-40B4-BE49-F238E27FC236}">
-                <a16:creationId xmlns:a16="http://schemas.microsoft.com/office/drawing/2014/main" id="{D04BC624-D1B8-4921-82B9-96DDA701CCC0}"/>
+                <a16:creationId xmlns:a16="http://schemas.microsoft.com/office/drawing/2014/main" xmlns="" id="{D04BC624-D1B8-4921-82B9-96DDA701CCC0}"/>
               </a:ext>
             </a:extLst>
           </p:cNvPr>
@@ -18875,7 +18981,7 @@
             <p:cNvPr id="99" name="Ellipse 98">
               <a:extLst>
                 <a:ext uri="{FF2B5EF4-FFF2-40B4-BE49-F238E27FC236}">
-                  <a16:creationId xmlns:a16="http://schemas.microsoft.com/office/drawing/2014/main" id="{00B8BFAC-D056-45A9-ACC0-2E17FD167B44}"/>
+                  <a16:creationId xmlns:a16="http://schemas.microsoft.com/office/drawing/2014/main" xmlns="" id="{00B8BFAC-D056-45A9-ACC0-2E17FD167B44}"/>
                 </a:ext>
               </a:extLst>
             </p:cNvPr>
@@ -18929,7 +19035,7 @@
             <p:cNvPr id="100" name="Rechteck 99">
               <a:extLst>
                 <a:ext uri="{FF2B5EF4-FFF2-40B4-BE49-F238E27FC236}">
-                  <a16:creationId xmlns:a16="http://schemas.microsoft.com/office/drawing/2014/main" id="{73D84688-B7BD-495F-B7A1-4F0C497DC98B}"/>
+                  <a16:creationId xmlns:a16="http://schemas.microsoft.com/office/drawing/2014/main" xmlns="" id="{73D84688-B7BD-495F-B7A1-4F0C497DC98B}"/>
                 </a:ext>
               </a:extLst>
             </p:cNvPr>
@@ -18983,7 +19089,7 @@
             <p:cNvPr id="101" name="Rechteck 100">
               <a:extLst>
                 <a:ext uri="{FF2B5EF4-FFF2-40B4-BE49-F238E27FC236}">
-                  <a16:creationId xmlns:a16="http://schemas.microsoft.com/office/drawing/2014/main" id="{69DB1CCE-BF1E-45CE-967A-333EF02D87FF}"/>
+                  <a16:creationId xmlns:a16="http://schemas.microsoft.com/office/drawing/2014/main" xmlns="" id="{69DB1CCE-BF1E-45CE-967A-333EF02D87FF}"/>
                 </a:ext>
               </a:extLst>
             </p:cNvPr>
@@ -19037,7 +19143,7 @@
             <p:cNvPr id="103" name="Gerader Verbinder 102">
               <a:extLst>
                 <a:ext uri="{FF2B5EF4-FFF2-40B4-BE49-F238E27FC236}">
-                  <a16:creationId xmlns:a16="http://schemas.microsoft.com/office/drawing/2014/main" id="{1297057B-5F1E-417F-9C72-8B7F669DAD12}"/>
+                  <a16:creationId xmlns:a16="http://schemas.microsoft.com/office/drawing/2014/main" xmlns="" id="{1297057B-5F1E-417F-9C72-8B7F669DAD12}"/>
                 </a:ext>
               </a:extLst>
             </p:cNvPr>
@@ -19085,7 +19191,7 @@
             <p:cNvPr id="105" name="Gerader Verbinder 104">
               <a:extLst>
                 <a:ext uri="{FF2B5EF4-FFF2-40B4-BE49-F238E27FC236}">
-                  <a16:creationId xmlns:a16="http://schemas.microsoft.com/office/drawing/2014/main" id="{7DD41ABD-F226-4570-92C3-6CECD7A36310}"/>
+                  <a16:creationId xmlns:a16="http://schemas.microsoft.com/office/drawing/2014/main" xmlns="" id="{7DD41ABD-F226-4570-92C3-6CECD7A36310}"/>
                 </a:ext>
               </a:extLst>
             </p:cNvPr>
@@ -19133,7 +19239,7 @@
             <p:cNvPr id="106" name="Gerader Verbinder 105">
               <a:extLst>
                 <a:ext uri="{FF2B5EF4-FFF2-40B4-BE49-F238E27FC236}">
-                  <a16:creationId xmlns:a16="http://schemas.microsoft.com/office/drawing/2014/main" id="{5238696D-1863-4639-B822-D3DB58DD925D}"/>
+                  <a16:creationId xmlns:a16="http://schemas.microsoft.com/office/drawing/2014/main" xmlns="" id="{5238696D-1863-4639-B822-D3DB58DD925D}"/>
                 </a:ext>
               </a:extLst>
             </p:cNvPr>
@@ -19178,7 +19284,7 @@
           <p:cNvPr id="107" name="Rechteck 106">
             <a:extLst>
               <a:ext uri="{FF2B5EF4-FFF2-40B4-BE49-F238E27FC236}">
-                <a16:creationId xmlns:a16="http://schemas.microsoft.com/office/drawing/2014/main" id="{7A8F02D8-8430-4ECE-BE5F-1276638B515D}"/>
+                <a16:creationId xmlns:a16="http://schemas.microsoft.com/office/drawing/2014/main" xmlns="" id="{7A8F02D8-8430-4ECE-BE5F-1276638B515D}"/>
               </a:ext>
             </a:extLst>
           </p:cNvPr>
@@ -19235,7 +19341,7 @@
           <p:cNvPr id="108" name="Gruppieren 107">
             <a:extLst>
               <a:ext uri="{FF2B5EF4-FFF2-40B4-BE49-F238E27FC236}">
-                <a16:creationId xmlns:a16="http://schemas.microsoft.com/office/drawing/2014/main" id="{96C7F909-89DC-4D2C-B6C4-1D49B9A8ABFB}"/>
+                <a16:creationId xmlns:a16="http://schemas.microsoft.com/office/drawing/2014/main" xmlns="" id="{96C7F909-89DC-4D2C-B6C4-1D49B9A8ABFB}"/>
               </a:ext>
             </a:extLst>
           </p:cNvPr>
@@ -19255,7 +19361,7 @@
             <p:cNvPr id="110" name="Ellipse 109">
               <a:extLst>
                 <a:ext uri="{FF2B5EF4-FFF2-40B4-BE49-F238E27FC236}">
-                  <a16:creationId xmlns:a16="http://schemas.microsoft.com/office/drawing/2014/main" id="{005BAC3C-D24E-4982-B89C-27FAE9DC31E6}"/>
+                  <a16:creationId xmlns:a16="http://schemas.microsoft.com/office/drawing/2014/main" xmlns="" id="{005BAC3C-D24E-4982-B89C-27FAE9DC31E6}"/>
                 </a:ext>
               </a:extLst>
             </p:cNvPr>
@@ -19309,7 +19415,7 @@
             <p:cNvPr id="112" name="Rechteck 111">
               <a:extLst>
                 <a:ext uri="{FF2B5EF4-FFF2-40B4-BE49-F238E27FC236}">
-                  <a16:creationId xmlns:a16="http://schemas.microsoft.com/office/drawing/2014/main" id="{0EEE4AD9-1C09-4AD7-AA08-65578CD2021F}"/>
+                  <a16:creationId xmlns:a16="http://schemas.microsoft.com/office/drawing/2014/main" xmlns="" id="{0EEE4AD9-1C09-4AD7-AA08-65578CD2021F}"/>
                 </a:ext>
               </a:extLst>
             </p:cNvPr>
@@ -19363,7 +19469,7 @@
             <p:cNvPr id="115" name="Rechteck 114">
               <a:extLst>
                 <a:ext uri="{FF2B5EF4-FFF2-40B4-BE49-F238E27FC236}">
-                  <a16:creationId xmlns:a16="http://schemas.microsoft.com/office/drawing/2014/main" id="{1D2B729A-BC05-40B1-B1D6-A6CA45024335}"/>
+                  <a16:creationId xmlns:a16="http://schemas.microsoft.com/office/drawing/2014/main" xmlns="" id="{1D2B729A-BC05-40B1-B1D6-A6CA45024335}"/>
                 </a:ext>
               </a:extLst>
             </p:cNvPr>
@@ -19417,7 +19523,7 @@
             <p:cNvPr id="122" name="Gerader Verbinder 121">
               <a:extLst>
                 <a:ext uri="{FF2B5EF4-FFF2-40B4-BE49-F238E27FC236}">
-                  <a16:creationId xmlns:a16="http://schemas.microsoft.com/office/drawing/2014/main" id="{1A02E2C7-4E4A-4C23-9F3B-FD92C1B6CE9C}"/>
+                  <a16:creationId xmlns:a16="http://schemas.microsoft.com/office/drawing/2014/main" xmlns="" id="{1A02E2C7-4E4A-4C23-9F3B-FD92C1B6CE9C}"/>
                 </a:ext>
               </a:extLst>
             </p:cNvPr>
@@ -19465,7 +19571,7 @@
             <p:cNvPr id="123" name="Gerader Verbinder 122">
               <a:extLst>
                 <a:ext uri="{FF2B5EF4-FFF2-40B4-BE49-F238E27FC236}">
-                  <a16:creationId xmlns:a16="http://schemas.microsoft.com/office/drawing/2014/main" id="{F5FA05C5-54DE-48B2-BEAF-8AFE459EC9F0}"/>
+                  <a16:creationId xmlns:a16="http://schemas.microsoft.com/office/drawing/2014/main" xmlns="" id="{F5FA05C5-54DE-48B2-BEAF-8AFE459EC9F0}"/>
                 </a:ext>
               </a:extLst>
             </p:cNvPr>
@@ -19513,7 +19619,7 @@
             <p:cNvPr id="124" name="Gerader Verbinder 123">
               <a:extLst>
                 <a:ext uri="{FF2B5EF4-FFF2-40B4-BE49-F238E27FC236}">
-                  <a16:creationId xmlns:a16="http://schemas.microsoft.com/office/drawing/2014/main" id="{CED04324-A62C-4EA2-BC81-5A808FFAF61E}"/>
+                  <a16:creationId xmlns:a16="http://schemas.microsoft.com/office/drawing/2014/main" xmlns="" id="{CED04324-A62C-4EA2-BC81-5A808FFAF61E}"/>
                 </a:ext>
               </a:extLst>
             </p:cNvPr>
@@ -19558,7 +19664,7 @@
           <p:cNvPr id="125" name="Gruppieren 124">
             <a:extLst>
               <a:ext uri="{FF2B5EF4-FFF2-40B4-BE49-F238E27FC236}">
-                <a16:creationId xmlns:a16="http://schemas.microsoft.com/office/drawing/2014/main" id="{320327D5-173D-451C-8EDB-7FAB7AD9DD20}"/>
+                <a16:creationId xmlns:a16="http://schemas.microsoft.com/office/drawing/2014/main" xmlns="" id="{320327D5-173D-451C-8EDB-7FAB7AD9DD20}"/>
               </a:ext>
             </a:extLst>
           </p:cNvPr>
@@ -19578,7 +19684,7 @@
             <p:cNvPr id="126" name="Ellipse 125">
               <a:extLst>
                 <a:ext uri="{FF2B5EF4-FFF2-40B4-BE49-F238E27FC236}">
-                  <a16:creationId xmlns:a16="http://schemas.microsoft.com/office/drawing/2014/main" id="{274D9387-6B5C-401E-B4C8-130AF81B531A}"/>
+                  <a16:creationId xmlns:a16="http://schemas.microsoft.com/office/drawing/2014/main" xmlns="" id="{274D9387-6B5C-401E-B4C8-130AF81B531A}"/>
                 </a:ext>
               </a:extLst>
             </p:cNvPr>
@@ -19632,7 +19738,7 @@
             <p:cNvPr id="127" name="Rechteck 126">
               <a:extLst>
                 <a:ext uri="{FF2B5EF4-FFF2-40B4-BE49-F238E27FC236}">
-                  <a16:creationId xmlns:a16="http://schemas.microsoft.com/office/drawing/2014/main" id="{038A19BF-BD00-4B5F-A0BD-94502AD71F85}"/>
+                  <a16:creationId xmlns:a16="http://schemas.microsoft.com/office/drawing/2014/main" xmlns="" id="{038A19BF-BD00-4B5F-A0BD-94502AD71F85}"/>
                 </a:ext>
               </a:extLst>
             </p:cNvPr>
@@ -19686,7 +19792,7 @@
             <p:cNvPr id="128" name="Rechteck 127">
               <a:extLst>
                 <a:ext uri="{FF2B5EF4-FFF2-40B4-BE49-F238E27FC236}">
-                  <a16:creationId xmlns:a16="http://schemas.microsoft.com/office/drawing/2014/main" id="{65298760-2D76-423D-8227-8970A2B52C77}"/>
+                  <a16:creationId xmlns:a16="http://schemas.microsoft.com/office/drawing/2014/main" xmlns="" id="{65298760-2D76-423D-8227-8970A2B52C77}"/>
                 </a:ext>
               </a:extLst>
             </p:cNvPr>
@@ -19740,7 +19846,7 @@
             <p:cNvPr id="129" name="Gerader Verbinder 128">
               <a:extLst>
                 <a:ext uri="{FF2B5EF4-FFF2-40B4-BE49-F238E27FC236}">
-                  <a16:creationId xmlns:a16="http://schemas.microsoft.com/office/drawing/2014/main" id="{0622082E-0C96-4716-952A-4EFB1F35931E}"/>
+                  <a16:creationId xmlns:a16="http://schemas.microsoft.com/office/drawing/2014/main" xmlns="" id="{0622082E-0C96-4716-952A-4EFB1F35931E}"/>
                 </a:ext>
               </a:extLst>
             </p:cNvPr>
@@ -19788,7 +19894,7 @@
             <p:cNvPr id="130" name="Gerader Verbinder 129">
               <a:extLst>
                 <a:ext uri="{FF2B5EF4-FFF2-40B4-BE49-F238E27FC236}">
-                  <a16:creationId xmlns:a16="http://schemas.microsoft.com/office/drawing/2014/main" id="{1A39AD16-EE27-464A-A265-0C48B8D20EC3}"/>
+                  <a16:creationId xmlns:a16="http://schemas.microsoft.com/office/drawing/2014/main" xmlns="" id="{1A39AD16-EE27-464A-A265-0C48B8D20EC3}"/>
                 </a:ext>
               </a:extLst>
             </p:cNvPr>
@@ -19836,7 +19942,7 @@
             <p:cNvPr id="131" name="Gerader Verbinder 130">
               <a:extLst>
                 <a:ext uri="{FF2B5EF4-FFF2-40B4-BE49-F238E27FC236}">
-                  <a16:creationId xmlns:a16="http://schemas.microsoft.com/office/drawing/2014/main" id="{F40C5656-2493-42F0-9217-D4810481E7E2}"/>
+                  <a16:creationId xmlns:a16="http://schemas.microsoft.com/office/drawing/2014/main" xmlns="" id="{F40C5656-2493-42F0-9217-D4810481E7E2}"/>
                 </a:ext>
               </a:extLst>
             </p:cNvPr>
@@ -19881,7 +19987,7 @@
           <p:cNvPr id="140" name="Ellipse 139">
             <a:extLst>
               <a:ext uri="{FF2B5EF4-FFF2-40B4-BE49-F238E27FC236}">
-                <a16:creationId xmlns:a16="http://schemas.microsoft.com/office/drawing/2014/main" id="{7F05F61F-0845-4356-9136-9654EDCDEE40}"/>
+                <a16:creationId xmlns:a16="http://schemas.microsoft.com/office/drawing/2014/main" xmlns="" id="{7F05F61F-0845-4356-9136-9654EDCDEE40}"/>
               </a:ext>
             </a:extLst>
           </p:cNvPr>
@@ -19938,7 +20044,7 @@
           <p:cNvPr id="141" name="Rechteck 140">
             <a:extLst>
               <a:ext uri="{FF2B5EF4-FFF2-40B4-BE49-F238E27FC236}">
-                <a16:creationId xmlns:a16="http://schemas.microsoft.com/office/drawing/2014/main" id="{D884463F-3390-40C5-815A-94BE95D290C0}"/>
+                <a16:creationId xmlns:a16="http://schemas.microsoft.com/office/drawing/2014/main" xmlns="" id="{D884463F-3390-40C5-815A-94BE95D290C0}"/>
               </a:ext>
             </a:extLst>
           </p:cNvPr>
@@ -19995,7 +20101,7 @@
           <p:cNvPr id="142" name="Rechteck 141">
             <a:extLst>
               <a:ext uri="{FF2B5EF4-FFF2-40B4-BE49-F238E27FC236}">
-                <a16:creationId xmlns:a16="http://schemas.microsoft.com/office/drawing/2014/main" id="{B4D4A6C0-87BE-4ADA-A582-D90C5D471F3B}"/>
+                <a16:creationId xmlns:a16="http://schemas.microsoft.com/office/drawing/2014/main" xmlns="" id="{B4D4A6C0-87BE-4ADA-A582-D90C5D471F3B}"/>
               </a:ext>
             </a:extLst>
           </p:cNvPr>
@@ -20052,7 +20158,7 @@
           <p:cNvPr id="145" name="Gerader Verbinder 144">
             <a:extLst>
               <a:ext uri="{FF2B5EF4-FFF2-40B4-BE49-F238E27FC236}">
-                <a16:creationId xmlns:a16="http://schemas.microsoft.com/office/drawing/2014/main" id="{7D0581FC-0B4D-4C9E-B767-A45D8EFC67FF}"/>
+                <a16:creationId xmlns:a16="http://schemas.microsoft.com/office/drawing/2014/main" xmlns="" id="{7D0581FC-0B4D-4C9E-B767-A45D8EFC67FF}"/>
               </a:ext>
             </a:extLst>
           </p:cNvPr>
@@ -20100,7 +20206,7 @@
           <p:cNvPr id="147" name="Gerader Verbinder 146">
             <a:extLst>
               <a:ext uri="{FF2B5EF4-FFF2-40B4-BE49-F238E27FC236}">
-                <a16:creationId xmlns:a16="http://schemas.microsoft.com/office/drawing/2014/main" id="{2A8A01D3-FC8D-4852-AF75-33EA98DC7860}"/>
+                <a16:creationId xmlns:a16="http://schemas.microsoft.com/office/drawing/2014/main" xmlns="" id="{2A8A01D3-FC8D-4852-AF75-33EA98DC7860}"/>
               </a:ext>
             </a:extLst>
           </p:cNvPr>
@@ -20147,7 +20253,7 @@
           <p:cNvPr id="148" name="Gerader Verbinder 147">
             <a:extLst>
               <a:ext uri="{FF2B5EF4-FFF2-40B4-BE49-F238E27FC236}">
-                <a16:creationId xmlns:a16="http://schemas.microsoft.com/office/drawing/2014/main" id="{3547AB33-B599-4C1C-863B-6FCEE23D94DE}"/>
+                <a16:creationId xmlns:a16="http://schemas.microsoft.com/office/drawing/2014/main" xmlns="" id="{3547AB33-B599-4C1C-863B-6FCEE23D94DE}"/>
               </a:ext>
             </a:extLst>
           </p:cNvPr>
@@ -20194,7 +20300,7 @@
           <p:cNvPr id="149" name="Gerader Verbinder 148">
             <a:extLst>
               <a:ext uri="{FF2B5EF4-FFF2-40B4-BE49-F238E27FC236}">
-                <a16:creationId xmlns:a16="http://schemas.microsoft.com/office/drawing/2014/main" id="{45FFF2BB-7A0C-4029-AB43-5BA5ECB3DB6D}"/>
+                <a16:creationId xmlns:a16="http://schemas.microsoft.com/office/drawing/2014/main" xmlns="" id="{45FFF2BB-7A0C-4029-AB43-5BA5ECB3DB6D}"/>
               </a:ext>
             </a:extLst>
           </p:cNvPr>
@@ -20241,7 +20347,7 @@
           <p:cNvPr id="50" name="Pfeil: Chevron 49">
             <a:extLst>
               <a:ext uri="{FF2B5EF4-FFF2-40B4-BE49-F238E27FC236}">
-                <a16:creationId xmlns:a16="http://schemas.microsoft.com/office/drawing/2014/main" id="{C24D5437-0874-47EF-9527-06CA2FE7E239}"/>
+                <a16:creationId xmlns:a16="http://schemas.microsoft.com/office/drawing/2014/main" xmlns="" id="{C24D5437-0874-47EF-9527-06CA2FE7E239}"/>
               </a:ext>
             </a:extLst>
           </p:cNvPr>
@@ -20306,7 +20412,7 @@
           <p:cNvPr id="51" name="Pfeil: Chevron 50">
             <a:extLst>
               <a:ext uri="{FF2B5EF4-FFF2-40B4-BE49-F238E27FC236}">
-                <a16:creationId xmlns:a16="http://schemas.microsoft.com/office/drawing/2014/main" id="{8619EAA0-4C26-4440-AD1A-63161F472AA0}"/>
+                <a16:creationId xmlns:a16="http://schemas.microsoft.com/office/drawing/2014/main" xmlns="" id="{8619EAA0-4C26-4440-AD1A-63161F472AA0}"/>
               </a:ext>
             </a:extLst>
           </p:cNvPr>
@@ -20374,7 +20480,7 @@
           <p:cNvPr id="52" name="Pfeil: Chevron 51">
             <a:extLst>
               <a:ext uri="{FF2B5EF4-FFF2-40B4-BE49-F238E27FC236}">
-                <a16:creationId xmlns:a16="http://schemas.microsoft.com/office/drawing/2014/main" id="{BBA9295F-E65D-4B6A-85F8-18CD66845184}"/>
+                <a16:creationId xmlns:a16="http://schemas.microsoft.com/office/drawing/2014/main" xmlns="" id="{BBA9295F-E65D-4B6A-85F8-18CD66845184}"/>
               </a:ext>
             </a:extLst>
           </p:cNvPr>
@@ -20442,13 +20548,20 @@
     </p:spTree>
     <p:extLst>
       <p:ext uri="{BB962C8B-B14F-4D97-AF65-F5344CB8AC3E}">
-        <p14:creationId xmlns:p14="http://schemas.microsoft.com/office/powerpoint/2010/main" val="733313450"/>
+        <p14:creationId xmlns:p14="http://schemas.microsoft.com/office/powerpoint/2010/main" xmlns="" val="733313450"/>
       </p:ext>
     </p:extLst>
   </p:cSld>
   <p:clrMapOvr>
     <a:masterClrMapping/>
   </p:clrMapOvr>
+  <p:timing>
+    <p:tnLst>
+      <p:par>
+        <p:cTn id="1" dur="indefinite" restart="never" nodeType="tmRoot"/>
+      </p:par>
+    </p:tnLst>
+  </p:timing>
 </p:sld>
 </file>
 
@@ -20474,7 +20587,7 @@
           <p:cNvPr id="2" name="Titel 1">
             <a:extLst>
               <a:ext uri="{FF2B5EF4-FFF2-40B4-BE49-F238E27FC236}">
-                <a16:creationId xmlns:a16="http://schemas.microsoft.com/office/drawing/2014/main" id="{594F37A0-8FD9-42A4-A80F-4C479182787E}"/>
+                <a16:creationId xmlns:a16="http://schemas.microsoft.com/office/drawing/2014/main" xmlns="" id="{594F37A0-8FD9-42A4-A80F-4C479182787E}"/>
               </a:ext>
             </a:extLst>
           </p:cNvPr>
@@ -20502,7 +20615,7 @@
           <p:cNvPr id="3" name="Inhaltsplatzhalter 2">
             <a:extLst>
               <a:ext uri="{FF2B5EF4-FFF2-40B4-BE49-F238E27FC236}">
-                <a16:creationId xmlns:a16="http://schemas.microsoft.com/office/drawing/2014/main" id="{B201CE33-F1D7-423B-B373-1D449812B3D5}"/>
+                <a16:creationId xmlns:a16="http://schemas.microsoft.com/office/drawing/2014/main" xmlns="" id="{B201CE33-F1D7-423B-B373-1D449812B3D5}"/>
               </a:ext>
             </a:extLst>
           </p:cNvPr>
@@ -20526,36 +20639,12 @@
           </a:p>
         </p:txBody>
       </p:sp>
-      <p:pic>
-        <p:nvPicPr>
-          <p:cNvPr id="12" name="Grafik 11" descr="AutoTS__Praesentation_Beispielgraph_2_mit_Auswahl.png"/>
-          <p:cNvPicPr>
-            <a:picLocks noChangeAspect="1"/>
-          </p:cNvPicPr>
-          <p:nvPr/>
-        </p:nvPicPr>
-        <p:blipFill>
-          <a:blip r:embed="rId2" cstate="print"/>
-          <a:stretch>
-            <a:fillRect/>
-          </a:stretch>
-        </p:blipFill>
-        <p:spPr>
-          <a:xfrm>
-            <a:off x="1151620" y="2420889"/>
-            <a:ext cx="6840759" cy="3758268"/>
-          </a:xfrm>
-          <a:prstGeom prst="rect">
-            <a:avLst/>
-          </a:prstGeom>
-        </p:spPr>
-      </p:pic>
       <p:sp>
         <p:nvSpPr>
           <p:cNvPr id="9" name="Pfeil: Chevron 8">
             <a:extLst>
               <a:ext uri="{FF2B5EF4-FFF2-40B4-BE49-F238E27FC236}">
-                <a16:creationId xmlns:a16="http://schemas.microsoft.com/office/drawing/2014/main" id="{88722012-BACB-4B08-BD0A-A3346FA233D5}"/>
+                <a16:creationId xmlns:a16="http://schemas.microsoft.com/office/drawing/2014/main" xmlns="" id="{88722012-BACB-4B08-BD0A-A3346FA233D5}"/>
               </a:ext>
             </a:extLst>
           </p:cNvPr>
@@ -20620,7 +20709,7 @@
           <p:cNvPr id="10" name="Pfeil: Chevron 9">
             <a:extLst>
               <a:ext uri="{FF2B5EF4-FFF2-40B4-BE49-F238E27FC236}">
-                <a16:creationId xmlns:a16="http://schemas.microsoft.com/office/drawing/2014/main" id="{7915287E-A0DA-4752-A12C-77FA4E91C293}"/>
+                <a16:creationId xmlns:a16="http://schemas.microsoft.com/office/drawing/2014/main" xmlns="" id="{7915287E-A0DA-4752-A12C-77FA4E91C293}"/>
               </a:ext>
             </a:extLst>
           </p:cNvPr>
@@ -20688,7 +20777,7 @@
           <p:cNvPr id="11" name="Pfeil: Chevron 10">
             <a:extLst>
               <a:ext uri="{FF2B5EF4-FFF2-40B4-BE49-F238E27FC236}">
-                <a16:creationId xmlns:a16="http://schemas.microsoft.com/office/drawing/2014/main" id="{3F5802A9-556B-4327-9EEA-961852914C26}"/>
+                <a16:creationId xmlns:a16="http://schemas.microsoft.com/office/drawing/2014/main" xmlns="" id="{3F5802A9-556B-4327-9EEA-961852914C26}"/>
               </a:ext>
             </a:extLst>
           </p:cNvPr>
@@ -20753,16 +20842,47 @@
           </a:p>
         </p:txBody>
       </p:sp>
+      <p:pic>
+        <p:nvPicPr>
+          <p:cNvPr id="8" name="Grafik 7" descr="AutoTS__Praesentation_Beispielgraph_2_mit_Auswahl.png"/>
+          <p:cNvPicPr>
+            <a:picLocks noChangeAspect="1"/>
+          </p:cNvPicPr>
+          <p:nvPr/>
+        </p:nvPicPr>
+        <p:blipFill>
+          <a:blip r:embed="rId2" cstate="print"/>
+          <a:stretch>
+            <a:fillRect/>
+          </a:stretch>
+        </p:blipFill>
+        <p:spPr>
+          <a:xfrm>
+            <a:off x="1215332" y="2556540"/>
+            <a:ext cx="6585444" cy="3618000"/>
+          </a:xfrm>
+          <a:prstGeom prst="rect">
+            <a:avLst/>
+          </a:prstGeom>
+        </p:spPr>
+      </p:pic>
     </p:spTree>
     <p:extLst>
       <p:ext uri="{BB962C8B-B14F-4D97-AF65-F5344CB8AC3E}">
-        <p14:creationId xmlns:p14="http://schemas.microsoft.com/office/powerpoint/2010/main" val="3359108963"/>
+        <p14:creationId xmlns:p14="http://schemas.microsoft.com/office/powerpoint/2010/main" xmlns="" val="3359108963"/>
       </p:ext>
     </p:extLst>
   </p:cSld>
   <p:clrMapOvr>
     <a:masterClrMapping/>
   </p:clrMapOvr>
+  <p:timing>
+    <p:tnLst>
+      <p:par>
+        <p:cTn id="1" dur="indefinite" restart="never" nodeType="tmRoot"/>
+      </p:par>
+    </p:tnLst>
+  </p:timing>
 </p:sld>
 </file>
 
@@ -20788,7 +20908,7 @@
           <p:cNvPr id="2" name="Titel 1">
             <a:extLst>
               <a:ext uri="{FF2B5EF4-FFF2-40B4-BE49-F238E27FC236}">
-                <a16:creationId xmlns:a16="http://schemas.microsoft.com/office/drawing/2014/main" id="{594F37A0-8FD9-42A4-A80F-4C479182787E}"/>
+                <a16:creationId xmlns:a16="http://schemas.microsoft.com/office/drawing/2014/main" xmlns="" id="{594F37A0-8FD9-42A4-A80F-4C479182787E}"/>
               </a:ext>
             </a:extLst>
           </p:cNvPr>
@@ -20816,7 +20936,7 @@
           <p:cNvPr id="3" name="Inhaltsplatzhalter 2">
             <a:extLst>
               <a:ext uri="{FF2B5EF4-FFF2-40B4-BE49-F238E27FC236}">
-                <a16:creationId xmlns:a16="http://schemas.microsoft.com/office/drawing/2014/main" id="{B201CE33-F1D7-423B-B373-1D449812B3D5}"/>
+                <a16:creationId xmlns:a16="http://schemas.microsoft.com/office/drawing/2014/main" xmlns="" id="{B201CE33-F1D7-423B-B373-1D449812B3D5}"/>
               </a:ext>
             </a:extLst>
           </p:cNvPr>
@@ -20916,8 +21036,8 @@
         </p:blipFill>
         <p:spPr>
           <a:xfrm>
-            <a:off x="1151620" y="2420889"/>
-            <a:ext cx="6840760" cy="3758268"/>
+            <a:off x="1215332" y="2556540"/>
+            <a:ext cx="6585445" cy="3618000"/>
           </a:xfrm>
           <a:prstGeom prst="rect">
             <a:avLst/>
@@ -20929,7 +21049,7 @@
           <p:cNvPr id="9" name="Pfeil: Chevron 8">
             <a:extLst>
               <a:ext uri="{FF2B5EF4-FFF2-40B4-BE49-F238E27FC236}">
-                <a16:creationId xmlns:a16="http://schemas.microsoft.com/office/drawing/2014/main" id="{4104802C-F2EE-4B61-AEA6-AE3107DFAAB6}"/>
+                <a16:creationId xmlns:a16="http://schemas.microsoft.com/office/drawing/2014/main" xmlns="" id="{4104802C-F2EE-4B61-AEA6-AE3107DFAAB6}"/>
               </a:ext>
             </a:extLst>
           </p:cNvPr>
@@ -20994,7 +21114,7 @@
           <p:cNvPr id="10" name="Pfeil: Chevron 9">
             <a:extLst>
               <a:ext uri="{FF2B5EF4-FFF2-40B4-BE49-F238E27FC236}">
-                <a16:creationId xmlns:a16="http://schemas.microsoft.com/office/drawing/2014/main" id="{84820EE4-F9D5-4848-9655-728CE68A782F}"/>
+                <a16:creationId xmlns:a16="http://schemas.microsoft.com/office/drawing/2014/main" xmlns="" id="{84820EE4-F9D5-4848-9655-728CE68A782F}"/>
               </a:ext>
             </a:extLst>
           </p:cNvPr>
@@ -21062,7 +21182,7 @@
           <p:cNvPr id="11" name="Pfeil: Chevron 10">
             <a:extLst>
               <a:ext uri="{FF2B5EF4-FFF2-40B4-BE49-F238E27FC236}">
-                <a16:creationId xmlns:a16="http://schemas.microsoft.com/office/drawing/2014/main" id="{8259CAC6-47AF-45A5-A54D-BEA67DC18E12}"/>
+                <a16:creationId xmlns:a16="http://schemas.microsoft.com/office/drawing/2014/main" xmlns="" id="{8259CAC6-47AF-45A5-A54D-BEA67DC18E12}"/>
               </a:ext>
             </a:extLst>
           </p:cNvPr>
@@ -21130,13 +21250,20 @@
     </p:spTree>
     <p:extLst>
       <p:ext uri="{BB962C8B-B14F-4D97-AF65-F5344CB8AC3E}">
-        <p14:creationId xmlns:p14="http://schemas.microsoft.com/office/powerpoint/2010/main" val="3359108963"/>
+        <p14:creationId xmlns:p14="http://schemas.microsoft.com/office/powerpoint/2010/main" xmlns="" val="3359108963"/>
       </p:ext>
     </p:extLst>
   </p:cSld>
   <p:clrMapOvr>
     <a:masterClrMapping/>
   </p:clrMapOvr>
+  <p:timing>
+    <p:tnLst>
+      <p:par>
+        <p:cTn id="1" dur="indefinite" restart="never" nodeType="tmRoot"/>
+      </p:par>
+    </p:tnLst>
+  </p:timing>
 </p:sld>
 </file>
 
@@ -21162,7 +21289,7 @@
           <p:cNvPr id="2" name="Titel 1">
             <a:extLst>
               <a:ext uri="{FF2B5EF4-FFF2-40B4-BE49-F238E27FC236}">
-                <a16:creationId xmlns:a16="http://schemas.microsoft.com/office/drawing/2014/main" id="{594F37A0-8FD9-42A4-A80F-4C479182787E}"/>
+                <a16:creationId xmlns:a16="http://schemas.microsoft.com/office/drawing/2014/main" xmlns="" id="{594F37A0-8FD9-42A4-A80F-4C479182787E}"/>
               </a:ext>
             </a:extLst>
           </p:cNvPr>
@@ -21190,7 +21317,7 @@
           <p:cNvPr id="3" name="Inhaltsplatzhalter 2">
             <a:extLst>
               <a:ext uri="{FF2B5EF4-FFF2-40B4-BE49-F238E27FC236}">
-                <a16:creationId xmlns:a16="http://schemas.microsoft.com/office/drawing/2014/main" id="{B201CE33-F1D7-423B-B373-1D449812B3D5}"/>
+                <a16:creationId xmlns:a16="http://schemas.microsoft.com/office/drawing/2014/main" xmlns="" id="{B201CE33-F1D7-423B-B373-1D449812B3D5}"/>
               </a:ext>
             </a:extLst>
           </p:cNvPr>
@@ -21274,8 +21401,8 @@
         </p:blipFill>
         <p:spPr>
           <a:xfrm>
-            <a:off x="1044824" y="2420887"/>
-            <a:ext cx="7190348" cy="3780000"/>
+            <a:off x="1115616" y="2561521"/>
+            <a:ext cx="6882190" cy="3618000"/>
           </a:xfrm>
           <a:prstGeom prst="rect">
             <a:avLst/>
@@ -21287,7 +21414,7 @@
           <p:cNvPr id="9" name="Pfeil: Chevron 8">
             <a:extLst>
               <a:ext uri="{FF2B5EF4-FFF2-40B4-BE49-F238E27FC236}">
-                <a16:creationId xmlns:a16="http://schemas.microsoft.com/office/drawing/2014/main" id="{E174AEEB-5225-4D6F-8B2D-CC307962EA8C}"/>
+                <a16:creationId xmlns:a16="http://schemas.microsoft.com/office/drawing/2014/main" xmlns="" id="{E174AEEB-5225-4D6F-8B2D-CC307962EA8C}"/>
               </a:ext>
             </a:extLst>
           </p:cNvPr>
@@ -21352,7 +21479,7 @@
           <p:cNvPr id="10" name="Pfeil: Chevron 9">
             <a:extLst>
               <a:ext uri="{FF2B5EF4-FFF2-40B4-BE49-F238E27FC236}">
-                <a16:creationId xmlns:a16="http://schemas.microsoft.com/office/drawing/2014/main" id="{E7640B6A-F3FB-4009-A8F7-DB93A1D9D3FE}"/>
+                <a16:creationId xmlns:a16="http://schemas.microsoft.com/office/drawing/2014/main" xmlns="" id="{E7640B6A-F3FB-4009-A8F7-DB93A1D9D3FE}"/>
               </a:ext>
             </a:extLst>
           </p:cNvPr>
@@ -21420,7 +21547,7 @@
           <p:cNvPr id="11" name="Pfeil: Chevron 10">
             <a:extLst>
               <a:ext uri="{FF2B5EF4-FFF2-40B4-BE49-F238E27FC236}">
-                <a16:creationId xmlns:a16="http://schemas.microsoft.com/office/drawing/2014/main" id="{12C5DD78-3F03-42BA-A95A-7D858B6E6383}"/>
+                <a16:creationId xmlns:a16="http://schemas.microsoft.com/office/drawing/2014/main" xmlns="" id="{12C5DD78-3F03-42BA-A95A-7D858B6E6383}"/>
               </a:ext>
             </a:extLst>
           </p:cNvPr>
@@ -21488,13 +21615,20 @@
     </p:spTree>
     <p:extLst>
       <p:ext uri="{BB962C8B-B14F-4D97-AF65-F5344CB8AC3E}">
-        <p14:creationId xmlns:p14="http://schemas.microsoft.com/office/powerpoint/2010/main" val="3359108963"/>
+        <p14:creationId xmlns:p14="http://schemas.microsoft.com/office/powerpoint/2010/main" xmlns="" val="3359108963"/>
       </p:ext>
     </p:extLst>
   </p:cSld>
   <p:clrMapOvr>
     <a:masterClrMapping/>
   </p:clrMapOvr>
+  <p:timing>
+    <p:tnLst>
+      <p:par>
+        <p:cTn id="1" dur="indefinite" restart="never" nodeType="tmRoot"/>
+      </p:par>
+    </p:tnLst>
+  </p:timing>
 </p:sld>
 </file>
 
@@ -21520,7 +21654,7 @@
           <p:cNvPr id="2" name="Titel 1">
             <a:extLst>
               <a:ext uri="{FF2B5EF4-FFF2-40B4-BE49-F238E27FC236}">
-                <a16:creationId xmlns:a16="http://schemas.microsoft.com/office/drawing/2014/main" id="{594F37A0-8FD9-42A4-A80F-4C479182787E}"/>
+                <a16:creationId xmlns:a16="http://schemas.microsoft.com/office/drawing/2014/main" xmlns="" id="{594F37A0-8FD9-42A4-A80F-4C479182787E}"/>
               </a:ext>
             </a:extLst>
           </p:cNvPr>
@@ -21548,7 +21682,7 @@
           <p:cNvPr id="3" name="Inhaltsplatzhalter 2">
             <a:extLst>
               <a:ext uri="{FF2B5EF4-FFF2-40B4-BE49-F238E27FC236}">
-                <a16:creationId xmlns:a16="http://schemas.microsoft.com/office/drawing/2014/main" id="{B201CE33-F1D7-423B-B373-1D449812B3D5}"/>
+                <a16:creationId xmlns:a16="http://schemas.microsoft.com/office/drawing/2014/main" xmlns="" id="{B201CE33-F1D7-423B-B373-1D449812B3D5}"/>
               </a:ext>
             </a:extLst>
           </p:cNvPr>
@@ -21632,8 +21766,8 @@
         </p:blipFill>
         <p:spPr>
           <a:xfrm>
-            <a:off x="1151620" y="2424515"/>
-            <a:ext cx="6840760" cy="3751016"/>
+            <a:off x="1151621" y="2424515"/>
+            <a:ext cx="6840758" cy="3751016"/>
           </a:xfrm>
           <a:prstGeom prst="rect">
             <a:avLst/>
@@ -21645,7 +21779,7 @@
           <p:cNvPr id="9" name="Pfeil: Chevron 8">
             <a:extLst>
               <a:ext uri="{FF2B5EF4-FFF2-40B4-BE49-F238E27FC236}">
-                <a16:creationId xmlns:a16="http://schemas.microsoft.com/office/drawing/2014/main" id="{825D38EA-69DB-407F-9068-943538F8DE56}"/>
+                <a16:creationId xmlns:a16="http://schemas.microsoft.com/office/drawing/2014/main" xmlns="" id="{825D38EA-69DB-407F-9068-943538F8DE56}"/>
               </a:ext>
             </a:extLst>
           </p:cNvPr>
@@ -21710,7 +21844,7 @@
           <p:cNvPr id="10" name="Pfeil: Chevron 9">
             <a:extLst>
               <a:ext uri="{FF2B5EF4-FFF2-40B4-BE49-F238E27FC236}">
-                <a16:creationId xmlns:a16="http://schemas.microsoft.com/office/drawing/2014/main" id="{FD090E87-27D7-4575-8E47-A7EE04132479}"/>
+                <a16:creationId xmlns:a16="http://schemas.microsoft.com/office/drawing/2014/main" xmlns="" id="{FD090E87-27D7-4575-8E47-A7EE04132479}"/>
               </a:ext>
             </a:extLst>
           </p:cNvPr>
@@ -21778,7 +21912,7 @@
           <p:cNvPr id="11" name="Pfeil: Chevron 10">
             <a:extLst>
               <a:ext uri="{FF2B5EF4-FFF2-40B4-BE49-F238E27FC236}">
-                <a16:creationId xmlns:a16="http://schemas.microsoft.com/office/drawing/2014/main" id="{148BC4A1-836E-446D-86F5-F4F158F9E650}"/>
+                <a16:creationId xmlns:a16="http://schemas.microsoft.com/office/drawing/2014/main" xmlns="" id="{148BC4A1-836E-446D-86F5-F4F158F9E650}"/>
               </a:ext>
             </a:extLst>
           </p:cNvPr>
@@ -21846,13 +21980,20 @@
     </p:spTree>
     <p:extLst>
       <p:ext uri="{BB962C8B-B14F-4D97-AF65-F5344CB8AC3E}">
-        <p14:creationId xmlns:p14="http://schemas.microsoft.com/office/powerpoint/2010/main" val="3359108963"/>
+        <p14:creationId xmlns:p14="http://schemas.microsoft.com/office/powerpoint/2010/main" xmlns="" val="3359108963"/>
       </p:ext>
     </p:extLst>
   </p:cSld>
   <p:clrMapOvr>
     <a:masterClrMapping/>
   </p:clrMapOvr>
+  <p:timing>
+    <p:tnLst>
+      <p:par>
+        <p:cTn id="1" dur="indefinite" restart="never" nodeType="tmRoot"/>
+      </p:par>
+    </p:tnLst>
+  </p:timing>
 </p:sld>
 </file>
 
@@ -21878,7 +22019,7 @@
           <p:cNvPr id="2" name="Titel 1">
             <a:extLst>
               <a:ext uri="{FF2B5EF4-FFF2-40B4-BE49-F238E27FC236}">
-                <a16:creationId xmlns:a16="http://schemas.microsoft.com/office/drawing/2014/main" id="{594F37A0-8FD9-42A4-A80F-4C479182787E}"/>
+                <a16:creationId xmlns:a16="http://schemas.microsoft.com/office/drawing/2014/main" xmlns="" id="{594F37A0-8FD9-42A4-A80F-4C479182787E}"/>
               </a:ext>
             </a:extLst>
           </p:cNvPr>
@@ -21906,7 +22047,7 @@
           <p:cNvPr id="3" name="Inhaltsplatzhalter 2">
             <a:extLst>
               <a:ext uri="{FF2B5EF4-FFF2-40B4-BE49-F238E27FC236}">
-                <a16:creationId xmlns:a16="http://schemas.microsoft.com/office/drawing/2014/main" id="{B201CE33-F1D7-423B-B373-1D449812B3D5}"/>
+                <a16:creationId xmlns:a16="http://schemas.microsoft.com/office/drawing/2014/main" xmlns="" id="{B201CE33-F1D7-423B-B373-1D449812B3D5}"/>
               </a:ext>
             </a:extLst>
           </p:cNvPr>
@@ -22006,36 +22147,12 @@
           </a:p>
         </p:txBody>
       </p:sp>
-      <p:pic>
-        <p:nvPicPr>
-          <p:cNvPr id="12" name="Grafik 11" descr="AutoTS__Praesentation_Beispielgraph_2_mit_Auswahl.png"/>
-          <p:cNvPicPr>
-            <a:picLocks noChangeAspect="1"/>
-          </p:cNvPicPr>
-          <p:nvPr/>
-        </p:nvPicPr>
-        <p:blipFill>
-          <a:blip r:embed="rId2" cstate="print"/>
-          <a:stretch>
-            <a:fillRect/>
-          </a:stretch>
-        </p:blipFill>
-        <p:spPr>
-          <a:xfrm>
-            <a:off x="1151620" y="2420889"/>
-            <a:ext cx="6840759" cy="3758268"/>
-          </a:xfrm>
-          <a:prstGeom prst="rect">
-            <a:avLst/>
-          </a:prstGeom>
-        </p:spPr>
-      </p:pic>
       <p:sp>
         <p:nvSpPr>
           <p:cNvPr id="9" name="Pfeil: Chevron 8">
             <a:extLst>
               <a:ext uri="{FF2B5EF4-FFF2-40B4-BE49-F238E27FC236}">
-                <a16:creationId xmlns:a16="http://schemas.microsoft.com/office/drawing/2014/main" id="{B3706452-583B-40AE-BA94-24F81F8B291E}"/>
+                <a16:creationId xmlns:a16="http://schemas.microsoft.com/office/drawing/2014/main" xmlns="" id="{B3706452-583B-40AE-BA94-24F81F8B291E}"/>
               </a:ext>
             </a:extLst>
           </p:cNvPr>
@@ -22100,7 +22217,7 @@
           <p:cNvPr id="10" name="Pfeil: Chevron 9">
             <a:extLst>
               <a:ext uri="{FF2B5EF4-FFF2-40B4-BE49-F238E27FC236}">
-                <a16:creationId xmlns:a16="http://schemas.microsoft.com/office/drawing/2014/main" id="{9E01B232-FE02-45EA-926A-2A52FEE21010}"/>
+                <a16:creationId xmlns:a16="http://schemas.microsoft.com/office/drawing/2014/main" xmlns="" id="{9E01B232-FE02-45EA-926A-2A52FEE21010}"/>
               </a:ext>
             </a:extLst>
           </p:cNvPr>
@@ -22168,7 +22285,7 @@
           <p:cNvPr id="11" name="Pfeil: Chevron 10">
             <a:extLst>
               <a:ext uri="{FF2B5EF4-FFF2-40B4-BE49-F238E27FC236}">
-                <a16:creationId xmlns:a16="http://schemas.microsoft.com/office/drawing/2014/main" id="{846BC55F-9850-42DD-95FD-D684B6A4B86A}"/>
+                <a16:creationId xmlns:a16="http://schemas.microsoft.com/office/drawing/2014/main" xmlns="" id="{846BC55F-9850-42DD-95FD-D684B6A4B86A}"/>
               </a:ext>
             </a:extLst>
           </p:cNvPr>
@@ -22233,16 +22350,47 @@
           </a:p>
         </p:txBody>
       </p:sp>
+      <p:pic>
+        <p:nvPicPr>
+          <p:cNvPr id="8" name="Grafik 7" descr="AutoTS__Praesentation_Beispielgraph_2_mit_Auswahl.png"/>
+          <p:cNvPicPr>
+            <a:picLocks noChangeAspect="1"/>
+          </p:cNvPicPr>
+          <p:nvPr/>
+        </p:nvPicPr>
+        <p:blipFill>
+          <a:blip r:embed="rId2" cstate="print"/>
+          <a:stretch>
+            <a:fillRect/>
+          </a:stretch>
+        </p:blipFill>
+        <p:spPr>
+          <a:xfrm>
+            <a:off x="1215332" y="2556540"/>
+            <a:ext cx="6585444" cy="3618000"/>
+          </a:xfrm>
+          <a:prstGeom prst="rect">
+            <a:avLst/>
+          </a:prstGeom>
+        </p:spPr>
+      </p:pic>
     </p:spTree>
     <p:extLst>
       <p:ext uri="{BB962C8B-B14F-4D97-AF65-F5344CB8AC3E}">
-        <p14:creationId xmlns:p14="http://schemas.microsoft.com/office/powerpoint/2010/main" val="3359108963"/>
+        <p14:creationId xmlns:p14="http://schemas.microsoft.com/office/powerpoint/2010/main" xmlns="" val="3359108963"/>
       </p:ext>
     </p:extLst>
   </p:cSld>
   <p:clrMapOvr>
     <a:masterClrMapping/>
   </p:clrMapOvr>
+  <p:timing>
+    <p:tnLst>
+      <p:par>
+        <p:cTn id="1" dur="indefinite" restart="never" nodeType="tmRoot"/>
+      </p:par>
+    </p:tnLst>
+  </p:timing>
 </p:sld>
 </file>
 
@@ -22268,7 +22416,7 @@
           <p:cNvPr id="2" name="Titel 1">
             <a:extLst>
               <a:ext uri="{FF2B5EF4-FFF2-40B4-BE49-F238E27FC236}">
-                <a16:creationId xmlns:a16="http://schemas.microsoft.com/office/drawing/2014/main" id="{D209E4DA-0ABD-4811-9B3D-451135F8BF59}"/>
+                <a16:creationId xmlns:a16="http://schemas.microsoft.com/office/drawing/2014/main" xmlns="" id="{D209E4DA-0ABD-4811-9B3D-451135F8BF59}"/>
               </a:ext>
             </a:extLst>
           </p:cNvPr>
@@ -22296,7 +22444,7 @@
           <p:cNvPr id="5" name="Inhaltsplatzhalter 2">
             <a:extLst>
               <a:ext uri="{FF2B5EF4-FFF2-40B4-BE49-F238E27FC236}">
-                <a16:creationId xmlns:a16="http://schemas.microsoft.com/office/drawing/2014/main" id="{4B165914-D78E-4CAA-9A81-75634F901AFA}"/>
+                <a16:creationId xmlns:a16="http://schemas.microsoft.com/office/drawing/2014/main" xmlns="" id="{4B165914-D78E-4CAA-9A81-75634F901AFA}"/>
               </a:ext>
             </a:extLst>
           </p:cNvPr>
@@ -22421,7 +22569,7 @@
     </p:spTree>
     <p:extLst>
       <p:ext uri="{BB962C8B-B14F-4D97-AF65-F5344CB8AC3E}">
-        <p14:creationId xmlns:p14="http://schemas.microsoft.com/office/powerpoint/2010/main" val="931636316"/>
+        <p14:creationId xmlns:p14="http://schemas.microsoft.com/office/powerpoint/2010/main" xmlns="" val="931636316"/>
       </p:ext>
     </p:extLst>
   </p:cSld>
@@ -22453,7 +22601,7 @@
           <p:cNvPr id="2" name="Titel 1">
             <a:extLst>
               <a:ext uri="{FF2B5EF4-FFF2-40B4-BE49-F238E27FC236}">
-                <a16:creationId xmlns:a16="http://schemas.microsoft.com/office/drawing/2014/main" id="{594F37A0-8FD9-42A4-A80F-4C479182787E}"/>
+                <a16:creationId xmlns:a16="http://schemas.microsoft.com/office/drawing/2014/main" xmlns="" id="{594F37A0-8FD9-42A4-A80F-4C479182787E}"/>
               </a:ext>
             </a:extLst>
           </p:cNvPr>
@@ -22481,7 +22629,7 @@
           <p:cNvPr id="3" name="Inhaltsplatzhalter 2">
             <a:extLst>
               <a:ext uri="{FF2B5EF4-FFF2-40B4-BE49-F238E27FC236}">
-                <a16:creationId xmlns:a16="http://schemas.microsoft.com/office/drawing/2014/main" id="{B201CE33-F1D7-423B-B373-1D449812B3D5}"/>
+                <a16:creationId xmlns:a16="http://schemas.microsoft.com/office/drawing/2014/main" xmlns="" id="{B201CE33-F1D7-423B-B373-1D449812B3D5}"/>
               </a:ext>
             </a:extLst>
           </p:cNvPr>
@@ -22724,7 +22872,7 @@
           <p:cNvPr id="13" name="Pfeil: Chevron 12">
             <a:extLst>
               <a:ext uri="{FF2B5EF4-FFF2-40B4-BE49-F238E27FC236}">
-                <a16:creationId xmlns:a16="http://schemas.microsoft.com/office/drawing/2014/main" id="{50401BF1-9AC5-4272-96B1-0C618E319CD5}"/>
+                <a16:creationId xmlns:a16="http://schemas.microsoft.com/office/drawing/2014/main" xmlns="" id="{50401BF1-9AC5-4272-96B1-0C618E319CD5}"/>
               </a:ext>
             </a:extLst>
           </p:cNvPr>
@@ -22789,7 +22937,7 @@
           <p:cNvPr id="14" name="Pfeil: Chevron 13">
             <a:extLst>
               <a:ext uri="{FF2B5EF4-FFF2-40B4-BE49-F238E27FC236}">
-                <a16:creationId xmlns:a16="http://schemas.microsoft.com/office/drawing/2014/main" id="{663D2D07-D2C7-494B-8327-B2D203C9327F}"/>
+                <a16:creationId xmlns:a16="http://schemas.microsoft.com/office/drawing/2014/main" xmlns="" id="{663D2D07-D2C7-494B-8327-B2D203C9327F}"/>
               </a:ext>
             </a:extLst>
           </p:cNvPr>
@@ -22857,7 +23005,7 @@
           <p:cNvPr id="15" name="Pfeil: Chevron 14">
             <a:extLst>
               <a:ext uri="{FF2B5EF4-FFF2-40B4-BE49-F238E27FC236}">
-                <a16:creationId xmlns:a16="http://schemas.microsoft.com/office/drawing/2014/main" id="{BE32079B-0997-4BE0-9EF6-7A767288FA5A}"/>
+                <a16:creationId xmlns:a16="http://schemas.microsoft.com/office/drawing/2014/main" xmlns="" id="{BE32079B-0997-4BE0-9EF6-7A767288FA5A}"/>
               </a:ext>
             </a:extLst>
           </p:cNvPr>
@@ -22925,13 +23073,20 @@
     </p:spTree>
     <p:extLst>
       <p:ext uri="{BB962C8B-B14F-4D97-AF65-F5344CB8AC3E}">
-        <p14:creationId xmlns:p14="http://schemas.microsoft.com/office/powerpoint/2010/main" val="3359108963"/>
+        <p14:creationId xmlns:p14="http://schemas.microsoft.com/office/powerpoint/2010/main" xmlns="" val="3359108963"/>
       </p:ext>
     </p:extLst>
   </p:cSld>
   <p:clrMapOvr>
     <a:masterClrMapping/>
   </p:clrMapOvr>
+  <p:timing>
+    <p:tnLst>
+      <p:par>
+        <p:cTn id="1" dur="indefinite" restart="never" nodeType="tmRoot"/>
+      </p:par>
+    </p:tnLst>
+  </p:timing>
 </p:sld>
 </file>
 
@@ -22957,7 +23112,7 @@
           <p:cNvPr id="2" name="Titel 1">
             <a:extLst>
               <a:ext uri="{FF2B5EF4-FFF2-40B4-BE49-F238E27FC236}">
-                <a16:creationId xmlns:a16="http://schemas.microsoft.com/office/drawing/2014/main" id="{594F37A0-8FD9-42A4-A80F-4C479182787E}"/>
+                <a16:creationId xmlns:a16="http://schemas.microsoft.com/office/drawing/2014/main" xmlns="" id="{594F37A0-8FD9-42A4-A80F-4C479182787E}"/>
               </a:ext>
             </a:extLst>
           </p:cNvPr>
@@ -22985,7 +23140,7 @@
           <p:cNvPr id="3" name="Inhaltsplatzhalter 2">
             <a:extLst>
               <a:ext uri="{FF2B5EF4-FFF2-40B4-BE49-F238E27FC236}">
-                <a16:creationId xmlns:a16="http://schemas.microsoft.com/office/drawing/2014/main" id="{B201CE33-F1D7-423B-B373-1D449812B3D5}"/>
+                <a16:creationId xmlns:a16="http://schemas.microsoft.com/office/drawing/2014/main" xmlns="" id="{B201CE33-F1D7-423B-B373-1D449812B3D5}"/>
               </a:ext>
             </a:extLst>
           </p:cNvPr>
@@ -23333,7 +23488,7 @@
           <p:cNvPr id="14" name="Pfeil: Chevron 13">
             <a:extLst>
               <a:ext uri="{FF2B5EF4-FFF2-40B4-BE49-F238E27FC236}">
-                <a16:creationId xmlns:a16="http://schemas.microsoft.com/office/drawing/2014/main" id="{24AEC2D1-8D5A-443F-B2FF-27F6317CB349}"/>
+                <a16:creationId xmlns:a16="http://schemas.microsoft.com/office/drawing/2014/main" xmlns="" id="{24AEC2D1-8D5A-443F-B2FF-27F6317CB349}"/>
               </a:ext>
             </a:extLst>
           </p:cNvPr>
@@ -23398,7 +23553,7 @@
           <p:cNvPr id="15" name="Pfeil: Chevron 14">
             <a:extLst>
               <a:ext uri="{FF2B5EF4-FFF2-40B4-BE49-F238E27FC236}">
-                <a16:creationId xmlns:a16="http://schemas.microsoft.com/office/drawing/2014/main" id="{299B43E1-B9C6-4A54-8EC1-69C79084B345}"/>
+                <a16:creationId xmlns:a16="http://schemas.microsoft.com/office/drawing/2014/main" xmlns="" id="{299B43E1-B9C6-4A54-8EC1-69C79084B345}"/>
               </a:ext>
             </a:extLst>
           </p:cNvPr>
@@ -23466,7 +23621,7 @@
           <p:cNvPr id="16" name="Pfeil: Chevron 15">
             <a:extLst>
               <a:ext uri="{FF2B5EF4-FFF2-40B4-BE49-F238E27FC236}">
-                <a16:creationId xmlns:a16="http://schemas.microsoft.com/office/drawing/2014/main" id="{7AC11A0F-C03F-4652-9561-4AA053103277}"/>
+                <a16:creationId xmlns:a16="http://schemas.microsoft.com/office/drawing/2014/main" xmlns="" id="{7AC11A0F-C03F-4652-9561-4AA053103277}"/>
               </a:ext>
             </a:extLst>
           </p:cNvPr>
@@ -23534,13 +23689,20 @@
     </p:spTree>
     <p:extLst>
       <p:ext uri="{BB962C8B-B14F-4D97-AF65-F5344CB8AC3E}">
-        <p14:creationId xmlns:p14="http://schemas.microsoft.com/office/powerpoint/2010/main" val="2065099838"/>
+        <p14:creationId xmlns:p14="http://schemas.microsoft.com/office/powerpoint/2010/main" xmlns="" val="2065099838"/>
       </p:ext>
     </p:extLst>
   </p:cSld>
   <p:clrMapOvr>
     <a:masterClrMapping/>
   </p:clrMapOvr>
+  <p:timing>
+    <p:tnLst>
+      <p:par>
+        <p:cTn id="1" dur="indefinite" restart="never" nodeType="tmRoot"/>
+      </p:par>
+    </p:tnLst>
+  </p:timing>
 </p:sld>
 </file>
 
@@ -23566,7 +23728,7 @@
           <p:cNvPr id="2" name="Titel 1">
             <a:extLst>
               <a:ext uri="{FF2B5EF4-FFF2-40B4-BE49-F238E27FC236}">
-                <a16:creationId xmlns:a16="http://schemas.microsoft.com/office/drawing/2014/main" id="{594F37A0-8FD9-42A4-A80F-4C479182787E}"/>
+                <a16:creationId xmlns:a16="http://schemas.microsoft.com/office/drawing/2014/main" xmlns="" id="{594F37A0-8FD9-42A4-A80F-4C479182787E}"/>
               </a:ext>
             </a:extLst>
           </p:cNvPr>
@@ -23594,7 +23756,7 @@
           <p:cNvPr id="3" name="Inhaltsplatzhalter 2">
             <a:extLst>
               <a:ext uri="{FF2B5EF4-FFF2-40B4-BE49-F238E27FC236}">
-                <a16:creationId xmlns:a16="http://schemas.microsoft.com/office/drawing/2014/main" id="{B201CE33-F1D7-423B-B373-1D449812B3D5}"/>
+                <a16:creationId xmlns:a16="http://schemas.microsoft.com/office/drawing/2014/main" xmlns="" id="{B201CE33-F1D7-423B-B373-1D449812B3D5}"/>
               </a:ext>
             </a:extLst>
           </p:cNvPr>
@@ -23970,7 +24132,7 @@
           <p:cNvPr id="14" name="Pfeil: Chevron 13">
             <a:extLst>
               <a:ext uri="{FF2B5EF4-FFF2-40B4-BE49-F238E27FC236}">
-                <a16:creationId xmlns:a16="http://schemas.microsoft.com/office/drawing/2014/main" id="{548C50E4-9644-4B1C-9246-8CA0722C65FC}"/>
+                <a16:creationId xmlns:a16="http://schemas.microsoft.com/office/drawing/2014/main" xmlns="" id="{548C50E4-9644-4B1C-9246-8CA0722C65FC}"/>
               </a:ext>
             </a:extLst>
           </p:cNvPr>
@@ -24035,7 +24197,7 @@
           <p:cNvPr id="15" name="Pfeil: Chevron 14">
             <a:extLst>
               <a:ext uri="{FF2B5EF4-FFF2-40B4-BE49-F238E27FC236}">
-                <a16:creationId xmlns:a16="http://schemas.microsoft.com/office/drawing/2014/main" id="{DC16BABB-4A5D-45B5-A448-39FA46D355DF}"/>
+                <a16:creationId xmlns:a16="http://schemas.microsoft.com/office/drawing/2014/main" xmlns="" id="{DC16BABB-4A5D-45B5-A448-39FA46D355DF}"/>
               </a:ext>
             </a:extLst>
           </p:cNvPr>
@@ -24103,7 +24265,7 @@
           <p:cNvPr id="16" name="Pfeil: Chevron 15">
             <a:extLst>
               <a:ext uri="{FF2B5EF4-FFF2-40B4-BE49-F238E27FC236}">
-                <a16:creationId xmlns:a16="http://schemas.microsoft.com/office/drawing/2014/main" id="{4B6C7FB9-9068-4F78-B2E9-29B42FFF55EB}"/>
+                <a16:creationId xmlns:a16="http://schemas.microsoft.com/office/drawing/2014/main" xmlns="" id="{4B6C7FB9-9068-4F78-B2E9-29B42FFF55EB}"/>
               </a:ext>
             </a:extLst>
           </p:cNvPr>
@@ -24171,7 +24333,7 @@
     </p:spTree>
     <p:extLst>
       <p:ext uri="{BB962C8B-B14F-4D97-AF65-F5344CB8AC3E}">
-        <p14:creationId xmlns:p14="http://schemas.microsoft.com/office/powerpoint/2010/main" val="153290221"/>
+        <p14:creationId xmlns:p14="http://schemas.microsoft.com/office/powerpoint/2010/main" xmlns="" val="153290221"/>
       </p:ext>
     </p:extLst>
   </p:cSld>
@@ -24203,7 +24365,7 @@
           <p:cNvPr id="2" name="Titel 1">
             <a:extLst>
               <a:ext uri="{FF2B5EF4-FFF2-40B4-BE49-F238E27FC236}">
-                <a16:creationId xmlns:a16="http://schemas.microsoft.com/office/drawing/2014/main" id="{594F37A0-8FD9-42A4-A80F-4C479182787E}"/>
+                <a16:creationId xmlns:a16="http://schemas.microsoft.com/office/drawing/2014/main" xmlns="" id="{594F37A0-8FD9-42A4-A80F-4C479182787E}"/>
               </a:ext>
             </a:extLst>
           </p:cNvPr>
@@ -24231,7 +24393,7 @@
           <p:cNvPr id="3" name="Inhaltsplatzhalter 2">
             <a:extLst>
               <a:ext uri="{FF2B5EF4-FFF2-40B4-BE49-F238E27FC236}">
-                <a16:creationId xmlns:a16="http://schemas.microsoft.com/office/drawing/2014/main" id="{B201CE33-F1D7-423B-B373-1D449812B3D5}"/>
+                <a16:creationId xmlns:a16="http://schemas.microsoft.com/office/drawing/2014/main" xmlns="" id="{B201CE33-F1D7-423B-B373-1D449812B3D5}"/>
               </a:ext>
             </a:extLst>
           </p:cNvPr>
@@ -24626,7 +24788,7 @@
           <p:cNvPr id="14" name="Pfeil: Chevron 13">
             <a:extLst>
               <a:ext uri="{FF2B5EF4-FFF2-40B4-BE49-F238E27FC236}">
-                <a16:creationId xmlns:a16="http://schemas.microsoft.com/office/drawing/2014/main" id="{64C6EE50-5485-4B93-91D1-56984D775F1F}"/>
+                <a16:creationId xmlns:a16="http://schemas.microsoft.com/office/drawing/2014/main" xmlns="" id="{64C6EE50-5485-4B93-91D1-56984D775F1F}"/>
               </a:ext>
             </a:extLst>
           </p:cNvPr>
@@ -24691,7 +24853,7 @@
           <p:cNvPr id="15" name="Pfeil: Chevron 14">
             <a:extLst>
               <a:ext uri="{FF2B5EF4-FFF2-40B4-BE49-F238E27FC236}">
-                <a16:creationId xmlns:a16="http://schemas.microsoft.com/office/drawing/2014/main" id="{988DC4DD-C1CE-41C5-B45F-1EF5E0F07CF2}"/>
+                <a16:creationId xmlns:a16="http://schemas.microsoft.com/office/drawing/2014/main" xmlns="" id="{988DC4DD-C1CE-41C5-B45F-1EF5E0F07CF2}"/>
               </a:ext>
             </a:extLst>
           </p:cNvPr>
@@ -24759,7 +24921,7 @@
           <p:cNvPr id="16" name="Pfeil: Chevron 15">
             <a:extLst>
               <a:ext uri="{FF2B5EF4-FFF2-40B4-BE49-F238E27FC236}">
-                <a16:creationId xmlns:a16="http://schemas.microsoft.com/office/drawing/2014/main" id="{A97E04B1-2DB7-45F2-9411-6D3798CED780}"/>
+                <a16:creationId xmlns:a16="http://schemas.microsoft.com/office/drawing/2014/main" xmlns="" id="{A97E04B1-2DB7-45F2-9411-6D3798CED780}"/>
               </a:ext>
             </a:extLst>
           </p:cNvPr>
@@ -24827,7 +24989,7 @@
     </p:spTree>
     <p:extLst>
       <p:ext uri="{BB962C8B-B14F-4D97-AF65-F5344CB8AC3E}">
-        <p14:creationId xmlns:p14="http://schemas.microsoft.com/office/powerpoint/2010/main" val="1495301057"/>
+        <p14:creationId xmlns:p14="http://schemas.microsoft.com/office/powerpoint/2010/main" xmlns="" val="1495301057"/>
       </p:ext>
     </p:extLst>
   </p:cSld>
@@ -24859,7 +25021,7 @@
           <p:cNvPr id="2" name="Titel 1">
             <a:extLst>
               <a:ext uri="{FF2B5EF4-FFF2-40B4-BE49-F238E27FC236}">
-                <a16:creationId xmlns:a16="http://schemas.microsoft.com/office/drawing/2014/main" id="{594F37A0-8FD9-42A4-A80F-4C479182787E}"/>
+                <a16:creationId xmlns:a16="http://schemas.microsoft.com/office/drawing/2014/main" xmlns="" id="{594F37A0-8FD9-42A4-A80F-4C479182787E}"/>
               </a:ext>
             </a:extLst>
           </p:cNvPr>
@@ -24887,7 +25049,7 @@
           <p:cNvPr id="3" name="Inhaltsplatzhalter 2">
             <a:extLst>
               <a:ext uri="{FF2B5EF4-FFF2-40B4-BE49-F238E27FC236}">
-                <a16:creationId xmlns:a16="http://schemas.microsoft.com/office/drawing/2014/main" id="{B201CE33-F1D7-423B-B373-1D449812B3D5}"/>
+                <a16:creationId xmlns:a16="http://schemas.microsoft.com/office/drawing/2014/main" xmlns="" id="{B201CE33-F1D7-423B-B373-1D449812B3D5}"/>
               </a:ext>
             </a:extLst>
           </p:cNvPr>
@@ -25020,7 +25182,7 @@
           <p:cNvPr id="9" name="Pfeil: Chevron 8">
             <a:extLst>
               <a:ext uri="{FF2B5EF4-FFF2-40B4-BE49-F238E27FC236}">
-                <a16:creationId xmlns:a16="http://schemas.microsoft.com/office/drawing/2014/main" id="{3977D73C-626E-478F-8C5A-A40C886AF77B}"/>
+                <a16:creationId xmlns:a16="http://schemas.microsoft.com/office/drawing/2014/main" xmlns="" id="{3977D73C-626E-478F-8C5A-A40C886AF77B}"/>
               </a:ext>
             </a:extLst>
           </p:cNvPr>
@@ -25085,7 +25247,7 @@
           <p:cNvPr id="10" name="Pfeil: Chevron 9">
             <a:extLst>
               <a:ext uri="{FF2B5EF4-FFF2-40B4-BE49-F238E27FC236}">
-                <a16:creationId xmlns:a16="http://schemas.microsoft.com/office/drawing/2014/main" id="{7E31F2F0-26CA-4959-9412-E12DB3A454D4}"/>
+                <a16:creationId xmlns:a16="http://schemas.microsoft.com/office/drawing/2014/main" xmlns="" id="{7E31F2F0-26CA-4959-9412-E12DB3A454D4}"/>
               </a:ext>
             </a:extLst>
           </p:cNvPr>
@@ -25153,7 +25315,7 @@
           <p:cNvPr id="11" name="Pfeil: Chevron 10">
             <a:extLst>
               <a:ext uri="{FF2B5EF4-FFF2-40B4-BE49-F238E27FC236}">
-                <a16:creationId xmlns:a16="http://schemas.microsoft.com/office/drawing/2014/main" id="{0D29E5C0-D43D-42F3-8DAC-17AC54137FFF}"/>
+                <a16:creationId xmlns:a16="http://schemas.microsoft.com/office/drawing/2014/main" xmlns="" id="{0D29E5C0-D43D-42F3-8DAC-17AC54137FFF}"/>
               </a:ext>
             </a:extLst>
           </p:cNvPr>
@@ -25221,7 +25383,7 @@
     </p:spTree>
     <p:extLst>
       <p:ext uri="{BB962C8B-B14F-4D97-AF65-F5344CB8AC3E}">
-        <p14:creationId xmlns:p14="http://schemas.microsoft.com/office/powerpoint/2010/main" val="1617989302"/>
+        <p14:creationId xmlns:p14="http://schemas.microsoft.com/office/powerpoint/2010/main" xmlns="" val="1617989302"/>
       </p:ext>
     </p:extLst>
   </p:cSld>
@@ -25253,7 +25415,7 @@
           <p:cNvPr id="2" name="Titel 1">
             <a:extLst>
               <a:ext uri="{FF2B5EF4-FFF2-40B4-BE49-F238E27FC236}">
-                <a16:creationId xmlns:a16="http://schemas.microsoft.com/office/drawing/2014/main" id="{594F37A0-8FD9-42A4-A80F-4C479182787E}"/>
+                <a16:creationId xmlns:a16="http://schemas.microsoft.com/office/drawing/2014/main" xmlns="" id="{594F37A0-8FD9-42A4-A80F-4C479182787E}"/>
               </a:ext>
             </a:extLst>
           </p:cNvPr>
@@ -25281,7 +25443,7 @@
           <p:cNvPr id="3" name="Inhaltsplatzhalter 2">
             <a:extLst>
               <a:ext uri="{FF2B5EF4-FFF2-40B4-BE49-F238E27FC236}">
-                <a16:creationId xmlns:a16="http://schemas.microsoft.com/office/drawing/2014/main" id="{B201CE33-F1D7-423B-B373-1D449812B3D5}"/>
+                <a16:creationId xmlns:a16="http://schemas.microsoft.com/office/drawing/2014/main" xmlns="" id="{B201CE33-F1D7-423B-B373-1D449812B3D5}"/>
               </a:ext>
             </a:extLst>
           </p:cNvPr>
@@ -25706,7 +25868,7 @@
           <p:cNvPr id="12" name="Pfeil: Chevron 11">
             <a:extLst>
               <a:ext uri="{FF2B5EF4-FFF2-40B4-BE49-F238E27FC236}">
-                <a16:creationId xmlns:a16="http://schemas.microsoft.com/office/drawing/2014/main" id="{BA6B9B81-2531-48D9-A9F6-C4EF02873EC5}"/>
+                <a16:creationId xmlns:a16="http://schemas.microsoft.com/office/drawing/2014/main" xmlns="" id="{BA6B9B81-2531-48D9-A9F6-C4EF02873EC5}"/>
               </a:ext>
             </a:extLst>
           </p:cNvPr>
@@ -25771,7 +25933,7 @@
           <p:cNvPr id="13" name="Pfeil: Chevron 12">
             <a:extLst>
               <a:ext uri="{FF2B5EF4-FFF2-40B4-BE49-F238E27FC236}">
-                <a16:creationId xmlns:a16="http://schemas.microsoft.com/office/drawing/2014/main" id="{4E0FA700-E7D3-4A35-B8C2-6B6974570E52}"/>
+                <a16:creationId xmlns:a16="http://schemas.microsoft.com/office/drawing/2014/main" xmlns="" id="{4E0FA700-E7D3-4A35-B8C2-6B6974570E52}"/>
               </a:ext>
             </a:extLst>
           </p:cNvPr>
@@ -25839,7 +26001,7 @@
           <p:cNvPr id="14" name="Pfeil: Chevron 13">
             <a:extLst>
               <a:ext uri="{FF2B5EF4-FFF2-40B4-BE49-F238E27FC236}">
-                <a16:creationId xmlns:a16="http://schemas.microsoft.com/office/drawing/2014/main" id="{7953D0AF-045A-4882-AEBB-8FA277D11E7A}"/>
+                <a16:creationId xmlns:a16="http://schemas.microsoft.com/office/drawing/2014/main" xmlns="" id="{7953D0AF-045A-4882-AEBB-8FA277D11E7A}"/>
               </a:ext>
             </a:extLst>
           </p:cNvPr>
@@ -25907,7 +26069,7 @@
     </p:spTree>
     <p:extLst>
       <p:ext uri="{BB962C8B-B14F-4D97-AF65-F5344CB8AC3E}">
-        <p14:creationId xmlns:p14="http://schemas.microsoft.com/office/powerpoint/2010/main" val="3009233743"/>
+        <p14:creationId xmlns:p14="http://schemas.microsoft.com/office/powerpoint/2010/main" xmlns="" val="3009233743"/>
       </p:ext>
     </p:extLst>
   </p:cSld>
@@ -25939,7 +26101,7 @@
           <p:cNvPr id="2" name="Titel 1">
             <a:extLst>
               <a:ext uri="{FF2B5EF4-FFF2-40B4-BE49-F238E27FC236}">
-                <a16:creationId xmlns:a16="http://schemas.microsoft.com/office/drawing/2014/main" id="{594F37A0-8FD9-42A4-A80F-4C479182787E}"/>
+                <a16:creationId xmlns:a16="http://schemas.microsoft.com/office/drawing/2014/main" xmlns="" id="{594F37A0-8FD9-42A4-A80F-4C479182787E}"/>
               </a:ext>
             </a:extLst>
           </p:cNvPr>
@@ -25967,7 +26129,7 @@
           <p:cNvPr id="3" name="Inhaltsplatzhalter 2">
             <a:extLst>
               <a:ext uri="{FF2B5EF4-FFF2-40B4-BE49-F238E27FC236}">
-                <a16:creationId xmlns:a16="http://schemas.microsoft.com/office/drawing/2014/main" id="{B201CE33-F1D7-423B-B373-1D449812B3D5}"/>
+                <a16:creationId xmlns:a16="http://schemas.microsoft.com/office/drawing/2014/main" xmlns="" id="{B201CE33-F1D7-423B-B373-1D449812B3D5}"/>
               </a:ext>
             </a:extLst>
           </p:cNvPr>
@@ -26336,7 +26498,7 @@
           <p:cNvPr id="12" name="Pfeil: Chevron 11">
             <a:extLst>
               <a:ext uri="{FF2B5EF4-FFF2-40B4-BE49-F238E27FC236}">
-                <a16:creationId xmlns:a16="http://schemas.microsoft.com/office/drawing/2014/main" id="{8908606F-BA7E-4A43-9CDF-707BC758DA2F}"/>
+                <a16:creationId xmlns:a16="http://schemas.microsoft.com/office/drawing/2014/main" xmlns="" id="{8908606F-BA7E-4A43-9CDF-707BC758DA2F}"/>
               </a:ext>
             </a:extLst>
           </p:cNvPr>
@@ -26401,7 +26563,7 @@
           <p:cNvPr id="13" name="Pfeil: Chevron 12">
             <a:extLst>
               <a:ext uri="{FF2B5EF4-FFF2-40B4-BE49-F238E27FC236}">
-                <a16:creationId xmlns:a16="http://schemas.microsoft.com/office/drawing/2014/main" id="{6EF64A7C-A83B-4A3C-896C-5DB1473F30B6}"/>
+                <a16:creationId xmlns:a16="http://schemas.microsoft.com/office/drawing/2014/main" xmlns="" id="{6EF64A7C-A83B-4A3C-896C-5DB1473F30B6}"/>
               </a:ext>
             </a:extLst>
           </p:cNvPr>
@@ -26469,7 +26631,7 @@
           <p:cNvPr id="14" name="Pfeil: Chevron 13">
             <a:extLst>
               <a:ext uri="{FF2B5EF4-FFF2-40B4-BE49-F238E27FC236}">
-                <a16:creationId xmlns:a16="http://schemas.microsoft.com/office/drawing/2014/main" id="{C1D28339-7262-46AC-8057-B85CD70CE485}"/>
+                <a16:creationId xmlns:a16="http://schemas.microsoft.com/office/drawing/2014/main" xmlns="" id="{C1D28339-7262-46AC-8057-B85CD70CE485}"/>
               </a:ext>
             </a:extLst>
           </p:cNvPr>
@@ -26537,7 +26699,7 @@
     </p:spTree>
     <p:extLst>
       <p:ext uri="{BB962C8B-B14F-4D97-AF65-F5344CB8AC3E}">
-        <p14:creationId xmlns:p14="http://schemas.microsoft.com/office/powerpoint/2010/main" val="3329183195"/>
+        <p14:creationId xmlns:p14="http://schemas.microsoft.com/office/powerpoint/2010/main" xmlns="" val="3329183195"/>
       </p:ext>
     </p:extLst>
   </p:cSld>
@@ -26569,7 +26731,7 @@
           <p:cNvPr id="2" name="Titel 1">
             <a:extLst>
               <a:ext uri="{FF2B5EF4-FFF2-40B4-BE49-F238E27FC236}">
-                <a16:creationId xmlns:a16="http://schemas.microsoft.com/office/drawing/2014/main" id="{594F37A0-8FD9-42A4-A80F-4C479182787E}"/>
+                <a16:creationId xmlns:a16="http://schemas.microsoft.com/office/drawing/2014/main" xmlns="" id="{594F37A0-8FD9-42A4-A80F-4C479182787E}"/>
               </a:ext>
             </a:extLst>
           </p:cNvPr>
@@ -26617,7 +26779,7 @@
           <p:cNvPr id="9" name="Pfeil: Chevron 8">
             <a:extLst>
               <a:ext uri="{FF2B5EF4-FFF2-40B4-BE49-F238E27FC236}">
-                <a16:creationId xmlns:a16="http://schemas.microsoft.com/office/drawing/2014/main" id="{1FB79F76-76EE-4541-B06C-A5A732A55FD6}"/>
+                <a16:creationId xmlns:a16="http://schemas.microsoft.com/office/drawing/2014/main" xmlns="" id="{1FB79F76-76EE-4541-B06C-A5A732A55FD6}"/>
               </a:ext>
             </a:extLst>
           </p:cNvPr>
@@ -26682,7 +26844,7 @@
           <p:cNvPr id="11" name="Pfeil: Chevron 10">
             <a:extLst>
               <a:ext uri="{FF2B5EF4-FFF2-40B4-BE49-F238E27FC236}">
-                <a16:creationId xmlns:a16="http://schemas.microsoft.com/office/drawing/2014/main" id="{EF23FE1C-6678-45AC-ADA4-A95E358E7BC9}"/>
+                <a16:creationId xmlns:a16="http://schemas.microsoft.com/office/drawing/2014/main" xmlns="" id="{EF23FE1C-6678-45AC-ADA4-A95E358E7BC9}"/>
               </a:ext>
             </a:extLst>
           </p:cNvPr>
@@ -26747,7 +26909,7 @@
           <p:cNvPr id="12" name="Pfeil: Chevron 11">
             <a:extLst>
               <a:ext uri="{FF2B5EF4-FFF2-40B4-BE49-F238E27FC236}">
-                <a16:creationId xmlns:a16="http://schemas.microsoft.com/office/drawing/2014/main" id="{37976A18-79B8-48CB-900E-E406FBD3903A}"/>
+                <a16:creationId xmlns:a16="http://schemas.microsoft.com/office/drawing/2014/main" xmlns="" id="{37976A18-79B8-48CB-900E-E406FBD3903A}"/>
               </a:ext>
             </a:extLst>
           </p:cNvPr>
@@ -26815,7 +26977,7 @@
           <p:cNvPr id="14" name="Inhaltsplatzhalter 13">
             <a:extLst>
               <a:ext uri="{FF2B5EF4-FFF2-40B4-BE49-F238E27FC236}">
-                <a16:creationId xmlns:a16="http://schemas.microsoft.com/office/drawing/2014/main" id="{962041B6-BE0D-45DC-A59D-1F5C82CD4505}"/>
+                <a16:creationId xmlns:a16="http://schemas.microsoft.com/office/drawing/2014/main" xmlns="" id="{962041B6-BE0D-45DC-A59D-1F5C82CD4505}"/>
               </a:ext>
             </a:extLst>
           </p:cNvPr>
@@ -26827,10 +26989,10 @@
           </p:nvPr>
         </p:nvPicPr>
         <p:blipFill>
-          <a:blip r:embed="rId2">
+          <a:blip r:embed="rId2" cstate="print">
             <a:extLst>
               <a:ext uri="{28A0092B-C50C-407E-A947-70E740481C1C}">
-                <a14:useLocalDpi xmlns:a14="http://schemas.microsoft.com/office/drawing/2010/main" val="0"/>
+                <a14:useLocalDpi xmlns:a14="http://schemas.microsoft.com/office/drawing/2010/main" xmlns="" val="0"/>
               </a:ext>
             </a:extLst>
           </a:blip>
@@ -26848,7 +27010,7 @@
     </p:spTree>
     <p:extLst>
       <p:ext uri="{BB962C8B-B14F-4D97-AF65-F5344CB8AC3E}">
-        <p14:creationId xmlns:p14="http://schemas.microsoft.com/office/powerpoint/2010/main" val="1367615360"/>
+        <p14:creationId xmlns:p14="http://schemas.microsoft.com/office/powerpoint/2010/main" xmlns="" val="1367615360"/>
       </p:ext>
     </p:extLst>
   </p:cSld>
@@ -26880,7 +27042,7 @@
           <p:cNvPr id="2" name="Titel 1">
             <a:extLst>
               <a:ext uri="{FF2B5EF4-FFF2-40B4-BE49-F238E27FC236}">
-                <a16:creationId xmlns:a16="http://schemas.microsoft.com/office/drawing/2014/main" id="{594F37A0-8FD9-42A4-A80F-4C479182787E}"/>
+                <a16:creationId xmlns:a16="http://schemas.microsoft.com/office/drawing/2014/main" xmlns="" id="{594F37A0-8FD9-42A4-A80F-4C479182787E}"/>
               </a:ext>
             </a:extLst>
           </p:cNvPr>
@@ -26925,7 +27087,7 @@
           <p:cNvPr id="9" name="Pfeil: Chevron 8">
             <a:extLst>
               <a:ext uri="{FF2B5EF4-FFF2-40B4-BE49-F238E27FC236}">
-                <a16:creationId xmlns:a16="http://schemas.microsoft.com/office/drawing/2014/main" id="{78650DB3-DC1C-428D-975C-B617C916B25D}"/>
+                <a16:creationId xmlns:a16="http://schemas.microsoft.com/office/drawing/2014/main" xmlns="" id="{78650DB3-DC1C-428D-975C-B617C916B25D}"/>
               </a:ext>
             </a:extLst>
           </p:cNvPr>
@@ -26990,7 +27152,7 @@
           <p:cNvPr id="10" name="Pfeil: Chevron 9">
             <a:extLst>
               <a:ext uri="{FF2B5EF4-FFF2-40B4-BE49-F238E27FC236}">
-                <a16:creationId xmlns:a16="http://schemas.microsoft.com/office/drawing/2014/main" id="{DD5D5316-41E6-4C62-BE0E-8861F08EDAEC}"/>
+                <a16:creationId xmlns:a16="http://schemas.microsoft.com/office/drawing/2014/main" xmlns="" id="{DD5D5316-41E6-4C62-BE0E-8861F08EDAEC}"/>
               </a:ext>
             </a:extLst>
           </p:cNvPr>
@@ -27055,7 +27217,7 @@
           <p:cNvPr id="11" name="Pfeil: Chevron 10">
             <a:extLst>
               <a:ext uri="{FF2B5EF4-FFF2-40B4-BE49-F238E27FC236}">
-                <a16:creationId xmlns:a16="http://schemas.microsoft.com/office/drawing/2014/main" id="{DE7E9A1E-DF78-45A2-BD39-0A1878C8D455}"/>
+                <a16:creationId xmlns:a16="http://schemas.microsoft.com/office/drawing/2014/main" xmlns="" id="{DE7E9A1E-DF78-45A2-BD39-0A1878C8D455}"/>
               </a:ext>
             </a:extLst>
           </p:cNvPr>
@@ -27123,7 +27285,7 @@
           <p:cNvPr id="13" name="Inhaltsplatzhalter 12">
             <a:extLst>
               <a:ext uri="{FF2B5EF4-FFF2-40B4-BE49-F238E27FC236}">
-                <a16:creationId xmlns:a16="http://schemas.microsoft.com/office/drawing/2014/main" id="{1C5868A9-A09C-46D0-A417-3EE2DA0AB3CF}"/>
+                <a16:creationId xmlns:a16="http://schemas.microsoft.com/office/drawing/2014/main" xmlns="" id="{1C5868A9-A09C-46D0-A417-3EE2DA0AB3CF}"/>
               </a:ext>
             </a:extLst>
           </p:cNvPr>
@@ -27135,10 +27297,10 @@
           </p:nvPr>
         </p:nvPicPr>
         <p:blipFill>
-          <a:blip r:embed="rId2">
+          <a:blip r:embed="rId2" cstate="print">
             <a:extLst>
               <a:ext uri="{28A0092B-C50C-407E-A947-70E740481C1C}">
-                <a14:useLocalDpi xmlns:a14="http://schemas.microsoft.com/office/drawing/2010/main" val="0"/>
+                <a14:useLocalDpi xmlns:a14="http://schemas.microsoft.com/office/drawing/2010/main" xmlns="" val="0"/>
               </a:ext>
             </a:extLst>
           </a:blip>
@@ -27156,7 +27318,7 @@
     </p:spTree>
     <p:extLst>
       <p:ext uri="{BB962C8B-B14F-4D97-AF65-F5344CB8AC3E}">
-        <p14:creationId xmlns:p14="http://schemas.microsoft.com/office/powerpoint/2010/main" val="756221209"/>
+        <p14:creationId xmlns:p14="http://schemas.microsoft.com/office/powerpoint/2010/main" xmlns="" val="756221209"/>
       </p:ext>
     </p:extLst>
   </p:cSld>
@@ -27188,7 +27350,7 @@
           <p:cNvPr id="2" name="Titel 1">
             <a:extLst>
               <a:ext uri="{FF2B5EF4-FFF2-40B4-BE49-F238E27FC236}">
-                <a16:creationId xmlns:a16="http://schemas.microsoft.com/office/drawing/2014/main" id="{906446F2-1CF8-48FF-89D3-3844A0E3C4EE}"/>
+                <a16:creationId xmlns:a16="http://schemas.microsoft.com/office/drawing/2014/main" xmlns="" id="{906446F2-1CF8-48FF-89D3-3844A0E3C4EE}"/>
               </a:ext>
             </a:extLst>
           </p:cNvPr>
@@ -27224,7 +27386,7 @@
         </p:txBody>
       </p:sp>
       <mc:AlternateContent xmlns:mc="http://schemas.openxmlformats.org/markup-compatibility/2006">
-        <mc:Choice xmlns:a14="http://schemas.microsoft.com/office/drawing/2010/main" Requires="a14">
+        <mc:Choice xmlns:a14="http://schemas.microsoft.com/office/drawing/2010/main" xmlns="" Requires="a14">
           <p:sp>
             <p:nvSpPr>
               <p:cNvPr id="3" name="Inhaltsplatzhalter 2">
@@ -27636,7 +27798,7 @@
               <p:cNvPr id="3" name="Inhaltsplatzhalter 2">
                 <a:extLst>
                   <a:ext uri="{FF2B5EF4-FFF2-40B4-BE49-F238E27FC236}">
-                    <a16:creationId xmlns:a16="http://schemas.microsoft.com/office/drawing/2014/main" id="{3B558583-C8E2-46A4-841E-24724E19BD7F}"/>
+                    <a16:creationId xmlns:a16="http://schemas.microsoft.com/office/drawing/2014/main" xmlns="" id="{3B558583-C8E2-46A4-841E-24724E19BD7F}"/>
                   </a:ext>
                 </a:extLst>
               </p:cNvPr>
@@ -27649,7 +27811,7 @@
             </p:nvSpPr>
             <p:spPr>
               <a:blipFill>
-                <a:blip r:embed="rId2"/>
+                <a:blip r:embed="rId2" cstate="print"/>
                 <a:stretch>
                   <a:fillRect l="-1786"/>
                 </a:stretch>
@@ -27675,7 +27837,7 @@
           <p:cNvPr id="4" name="Pfeil: Chevron 3">
             <a:extLst>
               <a:ext uri="{FF2B5EF4-FFF2-40B4-BE49-F238E27FC236}">
-                <a16:creationId xmlns:a16="http://schemas.microsoft.com/office/drawing/2014/main" id="{5EEC9D2A-357E-489F-B0F5-57A267FCC5DB}"/>
+                <a16:creationId xmlns:a16="http://schemas.microsoft.com/office/drawing/2014/main" xmlns="" id="{5EEC9D2A-357E-489F-B0F5-57A267FCC5DB}"/>
               </a:ext>
             </a:extLst>
           </p:cNvPr>
@@ -27740,7 +27902,7 @@
           <p:cNvPr id="5" name="Pfeil: Chevron 4">
             <a:extLst>
               <a:ext uri="{FF2B5EF4-FFF2-40B4-BE49-F238E27FC236}">
-                <a16:creationId xmlns:a16="http://schemas.microsoft.com/office/drawing/2014/main" id="{EA3F541C-C625-42A9-9865-2830FE56BA80}"/>
+                <a16:creationId xmlns:a16="http://schemas.microsoft.com/office/drawing/2014/main" xmlns="" id="{EA3F541C-C625-42A9-9865-2830FE56BA80}"/>
               </a:ext>
             </a:extLst>
           </p:cNvPr>
@@ -27805,7 +27967,7 @@
           <p:cNvPr id="6" name="Pfeil: Chevron 5">
             <a:extLst>
               <a:ext uri="{FF2B5EF4-FFF2-40B4-BE49-F238E27FC236}">
-                <a16:creationId xmlns:a16="http://schemas.microsoft.com/office/drawing/2014/main" id="{684D4BD5-D917-426F-9A88-D450485593F9}"/>
+                <a16:creationId xmlns:a16="http://schemas.microsoft.com/office/drawing/2014/main" xmlns="" id="{684D4BD5-D917-426F-9A88-D450485593F9}"/>
               </a:ext>
             </a:extLst>
           </p:cNvPr>
@@ -27871,7 +28033,7 @@
     </p:spTree>
     <p:extLst>
       <p:ext uri="{BB962C8B-B14F-4D97-AF65-F5344CB8AC3E}">
-        <p14:creationId xmlns:p14="http://schemas.microsoft.com/office/powerpoint/2010/main" val="1402183548"/>
+        <p14:creationId xmlns:p14="http://schemas.microsoft.com/office/powerpoint/2010/main" xmlns="" val="1402183548"/>
       </p:ext>
     </p:extLst>
   </p:cSld>
@@ -27903,7 +28065,7 @@
           <p:cNvPr id="2" name="Titel 1">
             <a:extLst>
               <a:ext uri="{FF2B5EF4-FFF2-40B4-BE49-F238E27FC236}">
-                <a16:creationId xmlns:a16="http://schemas.microsoft.com/office/drawing/2014/main" id="{594F37A0-8FD9-42A4-A80F-4C479182787E}"/>
+                <a16:creationId xmlns:a16="http://schemas.microsoft.com/office/drawing/2014/main" xmlns="" id="{594F37A0-8FD9-42A4-A80F-4C479182787E}"/>
               </a:ext>
             </a:extLst>
           </p:cNvPr>
@@ -27931,7 +28093,7 @@
           <p:cNvPr id="9" name="Pfeil: Chevron 8">
             <a:extLst>
               <a:ext uri="{FF2B5EF4-FFF2-40B4-BE49-F238E27FC236}">
-                <a16:creationId xmlns:a16="http://schemas.microsoft.com/office/drawing/2014/main" id="{4ABDD5B2-81D0-4683-8C70-F10306827399}"/>
+                <a16:creationId xmlns:a16="http://schemas.microsoft.com/office/drawing/2014/main" xmlns="" id="{4ABDD5B2-81D0-4683-8C70-F10306827399}"/>
               </a:ext>
             </a:extLst>
           </p:cNvPr>
@@ -27992,7 +28154,7 @@
           <p:cNvPr id="10" name="Pfeil: Chevron 9">
             <a:extLst>
               <a:ext uri="{FF2B5EF4-FFF2-40B4-BE49-F238E27FC236}">
-                <a16:creationId xmlns:a16="http://schemas.microsoft.com/office/drawing/2014/main" id="{01428E79-A6AB-48F5-93FA-47B9DB32BAE3}"/>
+                <a16:creationId xmlns:a16="http://schemas.microsoft.com/office/drawing/2014/main" xmlns="" id="{01428E79-A6AB-48F5-93FA-47B9DB32BAE3}"/>
               </a:ext>
             </a:extLst>
           </p:cNvPr>
@@ -28062,7 +28224,7 @@
           <p:cNvPr id="12" name="Pfeil: Chevron 11">
             <a:extLst>
               <a:ext uri="{FF2B5EF4-FFF2-40B4-BE49-F238E27FC236}">
-                <a16:creationId xmlns:a16="http://schemas.microsoft.com/office/drawing/2014/main" id="{D8669502-BFFC-4BB2-9C48-8551944B57FA}"/>
+                <a16:creationId xmlns:a16="http://schemas.microsoft.com/office/drawing/2014/main" xmlns="" id="{D8669502-BFFC-4BB2-9C48-8551944B57FA}"/>
               </a:ext>
             </a:extLst>
           </p:cNvPr>
@@ -28132,7 +28294,7 @@
           <p:cNvPr id="13" name="Inhaltsplatzhalter 10" descr="AutoTS_Dataset.pdf - Adobe Acrobat Reader DC">
             <a:extLst>
               <a:ext uri="{FF2B5EF4-FFF2-40B4-BE49-F238E27FC236}">
-                <a16:creationId xmlns:a16="http://schemas.microsoft.com/office/drawing/2014/main" id="{BC869130-A99A-4290-B8B2-F74C5B6BC174}"/>
+                <a16:creationId xmlns:a16="http://schemas.microsoft.com/office/drawing/2014/main" xmlns="" id="{BC869130-A99A-4290-B8B2-F74C5B6BC174}"/>
               </a:ext>
             </a:extLst>
           </p:cNvPr>
@@ -28145,7 +28307,7 @@
           <a:blip r:embed="rId2" cstate="print">
             <a:extLst>
               <a:ext uri="{28A0092B-C50C-407E-A947-70E740481C1C}">
-                <a14:useLocalDpi xmlns:a14="http://schemas.microsoft.com/office/drawing/2010/main" val="0"/>
+                <a14:useLocalDpi xmlns:a14="http://schemas.microsoft.com/office/drawing/2010/main" xmlns="" val="0"/>
               </a:ext>
             </a:extLst>
           </a:blip>
@@ -28175,7 +28337,7 @@
           <p:cNvPr id="14" name="Inhaltsplatzhalter 10" descr="AutoTS_Dataset.pdf - Adobe Acrobat Reader DC">
             <a:extLst>
               <a:ext uri="{FF2B5EF4-FFF2-40B4-BE49-F238E27FC236}">
-                <a16:creationId xmlns:a16="http://schemas.microsoft.com/office/drawing/2014/main" id="{85C4F723-E7F3-435D-ACF5-55BC30F25798}"/>
+                <a16:creationId xmlns:a16="http://schemas.microsoft.com/office/drawing/2014/main" xmlns="" id="{85C4F723-E7F3-435D-ACF5-55BC30F25798}"/>
               </a:ext>
             </a:extLst>
           </p:cNvPr>
@@ -28188,7 +28350,7 @@
           <a:blip r:embed="rId2" cstate="print">
             <a:extLst>
               <a:ext uri="{28A0092B-C50C-407E-A947-70E740481C1C}">
-                <a14:useLocalDpi xmlns:a14="http://schemas.microsoft.com/office/drawing/2010/main" val="0"/>
+                <a14:useLocalDpi xmlns:a14="http://schemas.microsoft.com/office/drawing/2010/main" xmlns="" val="0"/>
               </a:ext>
             </a:extLst>
           </a:blip>
@@ -28218,7 +28380,7 @@
           <p:cNvPr id="16" name="Flussdiagramm: Mehrere Dokumente 15">
             <a:extLst>
               <a:ext uri="{FF2B5EF4-FFF2-40B4-BE49-F238E27FC236}">
-                <a16:creationId xmlns:a16="http://schemas.microsoft.com/office/drawing/2014/main" id="{4C6F3DF0-E4E1-43DC-89D1-3B442EF0D62D}"/>
+                <a16:creationId xmlns:a16="http://schemas.microsoft.com/office/drawing/2014/main" xmlns="" id="{4C6F3DF0-E4E1-43DC-89D1-3B442EF0D62D}"/>
               </a:ext>
             </a:extLst>
           </p:cNvPr>
@@ -28272,7 +28434,7 @@
           <p:cNvPr id="25" name="Gruppieren 24">
             <a:extLst>
               <a:ext uri="{FF2B5EF4-FFF2-40B4-BE49-F238E27FC236}">
-                <a16:creationId xmlns:a16="http://schemas.microsoft.com/office/drawing/2014/main" id="{9C68256D-C7BB-4D25-9AF6-349D27B63592}"/>
+                <a16:creationId xmlns:a16="http://schemas.microsoft.com/office/drawing/2014/main" xmlns="" id="{9C68256D-C7BB-4D25-9AF6-349D27B63592}"/>
               </a:ext>
             </a:extLst>
           </p:cNvPr>
@@ -28295,7 +28457,7 @@
             <p:cNvPr id="15" name="Flussdiagramm: Mehrere Dokumente 14">
               <a:extLst>
                 <a:ext uri="{FF2B5EF4-FFF2-40B4-BE49-F238E27FC236}">
-                  <a16:creationId xmlns:a16="http://schemas.microsoft.com/office/drawing/2014/main" id="{73E50CE8-4AFC-4953-B41A-79D437A4704D}"/>
+                  <a16:creationId xmlns:a16="http://schemas.microsoft.com/office/drawing/2014/main" xmlns="" id="{73E50CE8-4AFC-4953-B41A-79D437A4704D}"/>
                 </a:ext>
               </a:extLst>
             </p:cNvPr>
@@ -28347,7 +28509,7 @@
             <p:cNvPr id="18" name="Flussdiagramm: Mehrere Dokumente 17">
               <a:extLst>
                 <a:ext uri="{FF2B5EF4-FFF2-40B4-BE49-F238E27FC236}">
-                  <a16:creationId xmlns:a16="http://schemas.microsoft.com/office/drawing/2014/main" id="{47111D04-60DE-4445-9ACD-E9E005946C80}"/>
+                  <a16:creationId xmlns:a16="http://schemas.microsoft.com/office/drawing/2014/main" xmlns="" id="{47111D04-60DE-4445-9ACD-E9E005946C80}"/>
                 </a:ext>
               </a:extLst>
             </p:cNvPr>
@@ -28399,7 +28561,7 @@
             <p:cNvPr id="19" name="Flussdiagramm: Mehrere Dokumente 18">
               <a:extLst>
                 <a:ext uri="{FF2B5EF4-FFF2-40B4-BE49-F238E27FC236}">
-                  <a16:creationId xmlns:a16="http://schemas.microsoft.com/office/drawing/2014/main" id="{18E9A52C-FCFF-4CB5-A811-E388F2E9E197}"/>
+                  <a16:creationId xmlns:a16="http://schemas.microsoft.com/office/drawing/2014/main" xmlns="" id="{18E9A52C-FCFF-4CB5-A811-E388F2E9E197}"/>
                 </a:ext>
               </a:extLst>
             </p:cNvPr>
@@ -28452,7 +28614,7 @@
           <p:cNvPr id="20" name="Pfeil: nach rechts 19">
             <a:extLst>
               <a:ext uri="{FF2B5EF4-FFF2-40B4-BE49-F238E27FC236}">
-                <a16:creationId xmlns:a16="http://schemas.microsoft.com/office/drawing/2014/main" id="{51C1AAB2-8089-4D2F-836D-5CB47421666C}"/>
+                <a16:creationId xmlns:a16="http://schemas.microsoft.com/office/drawing/2014/main" xmlns="" id="{51C1AAB2-8089-4D2F-836D-5CB47421666C}"/>
               </a:ext>
             </a:extLst>
           </p:cNvPr>
@@ -28506,7 +28668,7 @@
           <p:cNvPr id="21" name="Pfeil: nach rechts 20">
             <a:extLst>
               <a:ext uri="{FF2B5EF4-FFF2-40B4-BE49-F238E27FC236}">
-                <a16:creationId xmlns:a16="http://schemas.microsoft.com/office/drawing/2014/main" id="{5D9BFF35-70C0-47E5-AA2A-3CDCB5D5F43E}"/>
+                <a16:creationId xmlns:a16="http://schemas.microsoft.com/office/drawing/2014/main" xmlns="" id="{5D9BFF35-70C0-47E5-AA2A-3CDCB5D5F43E}"/>
               </a:ext>
             </a:extLst>
           </p:cNvPr>
@@ -28565,7 +28727,7 @@
           <p:cNvPr id="22" name="Pfeil: nach unten 21">
             <a:extLst>
               <a:ext uri="{FF2B5EF4-FFF2-40B4-BE49-F238E27FC236}">
-                <a16:creationId xmlns:a16="http://schemas.microsoft.com/office/drawing/2014/main" id="{B9A823E9-D6A6-4388-86CD-602D37E88440}"/>
+                <a16:creationId xmlns:a16="http://schemas.microsoft.com/office/drawing/2014/main" xmlns="" id="{B9A823E9-D6A6-4388-86CD-602D37E88440}"/>
               </a:ext>
             </a:extLst>
           </p:cNvPr>
@@ -28624,7 +28786,7 @@
           <p:cNvPr id="26" name="Textfeld 25">
             <a:extLst>
               <a:ext uri="{FF2B5EF4-FFF2-40B4-BE49-F238E27FC236}">
-                <a16:creationId xmlns:a16="http://schemas.microsoft.com/office/drawing/2014/main" id="{600EAD89-637C-414B-8ADE-72CD9A7A9B71}"/>
+                <a16:creationId xmlns:a16="http://schemas.microsoft.com/office/drawing/2014/main" xmlns="" id="{600EAD89-637C-414B-8ADE-72CD9A7A9B71}"/>
               </a:ext>
             </a:extLst>
           </p:cNvPr>
@@ -28660,7 +28822,7 @@
           <p:cNvPr id="27" name="Textfeld 26">
             <a:extLst>
               <a:ext uri="{FF2B5EF4-FFF2-40B4-BE49-F238E27FC236}">
-                <a16:creationId xmlns:a16="http://schemas.microsoft.com/office/drawing/2014/main" id="{9A9B0288-D909-4CCD-8092-287460D83841}"/>
+                <a16:creationId xmlns:a16="http://schemas.microsoft.com/office/drawing/2014/main" xmlns="" id="{9A9B0288-D909-4CCD-8092-287460D83841}"/>
               </a:ext>
             </a:extLst>
           </p:cNvPr>
@@ -28704,7 +28866,7 @@
           <p:cNvPr id="28" name="Textfeld 27">
             <a:extLst>
               <a:ext uri="{FF2B5EF4-FFF2-40B4-BE49-F238E27FC236}">
-                <a16:creationId xmlns:a16="http://schemas.microsoft.com/office/drawing/2014/main" id="{22FD33E5-9537-42DA-9EA7-4BE094AB023E}"/>
+                <a16:creationId xmlns:a16="http://schemas.microsoft.com/office/drawing/2014/main" xmlns="" id="{22FD33E5-9537-42DA-9EA7-4BE094AB023E}"/>
               </a:ext>
             </a:extLst>
           </p:cNvPr>
@@ -28764,7 +28926,7 @@
           <p:cNvPr id="29" name="Textfeld 28">
             <a:extLst>
               <a:ext uri="{FF2B5EF4-FFF2-40B4-BE49-F238E27FC236}">
-                <a16:creationId xmlns:a16="http://schemas.microsoft.com/office/drawing/2014/main" id="{3F3FCD0E-FE0E-43F6-9211-5D55A081A7E3}"/>
+                <a16:creationId xmlns:a16="http://schemas.microsoft.com/office/drawing/2014/main" xmlns="" id="{3F3FCD0E-FE0E-43F6-9211-5D55A081A7E3}"/>
               </a:ext>
             </a:extLst>
           </p:cNvPr>
@@ -28800,7 +28962,7 @@
           <p:cNvPr id="30" name="Textfeld 29">
             <a:extLst>
               <a:ext uri="{FF2B5EF4-FFF2-40B4-BE49-F238E27FC236}">
-                <a16:creationId xmlns:a16="http://schemas.microsoft.com/office/drawing/2014/main" id="{BE3DE8A6-E653-4D21-A75D-D196FC09FDCD}"/>
+                <a16:creationId xmlns:a16="http://schemas.microsoft.com/office/drawing/2014/main" xmlns="" id="{BE3DE8A6-E653-4D21-A75D-D196FC09FDCD}"/>
               </a:ext>
             </a:extLst>
           </p:cNvPr>
@@ -28842,7 +29004,7 @@
     </p:spTree>
     <p:extLst>
       <p:ext uri="{BB962C8B-B14F-4D97-AF65-F5344CB8AC3E}">
-        <p14:creationId xmlns:p14="http://schemas.microsoft.com/office/powerpoint/2010/main" val="1877143116"/>
+        <p14:creationId xmlns:p14="http://schemas.microsoft.com/office/powerpoint/2010/main" xmlns="" val="1877143116"/>
       </p:ext>
     </p:extLst>
   </p:cSld>
@@ -28874,7 +29036,7 @@
           <p:cNvPr id="2" name="Titel 1">
             <a:extLst>
               <a:ext uri="{FF2B5EF4-FFF2-40B4-BE49-F238E27FC236}">
-                <a16:creationId xmlns:a16="http://schemas.microsoft.com/office/drawing/2014/main" id="{594F37A0-8FD9-42A4-A80F-4C479182787E}"/>
+                <a16:creationId xmlns:a16="http://schemas.microsoft.com/office/drawing/2014/main" xmlns="" id="{594F37A0-8FD9-42A4-A80F-4C479182787E}"/>
               </a:ext>
             </a:extLst>
           </p:cNvPr>
@@ -28917,7 +29079,7 @@
           <p:cNvPr id="12" name="Pfeil: Chevron 11">
             <a:extLst>
               <a:ext uri="{FF2B5EF4-FFF2-40B4-BE49-F238E27FC236}">
-                <a16:creationId xmlns:a16="http://schemas.microsoft.com/office/drawing/2014/main" id="{34A24F1C-D5F4-4C01-85C9-4E5933F42137}"/>
+                <a16:creationId xmlns:a16="http://schemas.microsoft.com/office/drawing/2014/main" xmlns="" id="{34A24F1C-D5F4-4C01-85C9-4E5933F42137}"/>
               </a:ext>
             </a:extLst>
           </p:cNvPr>
@@ -28982,7 +29144,7 @@
           <p:cNvPr id="13" name="Pfeil: Chevron 12">
             <a:extLst>
               <a:ext uri="{FF2B5EF4-FFF2-40B4-BE49-F238E27FC236}">
-                <a16:creationId xmlns:a16="http://schemas.microsoft.com/office/drawing/2014/main" id="{88D18140-7954-4650-9111-7535133750E5}"/>
+                <a16:creationId xmlns:a16="http://schemas.microsoft.com/office/drawing/2014/main" xmlns="" id="{88D18140-7954-4650-9111-7535133750E5}"/>
               </a:ext>
             </a:extLst>
           </p:cNvPr>
@@ -29047,7 +29209,7 @@
           <p:cNvPr id="14" name="Pfeil: Chevron 13">
             <a:extLst>
               <a:ext uri="{FF2B5EF4-FFF2-40B4-BE49-F238E27FC236}">
-                <a16:creationId xmlns:a16="http://schemas.microsoft.com/office/drawing/2014/main" id="{C7E1AE4E-49A2-41DC-9B59-E2116A492613}"/>
+                <a16:creationId xmlns:a16="http://schemas.microsoft.com/office/drawing/2014/main" xmlns="" id="{C7E1AE4E-49A2-41DC-9B59-E2116A492613}"/>
               </a:ext>
             </a:extLst>
           </p:cNvPr>
@@ -29115,7 +29277,7 @@
           <p:cNvPr id="22" name="Inhaltsplatzhalter 21">
             <a:extLst>
               <a:ext uri="{FF2B5EF4-FFF2-40B4-BE49-F238E27FC236}">
-                <a16:creationId xmlns:a16="http://schemas.microsoft.com/office/drawing/2014/main" id="{B8141367-41FF-4E90-ABA1-1761DD683872}"/>
+                <a16:creationId xmlns:a16="http://schemas.microsoft.com/office/drawing/2014/main" xmlns="" id="{B8141367-41FF-4E90-ABA1-1761DD683872}"/>
               </a:ext>
             </a:extLst>
           </p:cNvPr>
@@ -29127,10 +29289,10 @@
           </p:nvPr>
         </p:nvPicPr>
         <p:blipFill>
-          <a:blip r:embed="rId3">
+          <a:blip r:embed="rId3" cstate="print">
             <a:extLst>
               <a:ext uri="{28A0092B-C50C-407E-A947-70E740481C1C}">
-                <a14:useLocalDpi xmlns:a14="http://schemas.microsoft.com/office/drawing/2010/main" val="0"/>
+                <a14:useLocalDpi xmlns:a14="http://schemas.microsoft.com/office/drawing/2010/main" xmlns="" val="0"/>
               </a:ext>
             </a:extLst>
           </a:blip>
@@ -29148,7 +29310,7 @@
     </p:spTree>
     <p:extLst>
       <p:ext uri="{BB962C8B-B14F-4D97-AF65-F5344CB8AC3E}">
-        <p14:creationId xmlns:p14="http://schemas.microsoft.com/office/powerpoint/2010/main" val="4102414122"/>
+        <p14:creationId xmlns:p14="http://schemas.microsoft.com/office/powerpoint/2010/main" xmlns="" val="4102414122"/>
       </p:ext>
     </p:extLst>
   </p:cSld>
@@ -29180,7 +29342,7 @@
           <p:cNvPr id="2" name="Titel 1">
             <a:extLst>
               <a:ext uri="{FF2B5EF4-FFF2-40B4-BE49-F238E27FC236}">
-                <a16:creationId xmlns:a16="http://schemas.microsoft.com/office/drawing/2014/main" id="{594F37A0-8FD9-42A4-A80F-4C479182787E}"/>
+                <a16:creationId xmlns:a16="http://schemas.microsoft.com/office/drawing/2014/main" xmlns="" id="{594F37A0-8FD9-42A4-A80F-4C479182787E}"/>
               </a:ext>
             </a:extLst>
           </p:cNvPr>
@@ -29219,7 +29381,7 @@
           <p:cNvPr id="9" name="Pfeil: Chevron 8">
             <a:extLst>
               <a:ext uri="{FF2B5EF4-FFF2-40B4-BE49-F238E27FC236}">
-                <a16:creationId xmlns:a16="http://schemas.microsoft.com/office/drawing/2014/main" id="{3C740F4F-4493-44CF-AD1F-CF31368BB065}"/>
+                <a16:creationId xmlns:a16="http://schemas.microsoft.com/office/drawing/2014/main" xmlns="" id="{3C740F4F-4493-44CF-AD1F-CF31368BB065}"/>
               </a:ext>
             </a:extLst>
           </p:cNvPr>
@@ -29284,7 +29446,7 @@
           <p:cNvPr id="10" name="Pfeil: Chevron 9">
             <a:extLst>
               <a:ext uri="{FF2B5EF4-FFF2-40B4-BE49-F238E27FC236}">
-                <a16:creationId xmlns:a16="http://schemas.microsoft.com/office/drawing/2014/main" id="{C5855BAC-D076-4E8E-A32B-59E7B1C7F8AB}"/>
+                <a16:creationId xmlns:a16="http://schemas.microsoft.com/office/drawing/2014/main" xmlns="" id="{C5855BAC-D076-4E8E-A32B-59E7B1C7F8AB}"/>
               </a:ext>
             </a:extLst>
           </p:cNvPr>
@@ -29349,7 +29511,7 @@
           <p:cNvPr id="11" name="Pfeil: Chevron 10">
             <a:extLst>
               <a:ext uri="{FF2B5EF4-FFF2-40B4-BE49-F238E27FC236}">
-                <a16:creationId xmlns:a16="http://schemas.microsoft.com/office/drawing/2014/main" id="{9EA63425-6DAD-425A-AA32-5EA1C63996B6}"/>
+                <a16:creationId xmlns:a16="http://schemas.microsoft.com/office/drawing/2014/main" xmlns="" id="{9EA63425-6DAD-425A-AA32-5EA1C63996B6}"/>
               </a:ext>
             </a:extLst>
           </p:cNvPr>
@@ -29417,7 +29579,7 @@
           <p:cNvPr id="13" name="Inhaltsplatzhalter 12">
             <a:extLst>
               <a:ext uri="{FF2B5EF4-FFF2-40B4-BE49-F238E27FC236}">
-                <a16:creationId xmlns:a16="http://schemas.microsoft.com/office/drawing/2014/main" id="{E36EC592-9266-4ABD-A559-75EDC5D86776}"/>
+                <a16:creationId xmlns:a16="http://schemas.microsoft.com/office/drawing/2014/main" xmlns="" id="{E36EC592-9266-4ABD-A559-75EDC5D86776}"/>
               </a:ext>
             </a:extLst>
           </p:cNvPr>
@@ -29429,10 +29591,10 @@
           </p:nvPr>
         </p:nvPicPr>
         <p:blipFill>
-          <a:blip r:embed="rId3">
+          <a:blip r:embed="rId3" cstate="print">
             <a:extLst>
               <a:ext uri="{28A0092B-C50C-407E-A947-70E740481C1C}">
-                <a14:useLocalDpi xmlns:a14="http://schemas.microsoft.com/office/drawing/2010/main" val="0"/>
+                <a14:useLocalDpi xmlns:a14="http://schemas.microsoft.com/office/drawing/2010/main" xmlns="" val="0"/>
               </a:ext>
             </a:extLst>
           </a:blip>
@@ -29450,7 +29612,7 @@
     </p:spTree>
     <p:extLst>
       <p:ext uri="{BB962C8B-B14F-4D97-AF65-F5344CB8AC3E}">
-        <p14:creationId xmlns:p14="http://schemas.microsoft.com/office/powerpoint/2010/main" val="3101916114"/>
+        <p14:creationId xmlns:p14="http://schemas.microsoft.com/office/powerpoint/2010/main" xmlns="" val="3101916114"/>
       </p:ext>
     </p:extLst>
   </p:cSld>
@@ -29482,7 +29644,7 @@
           <p:cNvPr id="2" name="Titel 1">
             <a:extLst>
               <a:ext uri="{FF2B5EF4-FFF2-40B4-BE49-F238E27FC236}">
-                <a16:creationId xmlns:a16="http://schemas.microsoft.com/office/drawing/2014/main" id="{594F37A0-8FD9-42A4-A80F-4C479182787E}"/>
+                <a16:creationId xmlns:a16="http://schemas.microsoft.com/office/drawing/2014/main" xmlns="" id="{594F37A0-8FD9-42A4-A80F-4C479182787E}"/>
               </a:ext>
             </a:extLst>
           </p:cNvPr>
@@ -29526,7 +29688,7 @@
           <p:cNvPr id="9" name="Pfeil: Chevron 8">
             <a:extLst>
               <a:ext uri="{FF2B5EF4-FFF2-40B4-BE49-F238E27FC236}">
-                <a16:creationId xmlns:a16="http://schemas.microsoft.com/office/drawing/2014/main" id="{3C740F4F-4493-44CF-AD1F-CF31368BB065}"/>
+                <a16:creationId xmlns:a16="http://schemas.microsoft.com/office/drawing/2014/main" xmlns="" id="{3C740F4F-4493-44CF-AD1F-CF31368BB065}"/>
               </a:ext>
             </a:extLst>
           </p:cNvPr>
@@ -29591,7 +29753,7 @@
           <p:cNvPr id="10" name="Pfeil: Chevron 9">
             <a:extLst>
               <a:ext uri="{FF2B5EF4-FFF2-40B4-BE49-F238E27FC236}">
-                <a16:creationId xmlns:a16="http://schemas.microsoft.com/office/drawing/2014/main" id="{C5855BAC-D076-4E8E-A32B-59E7B1C7F8AB}"/>
+                <a16:creationId xmlns:a16="http://schemas.microsoft.com/office/drawing/2014/main" xmlns="" id="{C5855BAC-D076-4E8E-A32B-59E7B1C7F8AB}"/>
               </a:ext>
             </a:extLst>
           </p:cNvPr>
@@ -29656,7 +29818,7 @@
           <p:cNvPr id="11" name="Pfeil: Chevron 10">
             <a:extLst>
               <a:ext uri="{FF2B5EF4-FFF2-40B4-BE49-F238E27FC236}">
-                <a16:creationId xmlns:a16="http://schemas.microsoft.com/office/drawing/2014/main" id="{9EA63425-6DAD-425A-AA32-5EA1C63996B6}"/>
+                <a16:creationId xmlns:a16="http://schemas.microsoft.com/office/drawing/2014/main" xmlns="" id="{9EA63425-6DAD-425A-AA32-5EA1C63996B6}"/>
               </a:ext>
             </a:extLst>
           </p:cNvPr>
@@ -29724,7 +29886,7 @@
           <p:cNvPr id="6" name="Inhaltsplatzhalter 5">
             <a:extLst>
               <a:ext uri="{FF2B5EF4-FFF2-40B4-BE49-F238E27FC236}">
-                <a16:creationId xmlns:a16="http://schemas.microsoft.com/office/drawing/2014/main" id="{3125EF6F-1C8B-41A1-982A-E86DD1DD89BB}"/>
+                <a16:creationId xmlns:a16="http://schemas.microsoft.com/office/drawing/2014/main" xmlns="" id="{3125EF6F-1C8B-41A1-982A-E86DD1DD89BB}"/>
               </a:ext>
             </a:extLst>
           </p:cNvPr>
@@ -29736,10 +29898,10 @@
           </p:nvPr>
         </p:nvPicPr>
         <p:blipFill>
-          <a:blip r:embed="rId3">
+          <a:blip r:embed="rId3" cstate="print">
             <a:extLst>
               <a:ext uri="{28A0092B-C50C-407E-A947-70E740481C1C}">
-                <a14:useLocalDpi xmlns:a14="http://schemas.microsoft.com/office/drawing/2010/main" val="0"/>
+                <a14:useLocalDpi xmlns:a14="http://schemas.microsoft.com/office/drawing/2010/main" xmlns="" val="0"/>
               </a:ext>
             </a:extLst>
           </a:blip>
@@ -29757,7 +29919,7 @@
     </p:spTree>
     <p:extLst>
       <p:ext uri="{BB962C8B-B14F-4D97-AF65-F5344CB8AC3E}">
-        <p14:creationId xmlns:p14="http://schemas.microsoft.com/office/powerpoint/2010/main" val="2722229048"/>
+        <p14:creationId xmlns:p14="http://schemas.microsoft.com/office/powerpoint/2010/main" xmlns="" val="2722229048"/>
       </p:ext>
     </p:extLst>
   </p:cSld>
@@ -29789,7 +29951,7 @@
           <p:cNvPr id="2" name="Titel 1">
             <a:extLst>
               <a:ext uri="{FF2B5EF4-FFF2-40B4-BE49-F238E27FC236}">
-                <a16:creationId xmlns:a16="http://schemas.microsoft.com/office/drawing/2014/main" id="{594F37A0-8FD9-42A4-A80F-4C479182787E}"/>
+                <a16:creationId xmlns:a16="http://schemas.microsoft.com/office/drawing/2014/main" xmlns="" id="{594F37A0-8FD9-42A4-A80F-4C479182787E}"/>
               </a:ext>
             </a:extLst>
           </p:cNvPr>
@@ -29817,7 +29979,7 @@
           <p:cNvPr id="3" name="Inhaltsplatzhalter 2">
             <a:extLst>
               <a:ext uri="{FF2B5EF4-FFF2-40B4-BE49-F238E27FC236}">
-                <a16:creationId xmlns:a16="http://schemas.microsoft.com/office/drawing/2014/main" id="{B201CE33-F1D7-423B-B373-1D449812B3D5}"/>
+                <a16:creationId xmlns:a16="http://schemas.microsoft.com/office/drawing/2014/main" xmlns="" id="{B201CE33-F1D7-423B-B373-1D449812B3D5}"/>
               </a:ext>
             </a:extLst>
           </p:cNvPr>
@@ -30308,7 +30470,7 @@
           <p:cNvPr id="9" name="Pfeil: Chevron 8">
             <a:extLst>
               <a:ext uri="{FF2B5EF4-FFF2-40B4-BE49-F238E27FC236}">
-                <a16:creationId xmlns:a16="http://schemas.microsoft.com/office/drawing/2014/main" id="{DDE5044C-FB64-4601-8122-66CB869EFAB9}"/>
+                <a16:creationId xmlns:a16="http://schemas.microsoft.com/office/drawing/2014/main" xmlns="" id="{DDE5044C-FB64-4601-8122-66CB869EFAB9}"/>
               </a:ext>
             </a:extLst>
           </p:cNvPr>
@@ -30373,7 +30535,7 @@
           <p:cNvPr id="10" name="Pfeil: Chevron 9">
             <a:extLst>
               <a:ext uri="{FF2B5EF4-FFF2-40B4-BE49-F238E27FC236}">
-                <a16:creationId xmlns:a16="http://schemas.microsoft.com/office/drawing/2014/main" id="{80B83E07-055D-4221-B559-0B05099697E1}"/>
+                <a16:creationId xmlns:a16="http://schemas.microsoft.com/office/drawing/2014/main" xmlns="" id="{80B83E07-055D-4221-B559-0B05099697E1}"/>
               </a:ext>
             </a:extLst>
           </p:cNvPr>
@@ -30438,7 +30600,7 @@
           <p:cNvPr id="11" name="Pfeil: Chevron 10">
             <a:extLst>
               <a:ext uri="{FF2B5EF4-FFF2-40B4-BE49-F238E27FC236}">
-                <a16:creationId xmlns:a16="http://schemas.microsoft.com/office/drawing/2014/main" id="{AB67AE60-B54E-4EC0-AD37-E28D15C0A2C5}"/>
+                <a16:creationId xmlns:a16="http://schemas.microsoft.com/office/drawing/2014/main" xmlns="" id="{AB67AE60-B54E-4EC0-AD37-E28D15C0A2C5}"/>
               </a:ext>
             </a:extLst>
           </p:cNvPr>
@@ -30504,7 +30666,7 @@
     </p:spTree>
     <p:extLst>
       <p:ext uri="{BB962C8B-B14F-4D97-AF65-F5344CB8AC3E}">
-        <p14:creationId xmlns:p14="http://schemas.microsoft.com/office/powerpoint/2010/main" val="1367615360"/>
+        <p14:creationId xmlns:p14="http://schemas.microsoft.com/office/powerpoint/2010/main" xmlns="" val="1367615360"/>
       </p:ext>
     </p:extLst>
   </p:cSld>
@@ -30536,7 +30698,7 @@
           <p:cNvPr id="2" name="Titel 1">
             <a:extLst>
               <a:ext uri="{FF2B5EF4-FFF2-40B4-BE49-F238E27FC236}">
-                <a16:creationId xmlns:a16="http://schemas.microsoft.com/office/drawing/2014/main" id="{594F37A0-8FD9-42A4-A80F-4C479182787E}"/>
+                <a16:creationId xmlns:a16="http://schemas.microsoft.com/office/drawing/2014/main" xmlns="" id="{594F37A0-8FD9-42A4-A80F-4C479182787E}"/>
               </a:ext>
             </a:extLst>
           </p:cNvPr>
@@ -30564,7 +30726,7 @@
           <p:cNvPr id="3" name="Inhaltsplatzhalter 2">
             <a:extLst>
               <a:ext uri="{FF2B5EF4-FFF2-40B4-BE49-F238E27FC236}">
-                <a16:creationId xmlns:a16="http://schemas.microsoft.com/office/drawing/2014/main" id="{B201CE33-F1D7-423B-B373-1D449812B3D5}"/>
+                <a16:creationId xmlns:a16="http://schemas.microsoft.com/office/drawing/2014/main" xmlns="" id="{B201CE33-F1D7-423B-B373-1D449812B3D5}"/>
               </a:ext>
             </a:extLst>
           </p:cNvPr>
@@ -30640,7 +30802,7 @@
           <p:cNvPr id="9" name="Pfeil: Chevron 8">
             <a:extLst>
               <a:ext uri="{FF2B5EF4-FFF2-40B4-BE49-F238E27FC236}">
-                <a16:creationId xmlns:a16="http://schemas.microsoft.com/office/drawing/2014/main" id="{6F7910A6-D450-49A7-BB8B-6580F7ABE218}"/>
+                <a16:creationId xmlns:a16="http://schemas.microsoft.com/office/drawing/2014/main" xmlns="" id="{6F7910A6-D450-49A7-BB8B-6580F7ABE218}"/>
               </a:ext>
             </a:extLst>
           </p:cNvPr>
@@ -30705,7 +30867,7 @@
           <p:cNvPr id="10" name="Pfeil: Chevron 9">
             <a:extLst>
               <a:ext uri="{FF2B5EF4-FFF2-40B4-BE49-F238E27FC236}">
-                <a16:creationId xmlns:a16="http://schemas.microsoft.com/office/drawing/2014/main" id="{C6577884-8690-4463-AD38-441F8CCBB453}"/>
+                <a16:creationId xmlns:a16="http://schemas.microsoft.com/office/drawing/2014/main" xmlns="" id="{C6577884-8690-4463-AD38-441F8CCBB453}"/>
               </a:ext>
             </a:extLst>
           </p:cNvPr>
@@ -30770,7 +30932,7 @@
           <p:cNvPr id="11" name="Pfeil: Chevron 10">
             <a:extLst>
               <a:ext uri="{FF2B5EF4-FFF2-40B4-BE49-F238E27FC236}">
-                <a16:creationId xmlns:a16="http://schemas.microsoft.com/office/drawing/2014/main" id="{4FEB7253-6130-484F-ABFB-431CD21A386D}"/>
+                <a16:creationId xmlns:a16="http://schemas.microsoft.com/office/drawing/2014/main" xmlns="" id="{4FEB7253-6130-484F-ABFB-431CD21A386D}"/>
               </a:ext>
             </a:extLst>
           </p:cNvPr>
@@ -30836,7 +30998,7 @@
     </p:spTree>
     <p:extLst>
       <p:ext uri="{BB962C8B-B14F-4D97-AF65-F5344CB8AC3E}">
-        <p14:creationId xmlns:p14="http://schemas.microsoft.com/office/powerpoint/2010/main" val="3836036945"/>
+        <p14:creationId xmlns:p14="http://schemas.microsoft.com/office/powerpoint/2010/main" xmlns="" val="3836036945"/>
       </p:ext>
     </p:extLst>
   </p:cSld>
@@ -30868,7 +31030,7 @@
           <p:cNvPr id="2" name="Titel 1">
             <a:extLst>
               <a:ext uri="{FF2B5EF4-FFF2-40B4-BE49-F238E27FC236}">
-                <a16:creationId xmlns:a16="http://schemas.microsoft.com/office/drawing/2014/main" id="{ECD13983-53CB-41A8-9897-E4D20881F929}"/>
+                <a16:creationId xmlns:a16="http://schemas.microsoft.com/office/drawing/2014/main" xmlns="" id="{ECD13983-53CB-41A8-9897-E4D20881F929}"/>
               </a:ext>
             </a:extLst>
           </p:cNvPr>
@@ -30896,7 +31058,7 @@
           <p:cNvPr id="3" name="Textplatzhalter 2">
             <a:extLst>
               <a:ext uri="{FF2B5EF4-FFF2-40B4-BE49-F238E27FC236}">
-                <a16:creationId xmlns:a16="http://schemas.microsoft.com/office/drawing/2014/main" id="{8A82E612-E974-4DE0-823F-A661C5C288BB}"/>
+                <a16:creationId xmlns:a16="http://schemas.microsoft.com/office/drawing/2014/main" xmlns="" id="{8A82E612-E974-4DE0-823F-A661C5C288BB}"/>
               </a:ext>
             </a:extLst>
           </p:cNvPr>
@@ -30919,7 +31081,7 @@
     </p:spTree>
     <p:extLst>
       <p:ext uri="{BB962C8B-B14F-4D97-AF65-F5344CB8AC3E}">
-        <p14:creationId xmlns:p14="http://schemas.microsoft.com/office/powerpoint/2010/main" val="1076095784"/>
+        <p14:creationId xmlns:p14="http://schemas.microsoft.com/office/powerpoint/2010/main" xmlns="" val="1076095784"/>
       </p:ext>
     </p:extLst>
   </p:cSld>
@@ -30951,7 +31113,7 @@
           <p:cNvPr id="2" name="Titel 1">
             <a:extLst>
               <a:ext uri="{FF2B5EF4-FFF2-40B4-BE49-F238E27FC236}">
-                <a16:creationId xmlns:a16="http://schemas.microsoft.com/office/drawing/2014/main" id="{594F37A0-8FD9-42A4-A80F-4C479182787E}"/>
+                <a16:creationId xmlns:a16="http://schemas.microsoft.com/office/drawing/2014/main" xmlns="" id="{594F37A0-8FD9-42A4-A80F-4C479182787E}"/>
               </a:ext>
             </a:extLst>
           </p:cNvPr>
@@ -30979,6 +31141,10 @@
               <a:rPr lang="de-DE" dirty="0" err="1"/>
               <a:t>Selection</a:t>
             </a:r>
+            <a:r>
+              <a:rPr lang="de-DE" dirty="0"/>
+              <a:t/>
+            </a:r>
             <a:br>
               <a:rPr lang="de-DE" dirty="0"/>
             </a:br>
@@ -30994,7 +31160,7 @@
           <p:cNvPr id="9" name="Pfeil: Chevron 8">
             <a:extLst>
               <a:ext uri="{FF2B5EF4-FFF2-40B4-BE49-F238E27FC236}">
-                <a16:creationId xmlns:a16="http://schemas.microsoft.com/office/drawing/2014/main" id="{FA5FE26A-6FE2-4F21-AB7E-1100413865AD}"/>
+                <a16:creationId xmlns:a16="http://schemas.microsoft.com/office/drawing/2014/main" xmlns="" id="{FA5FE26A-6FE2-4F21-AB7E-1100413865AD}"/>
               </a:ext>
             </a:extLst>
           </p:cNvPr>
@@ -31059,7 +31225,7 @@
           <p:cNvPr id="10" name="Pfeil: Chevron 9">
             <a:extLst>
               <a:ext uri="{FF2B5EF4-FFF2-40B4-BE49-F238E27FC236}">
-                <a16:creationId xmlns:a16="http://schemas.microsoft.com/office/drawing/2014/main" id="{0A51E448-9102-463C-8518-4996D5A66887}"/>
+                <a16:creationId xmlns:a16="http://schemas.microsoft.com/office/drawing/2014/main" xmlns="" id="{0A51E448-9102-463C-8518-4996D5A66887}"/>
               </a:ext>
             </a:extLst>
           </p:cNvPr>
@@ -31127,7 +31293,7 @@
           <p:cNvPr id="11" name="Pfeil: Chevron 10">
             <a:extLst>
               <a:ext uri="{FF2B5EF4-FFF2-40B4-BE49-F238E27FC236}">
-                <a16:creationId xmlns:a16="http://schemas.microsoft.com/office/drawing/2014/main" id="{D5078BA8-372A-47DD-AA54-DCFA4FE31E97}"/>
+                <a16:creationId xmlns:a16="http://schemas.microsoft.com/office/drawing/2014/main" xmlns="" id="{D5078BA8-372A-47DD-AA54-DCFA4FE31E97}"/>
               </a:ext>
             </a:extLst>
           </p:cNvPr>
@@ -31197,7 +31363,7 @@
           <p:cNvPr id="12" name="Inhaltsplatzhalter 11">
             <a:extLst>
               <a:ext uri="{FF2B5EF4-FFF2-40B4-BE49-F238E27FC236}">
-                <a16:creationId xmlns:a16="http://schemas.microsoft.com/office/drawing/2014/main" id="{DD512F05-C74A-49F8-92B6-BF5EC703CCDF}"/>
+                <a16:creationId xmlns:a16="http://schemas.microsoft.com/office/drawing/2014/main" xmlns="" id="{DD512F05-C74A-49F8-92B6-BF5EC703CCDF}"/>
               </a:ext>
             </a:extLst>
           </p:cNvPr>
@@ -31360,7 +31526,7 @@
     </p:spTree>
     <p:extLst>
       <p:ext uri="{BB962C8B-B14F-4D97-AF65-F5344CB8AC3E}">
-        <p14:creationId xmlns:p14="http://schemas.microsoft.com/office/powerpoint/2010/main" val="2449957204"/>
+        <p14:creationId xmlns:p14="http://schemas.microsoft.com/office/powerpoint/2010/main" xmlns="" val="2449957204"/>
       </p:ext>
     </p:extLst>
   </p:cSld>
@@ -31392,7 +31558,7 @@
           <p:cNvPr id="2" name="Titel 1">
             <a:extLst>
               <a:ext uri="{FF2B5EF4-FFF2-40B4-BE49-F238E27FC236}">
-                <a16:creationId xmlns:a16="http://schemas.microsoft.com/office/drawing/2014/main" id="{594F37A0-8FD9-42A4-A80F-4C479182787E}"/>
+                <a16:creationId xmlns:a16="http://schemas.microsoft.com/office/drawing/2014/main" xmlns="" id="{594F37A0-8FD9-42A4-A80F-4C479182787E}"/>
               </a:ext>
             </a:extLst>
           </p:cNvPr>
@@ -31420,6 +31586,10 @@
               <a:rPr lang="de-DE" dirty="0" err="1"/>
               <a:t>Selection</a:t>
             </a:r>
+            <a:r>
+              <a:rPr lang="de-DE" dirty="0"/>
+              <a:t/>
+            </a:r>
             <a:br>
               <a:rPr lang="de-DE" dirty="0"/>
             </a:br>
@@ -31440,7 +31610,7 @@
           <p:cNvPr id="3" name="Inhaltsplatzhalter 2">
             <a:extLst>
               <a:ext uri="{FF2B5EF4-FFF2-40B4-BE49-F238E27FC236}">
-                <a16:creationId xmlns:a16="http://schemas.microsoft.com/office/drawing/2014/main" id="{B201CE33-F1D7-423B-B373-1D449812B3D5}"/>
+                <a16:creationId xmlns:a16="http://schemas.microsoft.com/office/drawing/2014/main" xmlns="" id="{B201CE33-F1D7-423B-B373-1D449812B3D5}"/>
               </a:ext>
             </a:extLst>
           </p:cNvPr>
@@ -31595,7 +31765,7 @@
           <p:cNvPr id="16" name="Pfeil: Chevron 15">
             <a:extLst>
               <a:ext uri="{FF2B5EF4-FFF2-40B4-BE49-F238E27FC236}">
-                <a16:creationId xmlns:a16="http://schemas.microsoft.com/office/drawing/2014/main" id="{5AC50936-705C-4381-9F88-6F9F1B24AA18}"/>
+                <a16:creationId xmlns:a16="http://schemas.microsoft.com/office/drawing/2014/main" xmlns="" id="{5AC50936-705C-4381-9F88-6F9F1B24AA18}"/>
               </a:ext>
             </a:extLst>
           </p:cNvPr>
@@ -31660,7 +31830,7 @@
           <p:cNvPr id="17" name="Pfeil: Chevron 16">
             <a:extLst>
               <a:ext uri="{FF2B5EF4-FFF2-40B4-BE49-F238E27FC236}">
-                <a16:creationId xmlns:a16="http://schemas.microsoft.com/office/drawing/2014/main" id="{ABB889D1-0802-4E19-858D-2EF69B4565C4}"/>
+                <a16:creationId xmlns:a16="http://schemas.microsoft.com/office/drawing/2014/main" xmlns="" id="{ABB889D1-0802-4E19-858D-2EF69B4565C4}"/>
               </a:ext>
             </a:extLst>
           </p:cNvPr>
@@ -31728,7 +31898,7 @@
           <p:cNvPr id="18" name="Pfeil: Chevron 17">
             <a:extLst>
               <a:ext uri="{FF2B5EF4-FFF2-40B4-BE49-F238E27FC236}">
-                <a16:creationId xmlns:a16="http://schemas.microsoft.com/office/drawing/2014/main" id="{66C7ACE5-7144-4391-A72B-175A310390A3}"/>
+                <a16:creationId xmlns:a16="http://schemas.microsoft.com/office/drawing/2014/main" xmlns="" id="{66C7ACE5-7144-4391-A72B-175A310390A3}"/>
               </a:ext>
             </a:extLst>
           </p:cNvPr>
@@ -31796,7 +31966,7 @@
     </p:spTree>
     <p:extLst>
       <p:ext uri="{BB962C8B-B14F-4D97-AF65-F5344CB8AC3E}">
-        <p14:creationId xmlns:p14="http://schemas.microsoft.com/office/powerpoint/2010/main" val="1783394801"/>
+        <p14:creationId xmlns:p14="http://schemas.microsoft.com/office/powerpoint/2010/main" xmlns="" val="1783394801"/>
       </p:ext>
     </p:extLst>
   </p:cSld>
@@ -31828,7 +31998,7 @@
           <p:cNvPr id="2" name="Titel 1">
             <a:extLst>
               <a:ext uri="{FF2B5EF4-FFF2-40B4-BE49-F238E27FC236}">
-                <a16:creationId xmlns:a16="http://schemas.microsoft.com/office/drawing/2014/main" id="{594F37A0-8FD9-42A4-A80F-4C479182787E}"/>
+                <a16:creationId xmlns:a16="http://schemas.microsoft.com/office/drawing/2014/main" xmlns="" id="{594F37A0-8FD9-42A4-A80F-4C479182787E}"/>
               </a:ext>
             </a:extLst>
           </p:cNvPr>
@@ -31856,6 +32026,10 @@
               <a:rPr lang="de-DE" dirty="0" err="1"/>
               <a:t>Selection</a:t>
             </a:r>
+            <a:r>
+              <a:rPr lang="de-DE" dirty="0"/>
+              <a:t/>
+            </a:r>
             <a:br>
               <a:rPr lang="de-DE" dirty="0"/>
             </a:br>
@@ -31872,7 +32046,7 @@
           <p:cNvPr id="3" name="Inhaltsplatzhalter 2">
             <a:extLst>
               <a:ext uri="{FF2B5EF4-FFF2-40B4-BE49-F238E27FC236}">
-                <a16:creationId xmlns:a16="http://schemas.microsoft.com/office/drawing/2014/main" id="{B201CE33-F1D7-423B-B373-1D449812B3D5}"/>
+                <a16:creationId xmlns:a16="http://schemas.microsoft.com/office/drawing/2014/main" xmlns="" id="{B201CE33-F1D7-423B-B373-1D449812B3D5}"/>
               </a:ext>
             </a:extLst>
           </p:cNvPr>
@@ -31973,7 +32147,7 @@
           <p:cNvPr id="9" name="Pfeil: Chevron 8">
             <a:extLst>
               <a:ext uri="{FF2B5EF4-FFF2-40B4-BE49-F238E27FC236}">
-                <a16:creationId xmlns:a16="http://schemas.microsoft.com/office/drawing/2014/main" id="{C532D9B3-DCE4-4BF1-920A-5B7FC8EF5F97}"/>
+                <a16:creationId xmlns:a16="http://schemas.microsoft.com/office/drawing/2014/main" xmlns="" id="{C532D9B3-DCE4-4BF1-920A-5B7FC8EF5F97}"/>
               </a:ext>
             </a:extLst>
           </p:cNvPr>
@@ -32038,7 +32212,7 @@
           <p:cNvPr id="10" name="Pfeil: Chevron 9">
             <a:extLst>
               <a:ext uri="{FF2B5EF4-FFF2-40B4-BE49-F238E27FC236}">
-                <a16:creationId xmlns:a16="http://schemas.microsoft.com/office/drawing/2014/main" id="{E99ECF81-9260-40D1-BA0D-CA4C802C69EA}"/>
+                <a16:creationId xmlns:a16="http://schemas.microsoft.com/office/drawing/2014/main" xmlns="" id="{E99ECF81-9260-40D1-BA0D-CA4C802C69EA}"/>
               </a:ext>
             </a:extLst>
           </p:cNvPr>
@@ -32106,7 +32280,7 @@
           <p:cNvPr id="11" name="Pfeil: Chevron 10">
             <a:extLst>
               <a:ext uri="{FF2B5EF4-FFF2-40B4-BE49-F238E27FC236}">
-                <a16:creationId xmlns:a16="http://schemas.microsoft.com/office/drawing/2014/main" id="{46BBB43B-724F-4847-8861-A82579FB0042}"/>
+                <a16:creationId xmlns:a16="http://schemas.microsoft.com/office/drawing/2014/main" xmlns="" id="{46BBB43B-724F-4847-8861-A82579FB0042}"/>
               </a:ext>
             </a:extLst>
           </p:cNvPr>
@@ -32174,7 +32348,7 @@
     </p:spTree>
     <p:extLst>
       <p:ext uri="{BB962C8B-B14F-4D97-AF65-F5344CB8AC3E}">
-        <p14:creationId xmlns:p14="http://schemas.microsoft.com/office/powerpoint/2010/main" val="336162044"/>
+        <p14:creationId xmlns:p14="http://schemas.microsoft.com/office/powerpoint/2010/main" xmlns="" val="336162044"/>
       </p:ext>
     </p:extLst>
   </p:cSld>
@@ -32206,7 +32380,7 @@
           <p:cNvPr id="2" name="Titel 1">
             <a:extLst>
               <a:ext uri="{FF2B5EF4-FFF2-40B4-BE49-F238E27FC236}">
-                <a16:creationId xmlns:a16="http://schemas.microsoft.com/office/drawing/2014/main" id="{594F37A0-8FD9-42A4-A80F-4C479182787E}"/>
+                <a16:creationId xmlns:a16="http://schemas.microsoft.com/office/drawing/2014/main" xmlns="" id="{594F37A0-8FD9-42A4-A80F-4C479182787E}"/>
               </a:ext>
             </a:extLst>
           </p:cNvPr>
@@ -32234,6 +32408,10 @@
               <a:rPr lang="de-DE" dirty="0" err="1"/>
               <a:t>Selection</a:t>
             </a:r>
+            <a:r>
+              <a:rPr lang="de-DE" dirty="0"/>
+              <a:t/>
+            </a:r>
             <a:br>
               <a:rPr lang="de-DE" dirty="0"/>
             </a:br>
@@ -32250,7 +32428,7 @@
           <p:cNvPr id="3" name="Inhaltsplatzhalter 2">
             <a:extLst>
               <a:ext uri="{FF2B5EF4-FFF2-40B4-BE49-F238E27FC236}">
-                <a16:creationId xmlns:a16="http://schemas.microsoft.com/office/drawing/2014/main" id="{B201CE33-F1D7-423B-B373-1D449812B3D5}"/>
+                <a16:creationId xmlns:a16="http://schemas.microsoft.com/office/drawing/2014/main" xmlns="" id="{B201CE33-F1D7-423B-B373-1D449812B3D5}"/>
               </a:ext>
             </a:extLst>
           </p:cNvPr>
@@ -32349,7 +32527,7 @@
           <p:cNvPr id="9" name="Pfeil: Chevron 8">
             <a:extLst>
               <a:ext uri="{FF2B5EF4-FFF2-40B4-BE49-F238E27FC236}">
-                <a16:creationId xmlns:a16="http://schemas.microsoft.com/office/drawing/2014/main" id="{17D89CF8-3A87-44B7-9147-E3091A594B03}"/>
+                <a16:creationId xmlns:a16="http://schemas.microsoft.com/office/drawing/2014/main" xmlns="" id="{17D89CF8-3A87-44B7-9147-E3091A594B03}"/>
               </a:ext>
             </a:extLst>
           </p:cNvPr>
@@ -32414,7 +32592,7 @@
           <p:cNvPr id="10" name="Pfeil: Chevron 9">
             <a:extLst>
               <a:ext uri="{FF2B5EF4-FFF2-40B4-BE49-F238E27FC236}">
-                <a16:creationId xmlns:a16="http://schemas.microsoft.com/office/drawing/2014/main" id="{EC21E38E-2ABD-48D3-AE71-80005A169984}"/>
+                <a16:creationId xmlns:a16="http://schemas.microsoft.com/office/drawing/2014/main" xmlns="" id="{EC21E38E-2ABD-48D3-AE71-80005A169984}"/>
               </a:ext>
             </a:extLst>
           </p:cNvPr>
@@ -32482,7 +32660,7 @@
           <p:cNvPr id="11" name="Pfeil: Chevron 10">
             <a:extLst>
               <a:ext uri="{FF2B5EF4-FFF2-40B4-BE49-F238E27FC236}">
-                <a16:creationId xmlns:a16="http://schemas.microsoft.com/office/drawing/2014/main" id="{DF3BC811-5552-43CF-BDC0-88B667B5A6E6}"/>
+                <a16:creationId xmlns:a16="http://schemas.microsoft.com/office/drawing/2014/main" xmlns="" id="{DF3BC811-5552-43CF-BDC0-88B667B5A6E6}"/>
               </a:ext>
             </a:extLst>
           </p:cNvPr>
@@ -32550,7 +32728,7 @@
     </p:spTree>
     <p:extLst>
       <p:ext uri="{BB962C8B-B14F-4D97-AF65-F5344CB8AC3E}">
-        <p14:creationId xmlns:p14="http://schemas.microsoft.com/office/powerpoint/2010/main" val="2840066385"/>
+        <p14:creationId xmlns:p14="http://schemas.microsoft.com/office/powerpoint/2010/main" xmlns="" val="2840066385"/>
       </p:ext>
     </p:extLst>
   </p:cSld>
@@ -32582,7 +32760,7 @@
           <p:cNvPr id="13" name="Inhaltsplatzhalter 12">
             <a:extLst>
               <a:ext uri="{FF2B5EF4-FFF2-40B4-BE49-F238E27FC236}">
-                <a16:creationId xmlns:a16="http://schemas.microsoft.com/office/drawing/2014/main" id="{C4EC4554-79F0-459D-8CA7-AC7AD01489EA}"/>
+                <a16:creationId xmlns:a16="http://schemas.microsoft.com/office/drawing/2014/main" xmlns="" id="{C4EC4554-79F0-459D-8CA7-AC7AD01489EA}"/>
               </a:ext>
             </a:extLst>
           </p:cNvPr>
@@ -32618,6 +32796,10 @@
               <a:rPr lang="de-DE" sz="2200" dirty="0" err="1"/>
               <a:t>preprocess</a:t>
             </a:r>
+            <a:r>
+              <a:rPr lang="de-DE" sz="2200" dirty="0"/>
+              <a:t/>
+            </a:r>
             <a:br>
               <a:rPr lang="de-DE" sz="2200" dirty="0"/>
             </a:br>
@@ -32705,9 +32887,17 @@
             <a:pPr marL="0" lvl="1" indent="-7937">
               <a:buNone/>
             </a:pPr>
+            <a:r>
+              <a:rPr lang="de-DE" sz="2400" dirty="0"/>
+              <a:t/>
+            </a:r>
             <a:br>
               <a:rPr lang="de-DE" sz="2400" dirty="0"/>
             </a:br>
+            <a:r>
+              <a:rPr lang="de-DE" sz="2400" dirty="0"/>
+              <a:t/>
+            </a:r>
             <a:br>
               <a:rPr lang="de-DE" sz="2400" dirty="0"/>
             </a:br>
@@ -32723,7 +32913,7 @@
           <p:cNvPr id="2" name="Titel 1">
             <a:extLst>
               <a:ext uri="{FF2B5EF4-FFF2-40B4-BE49-F238E27FC236}">
-                <a16:creationId xmlns:a16="http://schemas.microsoft.com/office/drawing/2014/main" id="{594F37A0-8FD9-42A4-A80F-4C479182787E}"/>
+                <a16:creationId xmlns:a16="http://schemas.microsoft.com/office/drawing/2014/main" xmlns="" id="{594F37A0-8FD9-42A4-A80F-4C479182787E}"/>
               </a:ext>
             </a:extLst>
           </p:cNvPr>
@@ -32751,6 +32941,10 @@
               <a:rPr lang="de-DE" dirty="0" err="1"/>
               <a:t>Selection</a:t>
             </a:r>
+            <a:r>
+              <a:rPr lang="de-DE" dirty="0"/>
+              <a:t/>
+            </a:r>
             <a:br>
               <a:rPr lang="de-DE" dirty="0"/>
             </a:br>
@@ -32785,7 +32979,7 @@
           <p:nvPr>
             <p:extLst>
               <p:ext uri="{D42A27DB-BD31-4B8C-83A1-F6EECF244321}">
-                <p14:modId xmlns:p14="http://schemas.microsoft.com/office/powerpoint/2010/main" val="627684226"/>
+                <p14:modId xmlns:p14="http://schemas.microsoft.com/office/powerpoint/2010/main" xmlns="" val="627684226"/>
               </p:ext>
             </p:extLst>
           </p:nvPr>
@@ -32805,7 +32999,7 @@
           <p:cNvPr id="9" name="Pfeil: Chevron 8">
             <a:extLst>
               <a:ext uri="{FF2B5EF4-FFF2-40B4-BE49-F238E27FC236}">
-                <a16:creationId xmlns:a16="http://schemas.microsoft.com/office/drawing/2014/main" id="{D0EB61F6-F4F8-40B5-AAA1-B8F9EAA981AA}"/>
+                <a16:creationId xmlns:a16="http://schemas.microsoft.com/office/drawing/2014/main" xmlns="" id="{D0EB61F6-F4F8-40B5-AAA1-B8F9EAA981AA}"/>
               </a:ext>
             </a:extLst>
           </p:cNvPr>
@@ -32870,7 +33064,7 @@
           <p:cNvPr id="10" name="Pfeil: Chevron 9">
             <a:extLst>
               <a:ext uri="{FF2B5EF4-FFF2-40B4-BE49-F238E27FC236}">
-                <a16:creationId xmlns:a16="http://schemas.microsoft.com/office/drawing/2014/main" id="{80E34601-979E-4639-918A-814B7151AB50}"/>
+                <a16:creationId xmlns:a16="http://schemas.microsoft.com/office/drawing/2014/main" xmlns="" id="{80E34601-979E-4639-918A-814B7151AB50}"/>
               </a:ext>
             </a:extLst>
           </p:cNvPr>
@@ -32938,7 +33132,7 @@
           <p:cNvPr id="11" name="Pfeil: Chevron 10">
             <a:extLst>
               <a:ext uri="{FF2B5EF4-FFF2-40B4-BE49-F238E27FC236}">
-                <a16:creationId xmlns:a16="http://schemas.microsoft.com/office/drawing/2014/main" id="{90537AB3-A871-432B-AE01-51C08E0F59A2}"/>
+                <a16:creationId xmlns:a16="http://schemas.microsoft.com/office/drawing/2014/main" xmlns="" id="{90537AB3-A871-432B-AE01-51C08E0F59A2}"/>
               </a:ext>
             </a:extLst>
           </p:cNvPr>
@@ -33006,7 +33200,7 @@
     </p:spTree>
     <p:extLst>
       <p:ext uri="{BB962C8B-B14F-4D97-AF65-F5344CB8AC3E}">
-        <p14:creationId xmlns:p14="http://schemas.microsoft.com/office/powerpoint/2010/main" val="2501750320"/>
+        <p14:creationId xmlns:p14="http://schemas.microsoft.com/office/powerpoint/2010/main" xmlns="" val="2501750320"/>
       </p:ext>
     </p:extLst>
   </p:cSld>
@@ -33038,7 +33232,7 @@
           <p:cNvPr id="2" name="Titel 1">
             <a:extLst>
               <a:ext uri="{FF2B5EF4-FFF2-40B4-BE49-F238E27FC236}">
-                <a16:creationId xmlns:a16="http://schemas.microsoft.com/office/drawing/2014/main" id="{594F37A0-8FD9-42A4-A80F-4C479182787E}"/>
+                <a16:creationId xmlns:a16="http://schemas.microsoft.com/office/drawing/2014/main" xmlns="" id="{594F37A0-8FD9-42A4-A80F-4C479182787E}"/>
               </a:ext>
             </a:extLst>
           </p:cNvPr>
@@ -33066,6 +33260,10 @@
               <a:rPr lang="de-DE" dirty="0" err="1"/>
               <a:t>Selection</a:t>
             </a:r>
+            <a:r>
+              <a:rPr lang="de-DE" dirty="0"/>
+              <a:t/>
+            </a:r>
             <a:br>
               <a:rPr lang="de-DE" dirty="0"/>
             </a:br>
@@ -33093,7 +33291,7 @@
           <p:cNvPr id="3" name="Inhaltsplatzhalter 2">
             <a:extLst>
               <a:ext uri="{FF2B5EF4-FFF2-40B4-BE49-F238E27FC236}">
-                <a16:creationId xmlns:a16="http://schemas.microsoft.com/office/drawing/2014/main" id="{B201CE33-F1D7-423B-B373-1D449812B3D5}"/>
+                <a16:creationId xmlns:a16="http://schemas.microsoft.com/office/drawing/2014/main" xmlns="" id="{B201CE33-F1D7-423B-B373-1D449812B3D5}"/>
               </a:ext>
             </a:extLst>
           </p:cNvPr>
@@ -33286,7 +33484,7 @@
           <p:cNvPr id="9" name="Pfeil: Chevron 8">
             <a:extLst>
               <a:ext uri="{FF2B5EF4-FFF2-40B4-BE49-F238E27FC236}">
-                <a16:creationId xmlns:a16="http://schemas.microsoft.com/office/drawing/2014/main" id="{6F7AF884-21A5-46C0-B540-0CA691642AD2}"/>
+                <a16:creationId xmlns:a16="http://schemas.microsoft.com/office/drawing/2014/main" xmlns="" id="{6F7AF884-21A5-46C0-B540-0CA691642AD2}"/>
               </a:ext>
             </a:extLst>
           </p:cNvPr>
@@ -33351,7 +33549,7 @@
           <p:cNvPr id="10" name="Pfeil: Chevron 9">
             <a:extLst>
               <a:ext uri="{FF2B5EF4-FFF2-40B4-BE49-F238E27FC236}">
-                <a16:creationId xmlns:a16="http://schemas.microsoft.com/office/drawing/2014/main" id="{59BCC53C-4F8F-43DF-92CC-9C07897B4872}"/>
+                <a16:creationId xmlns:a16="http://schemas.microsoft.com/office/drawing/2014/main" xmlns="" id="{59BCC53C-4F8F-43DF-92CC-9C07897B4872}"/>
               </a:ext>
             </a:extLst>
           </p:cNvPr>
@@ -33419,7 +33617,7 @@
           <p:cNvPr id="11" name="Pfeil: Chevron 10">
             <a:extLst>
               <a:ext uri="{FF2B5EF4-FFF2-40B4-BE49-F238E27FC236}">
-                <a16:creationId xmlns:a16="http://schemas.microsoft.com/office/drawing/2014/main" id="{58B41544-D931-4E2A-9D19-547667BE6955}"/>
+                <a16:creationId xmlns:a16="http://schemas.microsoft.com/office/drawing/2014/main" xmlns="" id="{58B41544-D931-4E2A-9D19-547667BE6955}"/>
               </a:ext>
             </a:extLst>
           </p:cNvPr>
@@ -33487,7 +33685,7 @@
     </p:spTree>
     <p:extLst>
       <p:ext uri="{BB962C8B-B14F-4D97-AF65-F5344CB8AC3E}">
-        <p14:creationId xmlns:p14="http://schemas.microsoft.com/office/powerpoint/2010/main" val="1019526638"/>
+        <p14:creationId xmlns:p14="http://schemas.microsoft.com/office/powerpoint/2010/main" xmlns="" val="1019526638"/>
       </p:ext>
     </p:extLst>
   </p:cSld>

</xml_diff>